<commit_message>
Did some work on the presentation.
</commit_message>
<xml_diff>
--- a/Presentation/presentation.pptx
+++ b/Presentation/presentation.pptx
@@ -1,11 +1,20 @@
 
 <file path=ppt/presentation.xml><?xml version="1.0" encoding="utf-8"?>
-<p:presentation xmlns:a="http://schemas.openxmlformats.org/drawingml/2006/main" xmlns:r="http://schemas.openxmlformats.org/officeDocument/2006/relationships" xmlns:p="http://schemas.openxmlformats.org/presentationml/2006/main" saveSubsetFonts="1">
+<p:presentation xmlns:a="http://schemas.openxmlformats.org/drawingml/2006/main" xmlns:r="http://schemas.openxmlformats.org/officeDocument/2006/relationships" xmlns:p="http://schemas.openxmlformats.org/presentationml/2006/main" showSpecialPlsOnTitleSld="0" saveSubsetFonts="1">
   <p:sldMasterIdLst>
     <p:sldMasterId id="2147483648" r:id="rId1"/>
   </p:sldMasterIdLst>
+  <p:notesMasterIdLst>
+    <p:notesMasterId r:id="rId9"/>
+  </p:notesMasterIdLst>
   <p:sldIdLst>
     <p:sldId id="256" r:id="rId2"/>
+    <p:sldId id="257" r:id="rId3"/>
+    <p:sldId id="258" r:id="rId4"/>
+    <p:sldId id="259" r:id="rId5"/>
+    <p:sldId id="260" r:id="rId6"/>
+    <p:sldId id="261" r:id="rId7"/>
+    <p:sldId id="262" r:id="rId8"/>
   </p:sldIdLst>
   <p:sldSz cx="9144000" cy="6858000" type="screen4x3"/>
   <p:notesSz cx="6858000" cy="9144000"/>
@@ -107,6 +116,356 @@
 </p:presentation>
 </file>
 
+<file path=ppt/notesMasters/notesMaster1.xml><?xml version="1.0" encoding="utf-8"?>
+<p:notesMaster xmlns:a="http://schemas.openxmlformats.org/drawingml/2006/main" xmlns:r="http://schemas.openxmlformats.org/officeDocument/2006/relationships" xmlns:p="http://schemas.openxmlformats.org/presentationml/2006/main">
+  <p:cSld>
+    <p:bg>
+      <p:bgRef idx="1001">
+        <a:schemeClr val="bg1"/>
+      </p:bgRef>
+    </p:bg>
+    <p:spTree>
+      <p:nvGrpSpPr>
+        <p:cNvPr id="1" name=""/>
+        <p:cNvGrpSpPr/>
+        <p:nvPr/>
+      </p:nvGrpSpPr>
+      <p:grpSpPr>
+        <a:xfrm>
+          <a:off x="0" y="0"/>
+          <a:ext cx="0" cy="0"/>
+          <a:chOff x="0" y="0"/>
+          <a:chExt cx="0" cy="0"/>
+        </a:xfrm>
+      </p:grpSpPr>
+      <p:sp>
+        <p:nvSpPr>
+          <p:cNvPr id="2" name="Platshållare för sidhuvud 1"/>
+          <p:cNvSpPr>
+            <a:spLocks noGrp="1"/>
+          </p:cNvSpPr>
+          <p:nvPr>
+            <p:ph type="hdr" sz="quarter"/>
+          </p:nvPr>
+        </p:nvSpPr>
+        <p:spPr>
+          <a:xfrm>
+            <a:off x="0" y="0"/>
+            <a:ext cx="2971800" cy="457200"/>
+          </a:xfrm>
+          <a:prstGeom prst="rect">
+            <a:avLst/>
+          </a:prstGeom>
+        </p:spPr>
+        <p:txBody>
+          <a:bodyPr vert="horz" lIns="91440" tIns="45720" rIns="91440" bIns="45720" rtlCol="0"/>
+          <a:lstStyle>
+            <a:lvl1pPr algn="l">
+              <a:defRPr sz="1200"/>
+            </a:lvl1pPr>
+          </a:lstStyle>
+          <a:p>
+            <a:endParaRPr lang="sv-SE"/>
+          </a:p>
+        </p:txBody>
+      </p:sp>
+      <p:sp>
+        <p:nvSpPr>
+          <p:cNvPr id="3" name="Platshållare för datum 2"/>
+          <p:cNvSpPr>
+            <a:spLocks noGrp="1"/>
+          </p:cNvSpPr>
+          <p:nvPr>
+            <p:ph type="dt" idx="1"/>
+          </p:nvPr>
+        </p:nvSpPr>
+        <p:spPr>
+          <a:xfrm>
+            <a:off x="3884613" y="0"/>
+            <a:ext cx="2971800" cy="457200"/>
+          </a:xfrm>
+          <a:prstGeom prst="rect">
+            <a:avLst/>
+          </a:prstGeom>
+        </p:spPr>
+        <p:txBody>
+          <a:bodyPr vert="horz" lIns="91440" tIns="45720" rIns="91440" bIns="45720" rtlCol="0"/>
+          <a:lstStyle>
+            <a:lvl1pPr algn="r">
+              <a:defRPr sz="1200"/>
+            </a:lvl1pPr>
+          </a:lstStyle>
+          <a:p>
+            <a:fld id="{8A992F5C-BB21-42D6-8B86-86F05A225F4F}" type="datetimeFigureOut">
+              <a:rPr lang="sv-SE" smtClean="0"/>
+              <a:t>2011-05-26</a:t>
+            </a:fld>
+            <a:endParaRPr lang="sv-SE"/>
+          </a:p>
+        </p:txBody>
+      </p:sp>
+      <p:sp>
+        <p:nvSpPr>
+          <p:cNvPr id="4" name="Platshållare för bildobjekt 3"/>
+          <p:cNvSpPr>
+            <a:spLocks noGrp="1" noRot="1" noChangeAspect="1"/>
+          </p:cNvSpPr>
+          <p:nvPr>
+            <p:ph type="sldImg" idx="2"/>
+          </p:nvPr>
+        </p:nvSpPr>
+        <p:spPr>
+          <a:xfrm>
+            <a:off x="1143000" y="685800"/>
+            <a:ext cx="4572000" cy="3429000"/>
+          </a:xfrm>
+          <a:prstGeom prst="rect">
+            <a:avLst/>
+          </a:prstGeom>
+          <a:noFill/>
+          <a:ln w="12700">
+            <a:solidFill>
+              <a:prstClr val="black"/>
+            </a:solidFill>
+          </a:ln>
+        </p:spPr>
+        <p:txBody>
+          <a:bodyPr vert="horz" lIns="91440" tIns="45720" rIns="91440" bIns="45720" rtlCol="0" anchor="ctr"/>
+          <a:lstStyle/>
+          <a:p>
+            <a:endParaRPr lang="sv-SE"/>
+          </a:p>
+        </p:txBody>
+      </p:sp>
+      <p:sp>
+        <p:nvSpPr>
+          <p:cNvPr id="5" name="Platshållare för anteckningar 4"/>
+          <p:cNvSpPr>
+            <a:spLocks noGrp="1"/>
+          </p:cNvSpPr>
+          <p:nvPr>
+            <p:ph type="body" sz="quarter" idx="3"/>
+          </p:nvPr>
+        </p:nvSpPr>
+        <p:spPr>
+          <a:xfrm>
+            <a:off x="685800" y="4343400"/>
+            <a:ext cx="5486400" cy="4114800"/>
+          </a:xfrm>
+          <a:prstGeom prst="rect">
+            <a:avLst/>
+          </a:prstGeom>
+        </p:spPr>
+        <p:txBody>
+          <a:bodyPr vert="horz" lIns="91440" tIns="45720" rIns="91440" bIns="45720" rtlCol="0"/>
+          <a:lstStyle/>
+          <a:p>
+            <a:pPr lvl="0"/>
+            <a:r>
+              <a:rPr lang="sv-SE" smtClean="0"/>
+              <a:t>Klicka här för att ändra format på bakgrundstexten</a:t>
+            </a:r>
+          </a:p>
+          <a:p>
+            <a:pPr lvl="1"/>
+            <a:r>
+              <a:rPr lang="sv-SE" smtClean="0"/>
+              <a:t>Nivå två</a:t>
+            </a:r>
+          </a:p>
+          <a:p>
+            <a:pPr lvl="2"/>
+            <a:r>
+              <a:rPr lang="sv-SE" smtClean="0"/>
+              <a:t>Nivå tre</a:t>
+            </a:r>
+          </a:p>
+          <a:p>
+            <a:pPr lvl="3"/>
+            <a:r>
+              <a:rPr lang="sv-SE" smtClean="0"/>
+              <a:t>Nivå fyra</a:t>
+            </a:r>
+          </a:p>
+          <a:p>
+            <a:pPr lvl="4"/>
+            <a:r>
+              <a:rPr lang="sv-SE" smtClean="0"/>
+              <a:t>Nivå fem</a:t>
+            </a:r>
+            <a:endParaRPr lang="sv-SE"/>
+          </a:p>
+        </p:txBody>
+      </p:sp>
+      <p:sp>
+        <p:nvSpPr>
+          <p:cNvPr id="6" name="Platshållare för sidfot 5"/>
+          <p:cNvSpPr>
+            <a:spLocks noGrp="1"/>
+          </p:cNvSpPr>
+          <p:nvPr>
+            <p:ph type="ftr" sz="quarter" idx="4"/>
+          </p:nvPr>
+        </p:nvSpPr>
+        <p:spPr>
+          <a:xfrm>
+            <a:off x="0" y="8685213"/>
+            <a:ext cx="2971800" cy="457200"/>
+          </a:xfrm>
+          <a:prstGeom prst="rect">
+            <a:avLst/>
+          </a:prstGeom>
+        </p:spPr>
+        <p:txBody>
+          <a:bodyPr vert="horz" lIns="91440" tIns="45720" rIns="91440" bIns="45720" rtlCol="0" anchor="b"/>
+          <a:lstStyle>
+            <a:lvl1pPr algn="l">
+              <a:defRPr sz="1200"/>
+            </a:lvl1pPr>
+          </a:lstStyle>
+          <a:p>
+            <a:endParaRPr lang="sv-SE"/>
+          </a:p>
+        </p:txBody>
+      </p:sp>
+      <p:sp>
+        <p:nvSpPr>
+          <p:cNvPr id="7" name="Platshållare för bildnummer 6"/>
+          <p:cNvSpPr>
+            <a:spLocks noGrp="1"/>
+          </p:cNvSpPr>
+          <p:nvPr>
+            <p:ph type="sldNum" sz="quarter" idx="5"/>
+          </p:nvPr>
+        </p:nvSpPr>
+        <p:spPr>
+          <a:xfrm>
+            <a:off x="3884613" y="8685213"/>
+            <a:ext cx="2971800" cy="457200"/>
+          </a:xfrm>
+          <a:prstGeom prst="rect">
+            <a:avLst/>
+          </a:prstGeom>
+        </p:spPr>
+        <p:txBody>
+          <a:bodyPr vert="horz" lIns="91440" tIns="45720" rIns="91440" bIns="45720" rtlCol="0" anchor="b"/>
+          <a:lstStyle>
+            <a:lvl1pPr algn="r">
+              <a:defRPr sz="1200"/>
+            </a:lvl1pPr>
+          </a:lstStyle>
+          <a:p>
+            <a:fld id="{DE512173-E0F9-4750-BBCD-75C250F94987}" type="slidenum">
+              <a:rPr lang="sv-SE" smtClean="0"/>
+              <a:t>‹#›</a:t>
+            </a:fld>
+            <a:endParaRPr lang="sv-SE"/>
+          </a:p>
+        </p:txBody>
+      </p:sp>
+    </p:spTree>
+    <p:extLst>
+      <p:ext uri="{BB962C8B-B14F-4D97-AF65-F5344CB8AC3E}">
+        <p14:creationId xmlns:p14="http://schemas.microsoft.com/office/powerpoint/2010/main" val="2687917562"/>
+      </p:ext>
+    </p:extLst>
+  </p:cSld>
+  <p:clrMap bg1="lt1" tx1="dk1" bg2="lt2" tx2="dk2" accent1="accent1" accent2="accent2" accent3="accent3" accent4="accent4" accent5="accent5" accent6="accent6" hlink="hlink" folHlink="folHlink"/>
+  <p:notesStyle>
+    <a:lvl1pPr marL="0" algn="l" defTabSz="914400" rtl="0" eaLnBrk="1" latinLnBrk="0" hangingPunct="1">
+      <a:defRPr sz="1200" kern="1200">
+        <a:solidFill>
+          <a:schemeClr val="tx1"/>
+        </a:solidFill>
+        <a:latin typeface="+mn-lt"/>
+        <a:ea typeface="+mn-ea"/>
+        <a:cs typeface="+mn-cs"/>
+      </a:defRPr>
+    </a:lvl1pPr>
+    <a:lvl2pPr marL="457200" algn="l" defTabSz="914400" rtl="0" eaLnBrk="1" latinLnBrk="0" hangingPunct="1">
+      <a:defRPr sz="1200" kern="1200">
+        <a:solidFill>
+          <a:schemeClr val="tx1"/>
+        </a:solidFill>
+        <a:latin typeface="+mn-lt"/>
+        <a:ea typeface="+mn-ea"/>
+        <a:cs typeface="+mn-cs"/>
+      </a:defRPr>
+    </a:lvl2pPr>
+    <a:lvl3pPr marL="914400" algn="l" defTabSz="914400" rtl="0" eaLnBrk="1" latinLnBrk="0" hangingPunct="1">
+      <a:defRPr sz="1200" kern="1200">
+        <a:solidFill>
+          <a:schemeClr val="tx1"/>
+        </a:solidFill>
+        <a:latin typeface="+mn-lt"/>
+        <a:ea typeface="+mn-ea"/>
+        <a:cs typeface="+mn-cs"/>
+      </a:defRPr>
+    </a:lvl3pPr>
+    <a:lvl4pPr marL="1371600" algn="l" defTabSz="914400" rtl="0" eaLnBrk="1" latinLnBrk="0" hangingPunct="1">
+      <a:defRPr sz="1200" kern="1200">
+        <a:solidFill>
+          <a:schemeClr val="tx1"/>
+        </a:solidFill>
+        <a:latin typeface="+mn-lt"/>
+        <a:ea typeface="+mn-ea"/>
+        <a:cs typeface="+mn-cs"/>
+      </a:defRPr>
+    </a:lvl4pPr>
+    <a:lvl5pPr marL="1828800" algn="l" defTabSz="914400" rtl="0" eaLnBrk="1" latinLnBrk="0" hangingPunct="1">
+      <a:defRPr sz="1200" kern="1200">
+        <a:solidFill>
+          <a:schemeClr val="tx1"/>
+        </a:solidFill>
+        <a:latin typeface="+mn-lt"/>
+        <a:ea typeface="+mn-ea"/>
+        <a:cs typeface="+mn-cs"/>
+      </a:defRPr>
+    </a:lvl5pPr>
+    <a:lvl6pPr marL="2286000" algn="l" defTabSz="914400" rtl="0" eaLnBrk="1" latinLnBrk="0" hangingPunct="1">
+      <a:defRPr sz="1200" kern="1200">
+        <a:solidFill>
+          <a:schemeClr val="tx1"/>
+        </a:solidFill>
+        <a:latin typeface="+mn-lt"/>
+        <a:ea typeface="+mn-ea"/>
+        <a:cs typeface="+mn-cs"/>
+      </a:defRPr>
+    </a:lvl6pPr>
+    <a:lvl7pPr marL="2743200" algn="l" defTabSz="914400" rtl="0" eaLnBrk="1" latinLnBrk="0" hangingPunct="1">
+      <a:defRPr sz="1200" kern="1200">
+        <a:solidFill>
+          <a:schemeClr val="tx1"/>
+        </a:solidFill>
+        <a:latin typeface="+mn-lt"/>
+        <a:ea typeface="+mn-ea"/>
+        <a:cs typeface="+mn-cs"/>
+      </a:defRPr>
+    </a:lvl7pPr>
+    <a:lvl8pPr marL="3200400" algn="l" defTabSz="914400" rtl="0" eaLnBrk="1" latinLnBrk="0" hangingPunct="1">
+      <a:defRPr sz="1200" kern="1200">
+        <a:solidFill>
+          <a:schemeClr val="tx1"/>
+        </a:solidFill>
+        <a:latin typeface="+mn-lt"/>
+        <a:ea typeface="+mn-ea"/>
+        <a:cs typeface="+mn-cs"/>
+      </a:defRPr>
+    </a:lvl8pPr>
+    <a:lvl9pPr marL="3657600" algn="l" defTabSz="914400" rtl="0" eaLnBrk="1" latinLnBrk="0" hangingPunct="1">
+      <a:defRPr sz="1200" kern="1200">
+        <a:solidFill>
+          <a:schemeClr val="tx1"/>
+        </a:solidFill>
+        <a:latin typeface="+mn-lt"/>
+        <a:ea typeface="+mn-ea"/>
+        <a:cs typeface="+mn-cs"/>
+      </a:defRPr>
+    </a:lvl9pPr>
+  </p:notesStyle>
+</p:notesMaster>
+</file>
+
 <file path=ppt/slideLayouts/slideLayout1.xml><?xml version="1.0" encoding="utf-8"?>
 <p:sldLayout xmlns:a="http://schemas.openxmlformats.org/drawingml/2006/main" xmlns:r="http://schemas.openxmlformats.org/officeDocument/2006/relationships" xmlns:p="http://schemas.openxmlformats.org/presentationml/2006/main" type="title" preserve="1">
   <p:cSld name="Rubrikbild">
@@ -297,9 +656,9 @@
           <a:bodyPr/>
           <a:lstStyle/>
           <a:p>
-            <a:fld id="{09CC9F33-0A77-4F0E-99B9-F61EA8E0AFAD}" type="datetimeFigureOut">
-              <a:rPr lang="sv-SE" smtClean="0"/>
-              <a:t>2011-05-25</a:t>
+            <a:fld id="{2162C4A1-1747-4530-83C4-0BFC00863F31}" type="datetime1">
+              <a:rPr lang="sv-SE" smtClean="0"/>
+              <a:t>2011-05-26</a:t>
             </a:fld>
             <a:endParaRPr lang="sv-SE"/>
           </a:p>
@@ -474,9 +833,9 @@
           <a:bodyPr/>
           <a:lstStyle/>
           <a:p>
-            <a:fld id="{09CC9F33-0A77-4F0E-99B9-F61EA8E0AFAD}" type="datetimeFigureOut">
-              <a:rPr lang="sv-SE" smtClean="0"/>
-              <a:t>2011-05-25</a:t>
+            <a:fld id="{B92436E1-C3EC-4BD5-97C1-AE2A1D9166B3}" type="datetime1">
+              <a:rPr lang="sv-SE" smtClean="0"/>
+              <a:t>2011-05-26</a:t>
             </a:fld>
             <a:endParaRPr lang="sv-SE"/>
           </a:p>
@@ -654,9 +1013,9 @@
           <a:bodyPr/>
           <a:lstStyle/>
           <a:p>
-            <a:fld id="{09CC9F33-0A77-4F0E-99B9-F61EA8E0AFAD}" type="datetimeFigureOut">
-              <a:rPr lang="sv-SE" smtClean="0"/>
-              <a:t>2011-05-25</a:t>
+            <a:fld id="{C7F3DC18-85E6-4A5B-871E-D82719F09AA0}" type="datetime1">
+              <a:rPr lang="sv-SE" smtClean="0"/>
+              <a:t>2011-05-26</a:t>
             </a:fld>
             <a:endParaRPr lang="sv-SE"/>
           </a:p>
@@ -824,9 +1183,9 @@
           <a:bodyPr/>
           <a:lstStyle/>
           <a:p>
-            <a:fld id="{09CC9F33-0A77-4F0E-99B9-F61EA8E0AFAD}" type="datetimeFigureOut">
-              <a:rPr lang="sv-SE" smtClean="0"/>
-              <a:t>2011-05-25</a:t>
+            <a:fld id="{637124F9-74EC-4A1F-82AA-07908676A841}" type="datetime1">
+              <a:rPr lang="sv-SE" smtClean="0"/>
+              <a:t>2011-05-26</a:t>
             </a:fld>
             <a:endParaRPr lang="sv-SE"/>
           </a:p>
@@ -1077,9 +1436,9 @@
           <a:bodyPr/>
           <a:lstStyle/>
           <a:p>
-            <a:fld id="{09CC9F33-0A77-4F0E-99B9-F61EA8E0AFAD}" type="datetimeFigureOut">
-              <a:rPr lang="sv-SE" smtClean="0"/>
-              <a:t>2011-05-25</a:t>
+            <a:fld id="{04CA2416-EF3D-4BC0-827C-197CD8F2E76A}" type="datetime1">
+              <a:rPr lang="sv-SE" smtClean="0"/>
+              <a:t>2011-05-26</a:t>
             </a:fld>
             <a:endParaRPr lang="sv-SE"/>
           </a:p>
@@ -1365,9 +1724,9 @@
           <a:bodyPr/>
           <a:lstStyle/>
           <a:p>
-            <a:fld id="{09CC9F33-0A77-4F0E-99B9-F61EA8E0AFAD}" type="datetimeFigureOut">
-              <a:rPr lang="sv-SE" smtClean="0"/>
-              <a:t>2011-05-25</a:t>
+            <a:fld id="{E498B244-8DB5-4DE3-A747-C2083F13034F}" type="datetime1">
+              <a:rPr lang="sv-SE" smtClean="0"/>
+              <a:t>2011-05-26</a:t>
             </a:fld>
             <a:endParaRPr lang="sv-SE"/>
           </a:p>
@@ -1787,9 +2146,9 @@
           <a:bodyPr/>
           <a:lstStyle/>
           <a:p>
-            <a:fld id="{09CC9F33-0A77-4F0E-99B9-F61EA8E0AFAD}" type="datetimeFigureOut">
-              <a:rPr lang="sv-SE" smtClean="0"/>
-              <a:t>2011-05-25</a:t>
+            <a:fld id="{04997D01-3C30-4CCC-8527-2E6C5FDD01B5}" type="datetime1">
+              <a:rPr lang="sv-SE" smtClean="0"/>
+              <a:t>2011-05-26</a:t>
             </a:fld>
             <a:endParaRPr lang="sv-SE"/>
           </a:p>
@@ -1905,9 +2264,9 @@
           <a:bodyPr/>
           <a:lstStyle/>
           <a:p>
-            <a:fld id="{09CC9F33-0A77-4F0E-99B9-F61EA8E0AFAD}" type="datetimeFigureOut">
-              <a:rPr lang="sv-SE" smtClean="0"/>
-              <a:t>2011-05-25</a:t>
+            <a:fld id="{05721A07-45CB-4797-87DB-7EDECF2A03BB}" type="datetime1">
+              <a:rPr lang="sv-SE" smtClean="0"/>
+              <a:t>2011-05-26</a:t>
             </a:fld>
             <a:endParaRPr lang="sv-SE"/>
           </a:p>
@@ -2000,9 +2359,9 @@
           <a:bodyPr/>
           <a:lstStyle/>
           <a:p>
-            <a:fld id="{09CC9F33-0A77-4F0E-99B9-F61EA8E0AFAD}" type="datetimeFigureOut">
-              <a:rPr lang="sv-SE" smtClean="0"/>
-              <a:t>2011-05-25</a:t>
+            <a:fld id="{570A9BCA-167E-4E3E-B12A-4C0BBFBB73F8}" type="datetime1">
+              <a:rPr lang="sv-SE" smtClean="0"/>
+              <a:t>2011-05-26</a:t>
             </a:fld>
             <a:endParaRPr lang="sv-SE"/>
           </a:p>
@@ -2277,9 +2636,9 @@
           <a:bodyPr/>
           <a:lstStyle/>
           <a:p>
-            <a:fld id="{09CC9F33-0A77-4F0E-99B9-F61EA8E0AFAD}" type="datetimeFigureOut">
-              <a:rPr lang="sv-SE" smtClean="0"/>
-              <a:t>2011-05-25</a:t>
+            <a:fld id="{EA5505DC-82D5-4A0F-BDF4-DA41FC011CD3}" type="datetime1">
+              <a:rPr lang="sv-SE" smtClean="0"/>
+              <a:t>2011-05-26</a:t>
             </a:fld>
             <a:endParaRPr lang="sv-SE"/>
           </a:p>
@@ -2530,9 +2889,9 @@
           <a:bodyPr/>
           <a:lstStyle/>
           <a:p>
-            <a:fld id="{09CC9F33-0A77-4F0E-99B9-F61EA8E0AFAD}" type="datetimeFigureOut">
-              <a:rPr lang="sv-SE" smtClean="0"/>
-              <a:t>2011-05-25</a:t>
+            <a:fld id="{D8DCC73F-2D5E-451E-A2FB-60D52AC6CEBA}" type="datetime1">
+              <a:rPr lang="sv-SE" smtClean="0"/>
+              <a:t>2011-05-26</a:t>
             </a:fld>
             <a:endParaRPr lang="sv-SE"/>
           </a:p>
@@ -2779,9 +3138,9 @@
             </a:lvl1pPr>
           </a:lstStyle>
           <a:p>
-            <a:fld id="{09CC9F33-0A77-4F0E-99B9-F61EA8E0AFAD}" type="datetimeFigureOut">
-              <a:rPr lang="sv-SE" smtClean="0"/>
-              <a:t>2011-05-25</a:t>
+            <a:fld id="{553EBD10-67D3-4C33-A8C1-A7F8876305D2}" type="datetime1">
+              <a:rPr lang="sv-SE" smtClean="0"/>
+              <a:t>2011-05-26</a:t>
             </a:fld>
             <a:endParaRPr lang="sv-SE"/>
           </a:p>
@@ -2893,6 +3252,7 @@
       </p:par>
     </p:tnLst>
   </p:timing>
+  <p:hf hdr="0" ftr="0"/>
   <p:txStyles>
     <p:titleStyle>
       <a:lvl1pPr algn="ctr" defTabSz="914400" rtl="0" eaLnBrk="1" latinLnBrk="0" hangingPunct="1">
@@ -2902,7 +3262,7 @@
         <a:buNone/>
         <a:defRPr sz="4400" kern="1200">
           <a:solidFill>
-            <a:schemeClr val="tx1"/>
+            <a:schemeClr val="accent6"/>
           </a:solidFill>
           <a:effectLst>
             <a:outerShdw blurRad="63500" dist="50800" algn="l" rotWithShape="0">
@@ -3247,7 +3607,15 @@
           <a:bodyPr/>
           <a:lstStyle/>
           <a:p>
-            <a:endParaRPr lang="sv-SE"/>
+            <a:r>
+              <a:rPr lang="sv-SE" dirty="0" err="1" smtClean="0"/>
+              <a:t>Deferred</a:t>
+            </a:r>
+            <a:r>
+              <a:rPr lang="sv-SE" dirty="0" smtClean="0"/>
+              <a:t> Rendering</a:t>
+            </a:r>
+            <a:endParaRPr lang="sv-SE" dirty="0"/>
           </a:p>
         </p:txBody>
       </p:sp>
@@ -3274,6 +3642,1510 @@
     <p:extLst>
       <p:ext uri="{BB962C8B-B14F-4D97-AF65-F5344CB8AC3E}">
         <p14:creationId xmlns:p14="http://schemas.microsoft.com/office/powerpoint/2010/main" val="4279114898"/>
+      </p:ext>
+    </p:extLst>
+  </p:cSld>
+  <p:clrMapOvr>
+    <a:masterClrMapping/>
+  </p:clrMapOvr>
+  <mc:AlternateContent xmlns:mc="http://schemas.openxmlformats.org/markup-compatibility/2006">
+    <mc:Choice xmlns:p14="http://schemas.microsoft.com/office/powerpoint/2010/main" Requires="p14">
+      <p:transition spd="slow" p14:dur="2000"/>
+    </mc:Choice>
+    <mc:Fallback>
+      <p:transition spd="slow"/>
+    </mc:Fallback>
+  </mc:AlternateContent>
+  <p:timing>
+    <p:tnLst>
+      <p:par>
+        <p:cTn id="1" dur="indefinite" restart="never" nodeType="tmRoot"/>
+      </p:par>
+    </p:tnLst>
+  </p:timing>
+</p:sld>
+</file>
+
+<file path=ppt/slides/slide2.xml><?xml version="1.0" encoding="utf-8"?>
+<p:sld xmlns:a="http://schemas.openxmlformats.org/drawingml/2006/main" xmlns:r="http://schemas.openxmlformats.org/officeDocument/2006/relationships" xmlns:p="http://schemas.openxmlformats.org/presentationml/2006/main">
+  <p:cSld>
+    <p:spTree>
+      <p:nvGrpSpPr>
+        <p:cNvPr id="1" name=""/>
+        <p:cNvGrpSpPr/>
+        <p:nvPr/>
+      </p:nvGrpSpPr>
+      <p:grpSpPr>
+        <a:xfrm>
+          <a:off x="0" y="0"/>
+          <a:ext cx="0" cy="0"/>
+          <a:chOff x="0" y="0"/>
+          <a:chExt cx="0" cy="0"/>
+        </a:xfrm>
+      </p:grpSpPr>
+      <p:sp>
+        <p:nvSpPr>
+          <p:cNvPr id="2" name="Rubrik 1"/>
+          <p:cNvSpPr>
+            <a:spLocks noGrp="1"/>
+          </p:cNvSpPr>
+          <p:nvPr>
+            <p:ph type="title"/>
+          </p:nvPr>
+        </p:nvSpPr>
+        <p:spPr/>
+        <p:txBody>
+          <a:bodyPr/>
+          <a:lstStyle/>
+          <a:p>
+            <a:r>
+              <a:rPr lang="sv-SE" dirty="0" err="1" smtClean="0"/>
+              <a:t>What</a:t>
+            </a:r>
+            <a:r>
+              <a:rPr lang="sv-SE" dirty="0" smtClean="0"/>
+              <a:t> is </a:t>
+            </a:r>
+            <a:r>
+              <a:rPr lang="sv-SE" dirty="0" err="1" smtClean="0"/>
+              <a:t>deferred</a:t>
+            </a:r>
+            <a:r>
+              <a:rPr lang="sv-SE" dirty="0" smtClean="0"/>
+              <a:t> rendering?</a:t>
+            </a:r>
+            <a:endParaRPr lang="sv-SE" dirty="0"/>
+          </a:p>
+        </p:txBody>
+      </p:sp>
+      <p:sp>
+        <p:nvSpPr>
+          <p:cNvPr id="3" name="Platshållare för innehåll 2"/>
+          <p:cNvSpPr>
+            <a:spLocks noGrp="1"/>
+          </p:cNvSpPr>
+          <p:nvPr>
+            <p:ph idx="1"/>
+          </p:nvPr>
+        </p:nvSpPr>
+        <p:spPr/>
+        <p:txBody>
+          <a:bodyPr/>
+          <a:lstStyle/>
+          <a:p>
+            <a:r>
+              <a:rPr lang="sv-SE" dirty="0" err="1" smtClean="0"/>
+              <a:t>Deferred</a:t>
+            </a:r>
+            <a:r>
+              <a:rPr lang="sv-SE" dirty="0" smtClean="0"/>
+              <a:t> </a:t>
+            </a:r>
+            <a:r>
+              <a:rPr lang="sv-SE" dirty="0" err="1" smtClean="0"/>
+              <a:t>lighting</a:t>
+            </a:r>
+            <a:r>
+              <a:rPr lang="sv-SE" dirty="0" smtClean="0"/>
+              <a:t>/</a:t>
+            </a:r>
+            <a:r>
+              <a:rPr lang="sv-SE" dirty="0" err="1" smtClean="0"/>
+              <a:t>shading</a:t>
+            </a:r>
+            <a:r>
+              <a:rPr lang="sv-SE" dirty="0" smtClean="0"/>
+              <a:t>/rendering</a:t>
+            </a:r>
+            <a:br>
+              <a:rPr lang="sv-SE" dirty="0" smtClean="0"/>
+            </a:br>
+            <a:endParaRPr lang="sv-SE" dirty="0" smtClean="0"/>
+          </a:p>
+          <a:p>
+            <a:r>
+              <a:rPr lang="sv-SE" dirty="0" smtClean="0"/>
+              <a:t>Multi-pass rendering</a:t>
+            </a:r>
+            <a:br>
+              <a:rPr lang="sv-SE" dirty="0" smtClean="0"/>
+            </a:br>
+            <a:endParaRPr lang="sv-SE" dirty="0" smtClean="0"/>
+          </a:p>
+          <a:p>
+            <a:r>
+              <a:rPr lang="sv-SE" dirty="0" err="1" smtClean="0"/>
+              <a:t>Key</a:t>
+            </a:r>
+            <a:r>
+              <a:rPr lang="sv-SE" dirty="0" smtClean="0"/>
+              <a:t> </a:t>
+            </a:r>
+            <a:r>
+              <a:rPr lang="sv-SE" dirty="0" err="1" smtClean="0"/>
+              <a:t>idea</a:t>
+            </a:r>
+            <a:r>
+              <a:rPr lang="sv-SE" dirty="0" smtClean="0"/>
+              <a:t> is </a:t>
+            </a:r>
+            <a:r>
+              <a:rPr lang="sv-SE" dirty="0" err="1" smtClean="0"/>
+              <a:t>to</a:t>
+            </a:r>
+            <a:r>
+              <a:rPr lang="sv-SE" dirty="0" smtClean="0"/>
+              <a:t> </a:t>
+            </a:r>
+            <a:r>
+              <a:rPr lang="sv-SE" dirty="0" err="1" smtClean="0"/>
+              <a:t>flatten</a:t>
+            </a:r>
+            <a:r>
+              <a:rPr lang="sv-SE" dirty="0" smtClean="0"/>
+              <a:t> </a:t>
+            </a:r>
+            <a:r>
+              <a:rPr lang="sv-SE" dirty="0" err="1" smtClean="0"/>
+              <a:t>out</a:t>
+            </a:r>
+            <a:r>
+              <a:rPr lang="sv-SE" dirty="0" smtClean="0"/>
+              <a:t> </a:t>
+            </a:r>
+            <a:r>
+              <a:rPr lang="sv-SE" dirty="0" err="1" smtClean="0"/>
+              <a:t>geometry</a:t>
+            </a:r>
+            <a:r>
+              <a:rPr lang="sv-SE" dirty="0" smtClean="0"/>
+              <a:t/>
+            </a:r>
+            <a:br>
+              <a:rPr lang="sv-SE" dirty="0" smtClean="0"/>
+            </a:br>
+            <a:endParaRPr lang="sv-SE" dirty="0" smtClean="0"/>
+          </a:p>
+          <a:p>
+            <a:endParaRPr lang="sv-SE" dirty="0"/>
+          </a:p>
+        </p:txBody>
+      </p:sp>
+      <p:sp>
+        <p:nvSpPr>
+          <p:cNvPr id="4" name="Platshållare för datum 3"/>
+          <p:cNvSpPr>
+            <a:spLocks noGrp="1"/>
+          </p:cNvSpPr>
+          <p:nvPr>
+            <p:ph type="dt" sz="half" idx="10"/>
+          </p:nvPr>
+        </p:nvSpPr>
+        <p:spPr/>
+        <p:txBody>
+          <a:bodyPr/>
+          <a:lstStyle/>
+          <a:p>
+            <a:fld id="{637124F9-74EC-4A1F-82AA-07908676A841}" type="datetime1">
+              <a:rPr lang="sv-SE" smtClean="0"/>
+              <a:t>2011-05-26</a:t>
+            </a:fld>
+            <a:endParaRPr lang="sv-SE"/>
+          </a:p>
+        </p:txBody>
+      </p:sp>
+      <p:sp>
+        <p:nvSpPr>
+          <p:cNvPr id="5" name="Platshållare för bildnummer 4"/>
+          <p:cNvSpPr>
+            <a:spLocks noGrp="1"/>
+          </p:cNvSpPr>
+          <p:nvPr>
+            <p:ph type="sldNum" sz="quarter" idx="12"/>
+          </p:nvPr>
+        </p:nvSpPr>
+        <p:spPr/>
+        <p:txBody>
+          <a:bodyPr/>
+          <a:lstStyle/>
+          <a:p>
+            <a:fld id="{87B9E5C0-0A56-4BE6-BE7D-E6FF370B7540}" type="slidenum">
+              <a:rPr lang="sv-SE" smtClean="0"/>
+              <a:t>2</a:t>
+            </a:fld>
+            <a:endParaRPr lang="sv-SE"/>
+          </a:p>
+        </p:txBody>
+      </p:sp>
+    </p:spTree>
+    <p:extLst>
+      <p:ext uri="{BB962C8B-B14F-4D97-AF65-F5344CB8AC3E}">
+        <p14:creationId xmlns:p14="http://schemas.microsoft.com/office/powerpoint/2010/main" val="3777957661"/>
+      </p:ext>
+    </p:extLst>
+  </p:cSld>
+  <p:clrMapOvr>
+    <a:masterClrMapping/>
+  </p:clrMapOvr>
+  <p:timing>
+    <p:tnLst>
+      <p:par>
+        <p:cTn id="1" dur="indefinite" restart="never" nodeType="tmRoot"/>
+      </p:par>
+    </p:tnLst>
+  </p:timing>
+</p:sld>
+</file>
+
+<file path=ppt/slides/slide3.xml><?xml version="1.0" encoding="utf-8"?>
+<p:sld xmlns:a="http://schemas.openxmlformats.org/drawingml/2006/main" xmlns:r="http://schemas.openxmlformats.org/officeDocument/2006/relationships" xmlns:p="http://schemas.openxmlformats.org/presentationml/2006/main">
+  <p:cSld>
+    <p:spTree>
+      <p:nvGrpSpPr>
+        <p:cNvPr id="1" name=""/>
+        <p:cNvGrpSpPr/>
+        <p:nvPr/>
+      </p:nvGrpSpPr>
+      <p:grpSpPr>
+        <a:xfrm>
+          <a:off x="0" y="0"/>
+          <a:ext cx="0" cy="0"/>
+          <a:chOff x="0" y="0"/>
+          <a:chExt cx="0" cy="0"/>
+        </a:xfrm>
+      </p:grpSpPr>
+      <p:sp>
+        <p:nvSpPr>
+          <p:cNvPr id="2" name="Rubrik 1"/>
+          <p:cNvSpPr>
+            <a:spLocks noGrp="1"/>
+          </p:cNvSpPr>
+          <p:nvPr>
+            <p:ph type="title"/>
+          </p:nvPr>
+        </p:nvSpPr>
+        <p:spPr/>
+        <p:txBody>
+          <a:bodyPr/>
+          <a:lstStyle/>
+          <a:p>
+            <a:r>
+              <a:rPr lang="sv-SE" dirty="0" err="1" smtClean="0"/>
+              <a:t>Why</a:t>
+            </a:r>
+            <a:r>
+              <a:rPr lang="sv-SE" dirty="0" smtClean="0"/>
+              <a:t> </a:t>
+            </a:r>
+            <a:r>
+              <a:rPr lang="sv-SE" dirty="0" err="1" smtClean="0"/>
+              <a:t>deferred</a:t>
+            </a:r>
+            <a:r>
+              <a:rPr lang="sv-SE" dirty="0" smtClean="0"/>
+              <a:t> rendering?</a:t>
+            </a:r>
+            <a:endParaRPr lang="sv-SE" dirty="0"/>
+          </a:p>
+        </p:txBody>
+      </p:sp>
+      <p:sp>
+        <p:nvSpPr>
+          <p:cNvPr id="3" name="Platshållare för innehåll 2"/>
+          <p:cNvSpPr>
+            <a:spLocks noGrp="1"/>
+          </p:cNvSpPr>
+          <p:nvPr>
+            <p:ph idx="1"/>
+          </p:nvPr>
+        </p:nvSpPr>
+        <p:spPr>
+          <a:xfrm>
+            <a:off x="457200" y="1600200"/>
+            <a:ext cx="8229600" cy="4205063"/>
+          </a:xfrm>
+        </p:spPr>
+        <p:txBody>
+          <a:bodyPr>
+            <a:normAutofit/>
+          </a:bodyPr>
+          <a:lstStyle/>
+          <a:p>
+            <a:r>
+              <a:rPr lang="sv-SE" dirty="0" smtClean="0"/>
+              <a:t>Complex </a:t>
+            </a:r>
+            <a:r>
+              <a:rPr lang="sv-SE" dirty="0" err="1" smtClean="0"/>
+              <a:t>scenes</a:t>
+            </a:r>
+            <a:r>
+              <a:rPr lang="sv-SE" dirty="0" smtClean="0"/>
+              <a:t> </a:t>
+            </a:r>
+            <a:r>
+              <a:rPr lang="sv-SE" dirty="0" err="1" smtClean="0"/>
+              <a:t>with</a:t>
+            </a:r>
+            <a:r>
+              <a:rPr lang="sv-SE" dirty="0" smtClean="0"/>
+              <a:t> a </a:t>
+            </a:r>
+            <a:r>
+              <a:rPr lang="sv-SE" dirty="0" err="1" smtClean="0"/>
+              <a:t>lot</a:t>
+            </a:r>
+            <a:r>
+              <a:rPr lang="sv-SE" dirty="0" smtClean="0"/>
+              <a:t> </a:t>
+            </a:r>
+            <a:r>
+              <a:rPr lang="sv-SE" dirty="0" err="1" smtClean="0"/>
+              <a:t>of</a:t>
+            </a:r>
+            <a:r>
+              <a:rPr lang="sv-SE" dirty="0" smtClean="0"/>
+              <a:t> </a:t>
+            </a:r>
+            <a:r>
+              <a:rPr lang="sv-SE" dirty="0" err="1" smtClean="0"/>
+              <a:t>lights</a:t>
+            </a:r>
+            <a:r>
+              <a:rPr lang="sv-SE" dirty="0" smtClean="0"/>
+              <a:t> </a:t>
+            </a:r>
+            <a:r>
+              <a:rPr lang="sv-SE" dirty="0" err="1" smtClean="0"/>
+              <a:t>more</a:t>
+            </a:r>
+            <a:r>
+              <a:rPr lang="sv-SE" dirty="0" smtClean="0"/>
+              <a:t> common</a:t>
+            </a:r>
+            <a:br>
+              <a:rPr lang="sv-SE" dirty="0" smtClean="0"/>
+            </a:br>
+            <a:endParaRPr lang="sv-SE" dirty="0" smtClean="0"/>
+          </a:p>
+          <a:p>
+            <a:r>
+              <a:rPr lang="sv-SE" dirty="0" err="1" smtClean="0"/>
+              <a:t>Number</a:t>
+            </a:r>
+            <a:r>
+              <a:rPr lang="sv-SE" dirty="0" smtClean="0"/>
+              <a:t> </a:t>
+            </a:r>
+            <a:r>
+              <a:rPr lang="sv-SE" dirty="0" err="1" smtClean="0"/>
+              <a:t>of</a:t>
+            </a:r>
+            <a:r>
+              <a:rPr lang="sv-SE" dirty="0" smtClean="0"/>
+              <a:t> </a:t>
+            </a:r>
+            <a:r>
+              <a:rPr lang="sv-SE" dirty="0" err="1" smtClean="0"/>
+              <a:t>objects</a:t>
+            </a:r>
+            <a:r>
+              <a:rPr lang="sv-SE" dirty="0" smtClean="0"/>
+              <a:t> + </a:t>
+            </a:r>
+            <a:r>
+              <a:rPr lang="sv-SE" dirty="0" err="1" smtClean="0"/>
+              <a:t>Number</a:t>
+            </a:r>
+            <a:r>
+              <a:rPr lang="sv-SE" dirty="0" smtClean="0"/>
+              <a:t> </a:t>
+            </a:r>
+            <a:r>
+              <a:rPr lang="sv-SE" dirty="0" err="1" smtClean="0"/>
+              <a:t>of</a:t>
+            </a:r>
+            <a:r>
+              <a:rPr lang="sv-SE" dirty="0" smtClean="0"/>
+              <a:t> </a:t>
+            </a:r>
+            <a:r>
+              <a:rPr lang="sv-SE" dirty="0" err="1" smtClean="0"/>
+              <a:t>lights</a:t>
+            </a:r>
+            <a:r>
+              <a:rPr lang="sv-SE" dirty="0" smtClean="0"/>
+              <a:t/>
+            </a:r>
+            <a:br>
+              <a:rPr lang="sv-SE" dirty="0" smtClean="0"/>
+            </a:br>
+            <a:endParaRPr lang="sv-SE" dirty="0" smtClean="0"/>
+          </a:p>
+          <a:p>
+            <a:r>
+              <a:rPr lang="sv-SE" dirty="0" smtClean="0"/>
+              <a:t>Do </a:t>
+            </a:r>
+            <a:r>
+              <a:rPr lang="sv-SE" dirty="0" err="1" smtClean="0"/>
+              <a:t>lighting</a:t>
+            </a:r>
+            <a:r>
+              <a:rPr lang="sv-SE" dirty="0" smtClean="0"/>
+              <a:t> </a:t>
+            </a:r>
+            <a:r>
+              <a:rPr lang="sv-SE" dirty="0" err="1" smtClean="0"/>
+              <a:t>calculations</a:t>
+            </a:r>
+            <a:r>
+              <a:rPr lang="sv-SE" dirty="0" smtClean="0"/>
+              <a:t> in </a:t>
+            </a:r>
+            <a:r>
+              <a:rPr lang="sv-SE" dirty="0" err="1" smtClean="0"/>
+              <a:t>screen</a:t>
+            </a:r>
+            <a:r>
+              <a:rPr lang="sv-SE" dirty="0" smtClean="0"/>
+              <a:t> space</a:t>
+            </a:r>
+            <a:endParaRPr lang="sv-SE" dirty="0"/>
+          </a:p>
+        </p:txBody>
+      </p:sp>
+      <p:sp>
+        <p:nvSpPr>
+          <p:cNvPr id="4" name="Platshållare för datum 3"/>
+          <p:cNvSpPr>
+            <a:spLocks noGrp="1"/>
+          </p:cNvSpPr>
+          <p:nvPr>
+            <p:ph type="dt" sz="half" idx="10"/>
+          </p:nvPr>
+        </p:nvSpPr>
+        <p:spPr/>
+        <p:txBody>
+          <a:bodyPr/>
+          <a:lstStyle/>
+          <a:p>
+            <a:fld id="{637124F9-74EC-4A1F-82AA-07908676A841}" type="datetime1">
+              <a:rPr lang="sv-SE" smtClean="0"/>
+              <a:t>2011-05-26</a:t>
+            </a:fld>
+            <a:endParaRPr lang="sv-SE"/>
+          </a:p>
+        </p:txBody>
+      </p:sp>
+      <p:sp>
+        <p:nvSpPr>
+          <p:cNvPr id="5" name="Platshållare för bildnummer 4"/>
+          <p:cNvSpPr>
+            <a:spLocks noGrp="1"/>
+          </p:cNvSpPr>
+          <p:nvPr>
+            <p:ph type="sldNum" sz="quarter" idx="12"/>
+          </p:nvPr>
+        </p:nvSpPr>
+        <p:spPr/>
+        <p:txBody>
+          <a:bodyPr/>
+          <a:lstStyle/>
+          <a:p>
+            <a:fld id="{87B9E5C0-0A56-4BE6-BE7D-E6FF370B7540}" type="slidenum">
+              <a:rPr lang="sv-SE" smtClean="0"/>
+              <a:t>3</a:t>
+            </a:fld>
+            <a:endParaRPr lang="sv-SE"/>
+          </a:p>
+        </p:txBody>
+      </p:sp>
+    </p:spTree>
+    <p:extLst>
+      <p:ext uri="{BB962C8B-B14F-4D97-AF65-F5344CB8AC3E}">
+        <p14:creationId xmlns:p14="http://schemas.microsoft.com/office/powerpoint/2010/main" val="3535736917"/>
+      </p:ext>
+    </p:extLst>
+  </p:cSld>
+  <p:clrMapOvr>
+    <a:masterClrMapping/>
+  </p:clrMapOvr>
+  <p:timing>
+    <p:tnLst>
+      <p:par>
+        <p:cTn id="1" dur="indefinite" restart="never" nodeType="tmRoot"/>
+      </p:par>
+    </p:tnLst>
+  </p:timing>
+</p:sld>
+</file>
+
+<file path=ppt/slides/slide4.xml><?xml version="1.0" encoding="utf-8"?>
+<p:sld xmlns:a="http://schemas.openxmlformats.org/drawingml/2006/main" xmlns:r="http://schemas.openxmlformats.org/officeDocument/2006/relationships" xmlns:p="http://schemas.openxmlformats.org/presentationml/2006/main">
+  <p:cSld>
+    <p:spTree>
+      <p:nvGrpSpPr>
+        <p:cNvPr id="1" name=""/>
+        <p:cNvGrpSpPr/>
+        <p:nvPr/>
+      </p:nvGrpSpPr>
+      <p:grpSpPr>
+        <a:xfrm>
+          <a:off x="0" y="0"/>
+          <a:ext cx="0" cy="0"/>
+          <a:chOff x="0" y="0"/>
+          <a:chExt cx="0" cy="0"/>
+        </a:xfrm>
+      </p:grpSpPr>
+      <p:sp>
+        <p:nvSpPr>
+          <p:cNvPr id="2" name="Rubrik 1"/>
+          <p:cNvSpPr>
+            <a:spLocks noGrp="1"/>
+          </p:cNvSpPr>
+          <p:nvPr>
+            <p:ph type="title"/>
+          </p:nvPr>
+        </p:nvSpPr>
+        <p:spPr/>
+        <p:txBody>
+          <a:bodyPr/>
+          <a:lstStyle/>
+          <a:p>
+            <a:r>
+              <a:rPr lang="sv-SE" dirty="0" smtClean="0"/>
+              <a:t>Main steps</a:t>
+            </a:r>
+            <a:endParaRPr lang="sv-SE" dirty="0"/>
+          </a:p>
+        </p:txBody>
+      </p:sp>
+      <p:sp>
+        <p:nvSpPr>
+          <p:cNvPr id="3" name="Platshållare för innehåll 2"/>
+          <p:cNvSpPr>
+            <a:spLocks noGrp="1"/>
+          </p:cNvSpPr>
+          <p:nvPr>
+            <p:ph idx="1"/>
+          </p:nvPr>
+        </p:nvSpPr>
+        <p:spPr/>
+        <p:txBody>
+          <a:bodyPr/>
+          <a:lstStyle/>
+          <a:p>
+            <a:r>
+              <a:rPr lang="sv-SE" dirty="0" err="1" smtClean="0"/>
+              <a:t>Render</a:t>
+            </a:r>
+            <a:r>
+              <a:rPr lang="sv-SE" dirty="0" smtClean="0"/>
+              <a:t> </a:t>
+            </a:r>
+            <a:r>
+              <a:rPr lang="sv-SE" dirty="0" err="1" smtClean="0"/>
+              <a:t>geometry</a:t>
+            </a:r>
+            <a:r>
+              <a:rPr lang="sv-SE" dirty="0" smtClean="0"/>
+              <a:t> </a:t>
+            </a:r>
+            <a:r>
+              <a:rPr lang="sv-SE" dirty="0" err="1" smtClean="0"/>
+              <a:t>to</a:t>
+            </a:r>
+            <a:r>
+              <a:rPr lang="sv-SE" dirty="0" smtClean="0"/>
+              <a:t> G-</a:t>
+            </a:r>
+            <a:r>
+              <a:rPr lang="sv-SE" dirty="0" err="1" smtClean="0"/>
+              <a:t>buffer</a:t>
+            </a:r>
+            <a:r>
+              <a:rPr lang="sv-SE" dirty="0" smtClean="0"/>
+              <a:t/>
+            </a:r>
+            <a:br>
+              <a:rPr lang="sv-SE" dirty="0" smtClean="0"/>
+            </a:br>
+            <a:endParaRPr lang="sv-SE" dirty="0" smtClean="0"/>
+          </a:p>
+          <a:p>
+            <a:r>
+              <a:rPr lang="sv-SE" dirty="0" err="1" smtClean="0"/>
+              <a:t>Perform</a:t>
+            </a:r>
+            <a:r>
+              <a:rPr lang="sv-SE" dirty="0" smtClean="0"/>
+              <a:t> </a:t>
+            </a:r>
+            <a:r>
+              <a:rPr lang="sv-SE" dirty="0" err="1" smtClean="0"/>
+              <a:t>lighting</a:t>
+            </a:r>
+            <a:r>
+              <a:rPr lang="sv-SE" dirty="0" smtClean="0"/>
+              <a:t> </a:t>
+            </a:r>
+            <a:r>
+              <a:rPr lang="sv-SE" dirty="0" err="1" smtClean="0"/>
+              <a:t>stage</a:t>
+            </a:r>
+            <a:r>
+              <a:rPr lang="sv-SE" dirty="0" smtClean="0"/>
+              <a:t/>
+            </a:r>
+            <a:br>
+              <a:rPr lang="sv-SE" dirty="0" smtClean="0"/>
+            </a:br>
+            <a:endParaRPr lang="sv-SE" dirty="0" smtClean="0"/>
+          </a:p>
+          <a:p>
+            <a:r>
+              <a:rPr lang="sv-SE" dirty="0" smtClean="0"/>
+              <a:t>Post-</a:t>
+            </a:r>
+            <a:r>
+              <a:rPr lang="sv-SE" dirty="0" err="1" smtClean="0"/>
+              <a:t>processing</a:t>
+            </a:r>
+            <a:endParaRPr lang="sv-SE" dirty="0"/>
+          </a:p>
+        </p:txBody>
+      </p:sp>
+      <p:sp>
+        <p:nvSpPr>
+          <p:cNvPr id="4" name="Platshållare för datum 3"/>
+          <p:cNvSpPr>
+            <a:spLocks noGrp="1"/>
+          </p:cNvSpPr>
+          <p:nvPr>
+            <p:ph type="dt" sz="half" idx="10"/>
+          </p:nvPr>
+        </p:nvSpPr>
+        <p:spPr/>
+        <p:txBody>
+          <a:bodyPr/>
+          <a:lstStyle/>
+          <a:p>
+            <a:fld id="{637124F9-74EC-4A1F-82AA-07908676A841}" type="datetime1">
+              <a:rPr lang="sv-SE" smtClean="0"/>
+              <a:t>2011-05-26</a:t>
+            </a:fld>
+            <a:endParaRPr lang="sv-SE"/>
+          </a:p>
+        </p:txBody>
+      </p:sp>
+      <p:sp>
+        <p:nvSpPr>
+          <p:cNvPr id="5" name="Platshållare för bildnummer 4"/>
+          <p:cNvSpPr>
+            <a:spLocks noGrp="1"/>
+          </p:cNvSpPr>
+          <p:nvPr>
+            <p:ph type="sldNum" sz="quarter" idx="12"/>
+          </p:nvPr>
+        </p:nvSpPr>
+        <p:spPr/>
+        <p:txBody>
+          <a:bodyPr/>
+          <a:lstStyle/>
+          <a:p>
+            <a:fld id="{87B9E5C0-0A56-4BE6-BE7D-E6FF370B7540}" type="slidenum">
+              <a:rPr lang="sv-SE" smtClean="0"/>
+              <a:t>4</a:t>
+            </a:fld>
+            <a:endParaRPr lang="sv-SE"/>
+          </a:p>
+        </p:txBody>
+      </p:sp>
+    </p:spTree>
+    <p:extLst>
+      <p:ext uri="{BB962C8B-B14F-4D97-AF65-F5344CB8AC3E}">
+        <p14:creationId xmlns:p14="http://schemas.microsoft.com/office/powerpoint/2010/main" val="3195134059"/>
+      </p:ext>
+    </p:extLst>
+  </p:cSld>
+  <p:clrMapOvr>
+    <a:masterClrMapping/>
+  </p:clrMapOvr>
+  <p:timing>
+    <p:tnLst>
+      <p:par>
+        <p:cTn id="1" dur="indefinite" restart="never" nodeType="tmRoot"/>
+      </p:par>
+    </p:tnLst>
+  </p:timing>
+</p:sld>
+</file>
+
+<file path=ppt/slides/slide5.xml><?xml version="1.0" encoding="utf-8"?>
+<p:sld xmlns:a="http://schemas.openxmlformats.org/drawingml/2006/main" xmlns:r="http://schemas.openxmlformats.org/officeDocument/2006/relationships" xmlns:p="http://schemas.openxmlformats.org/presentationml/2006/main">
+  <p:cSld>
+    <p:spTree>
+      <p:nvGrpSpPr>
+        <p:cNvPr id="1" name=""/>
+        <p:cNvGrpSpPr/>
+        <p:nvPr/>
+      </p:nvGrpSpPr>
+      <p:grpSpPr>
+        <a:xfrm>
+          <a:off x="0" y="0"/>
+          <a:ext cx="0" cy="0"/>
+          <a:chOff x="0" y="0"/>
+          <a:chExt cx="0" cy="0"/>
+        </a:xfrm>
+      </p:grpSpPr>
+      <p:sp>
+        <p:nvSpPr>
+          <p:cNvPr id="2" name="Rubrik 1"/>
+          <p:cNvSpPr>
+            <a:spLocks noGrp="1"/>
+          </p:cNvSpPr>
+          <p:nvPr>
+            <p:ph type="title"/>
+          </p:nvPr>
+        </p:nvSpPr>
+        <p:spPr/>
+        <p:txBody>
+          <a:bodyPr/>
+          <a:lstStyle/>
+          <a:p>
+            <a:r>
+              <a:rPr lang="sv-SE" dirty="0" smtClean="0"/>
+              <a:t>The G-</a:t>
+            </a:r>
+            <a:r>
+              <a:rPr lang="sv-SE" dirty="0" err="1" smtClean="0"/>
+              <a:t>buffer</a:t>
+            </a:r>
+            <a:endParaRPr lang="sv-SE" dirty="0"/>
+          </a:p>
+        </p:txBody>
+      </p:sp>
+      <p:sp>
+        <p:nvSpPr>
+          <p:cNvPr id="3" name="Platshållare för innehåll 2"/>
+          <p:cNvSpPr>
+            <a:spLocks noGrp="1"/>
+          </p:cNvSpPr>
+          <p:nvPr>
+            <p:ph idx="1"/>
+          </p:nvPr>
+        </p:nvSpPr>
+        <p:spPr>
+          <a:xfrm>
+            <a:off x="457200" y="1600201"/>
+            <a:ext cx="8229600" cy="1684784"/>
+          </a:xfrm>
+        </p:spPr>
+        <p:txBody>
+          <a:bodyPr/>
+          <a:lstStyle/>
+          <a:p>
+            <a:r>
+              <a:rPr lang="sv-SE" dirty="0" smtClean="0"/>
+              <a:t>Three R16G16B16A16F </a:t>
+            </a:r>
+            <a:r>
+              <a:rPr lang="sv-SE" dirty="0" err="1" smtClean="0"/>
+              <a:t>textures</a:t>
+            </a:r>
+            <a:r>
+              <a:rPr lang="sv-SE" dirty="0" smtClean="0"/>
+              <a:t/>
+            </a:r>
+            <a:br>
+              <a:rPr lang="sv-SE" dirty="0" smtClean="0"/>
+            </a:br>
+            <a:endParaRPr lang="sv-SE" dirty="0" smtClean="0"/>
+          </a:p>
+          <a:p>
+            <a:r>
+              <a:rPr lang="sv-SE" dirty="0" smtClean="0"/>
+              <a:t>Layout:</a:t>
+            </a:r>
+            <a:endParaRPr lang="sv-SE" dirty="0"/>
+          </a:p>
+        </p:txBody>
+      </p:sp>
+      <p:sp>
+        <p:nvSpPr>
+          <p:cNvPr id="4" name="Platshållare för datum 3"/>
+          <p:cNvSpPr>
+            <a:spLocks noGrp="1"/>
+          </p:cNvSpPr>
+          <p:nvPr>
+            <p:ph type="dt" sz="half" idx="10"/>
+          </p:nvPr>
+        </p:nvSpPr>
+        <p:spPr/>
+        <p:txBody>
+          <a:bodyPr/>
+          <a:lstStyle/>
+          <a:p>
+            <a:fld id="{637124F9-74EC-4A1F-82AA-07908676A841}" type="datetime1">
+              <a:rPr lang="sv-SE" smtClean="0"/>
+              <a:t>2011-05-26</a:t>
+            </a:fld>
+            <a:endParaRPr lang="sv-SE"/>
+          </a:p>
+        </p:txBody>
+      </p:sp>
+      <p:sp>
+        <p:nvSpPr>
+          <p:cNvPr id="5" name="Platshållare för bildnummer 4"/>
+          <p:cNvSpPr>
+            <a:spLocks noGrp="1"/>
+          </p:cNvSpPr>
+          <p:nvPr>
+            <p:ph type="sldNum" sz="quarter" idx="12"/>
+          </p:nvPr>
+        </p:nvSpPr>
+        <p:spPr/>
+        <p:txBody>
+          <a:bodyPr/>
+          <a:lstStyle/>
+          <a:p>
+            <a:fld id="{87B9E5C0-0A56-4BE6-BE7D-E6FF370B7540}" type="slidenum">
+              <a:rPr lang="sv-SE" smtClean="0"/>
+              <a:t>5</a:t>
+            </a:fld>
+            <a:endParaRPr lang="sv-SE"/>
+          </a:p>
+        </p:txBody>
+      </p:sp>
+      <p:graphicFrame>
+        <p:nvGraphicFramePr>
+          <p:cNvPr id="6" name="Tabell 5"/>
+          <p:cNvGraphicFramePr>
+            <a:graphicFrameLocks noGrp="1"/>
+          </p:cNvGraphicFramePr>
+          <p:nvPr>
+            <p:extLst>
+              <p:ext uri="{D42A27DB-BD31-4B8C-83A1-F6EECF244321}">
+                <p14:modId xmlns:p14="http://schemas.microsoft.com/office/powerpoint/2010/main" val="1695474757"/>
+              </p:ext>
+            </p:extLst>
+          </p:nvPr>
+        </p:nvGraphicFramePr>
+        <p:xfrm>
+          <a:off x="323528" y="3717032"/>
+          <a:ext cx="8352927" cy="1483360"/>
+        </p:xfrm>
+        <a:graphic>
+          <a:graphicData uri="http://schemas.openxmlformats.org/drawingml/2006/table">
+            <a:tbl>
+              <a:tblPr firstRow="1" bandRow="1">
+                <a:tableStyleId>{93296810-A885-4BE3-A3E7-6D5BEEA58F35}</a:tableStyleId>
+              </a:tblPr>
+              <a:tblGrid>
+                <a:gridCol w="2013652"/>
+                <a:gridCol w="2013652"/>
+                <a:gridCol w="2013652"/>
+                <a:gridCol w="2311971"/>
+              </a:tblGrid>
+              <a:tr h="370840">
+                <a:tc>
+                  <a:txBody>
+                    <a:bodyPr/>
+                    <a:lstStyle/>
+                    <a:p>
+                      <a:r>
+                        <a:rPr lang="sv-SE" dirty="0" smtClean="0"/>
+                        <a:t>R</a:t>
+                      </a:r>
+                      <a:endParaRPr lang="sv-SE" dirty="0"/>
+                    </a:p>
+                  </a:txBody>
+                  <a:tcPr/>
+                </a:tc>
+                <a:tc>
+                  <a:txBody>
+                    <a:bodyPr/>
+                    <a:lstStyle/>
+                    <a:p>
+                      <a:r>
+                        <a:rPr lang="sv-SE" dirty="0" smtClean="0"/>
+                        <a:t>G</a:t>
+                      </a:r>
+                      <a:endParaRPr lang="sv-SE" dirty="0"/>
+                    </a:p>
+                  </a:txBody>
+                  <a:tcPr/>
+                </a:tc>
+                <a:tc>
+                  <a:txBody>
+                    <a:bodyPr/>
+                    <a:lstStyle/>
+                    <a:p>
+                      <a:r>
+                        <a:rPr lang="sv-SE" dirty="0" smtClean="0"/>
+                        <a:t>B</a:t>
+                      </a:r>
+                      <a:endParaRPr lang="sv-SE" dirty="0"/>
+                    </a:p>
+                  </a:txBody>
+                  <a:tcPr/>
+                </a:tc>
+                <a:tc>
+                  <a:txBody>
+                    <a:bodyPr/>
+                    <a:lstStyle/>
+                    <a:p>
+                      <a:r>
+                        <a:rPr lang="sv-SE" dirty="0" smtClean="0"/>
+                        <a:t>A</a:t>
+                      </a:r>
+                      <a:endParaRPr lang="sv-SE" dirty="0"/>
+                    </a:p>
+                  </a:txBody>
+                  <a:tcPr/>
+                </a:tc>
+              </a:tr>
+              <a:tr h="370840">
+                <a:tc>
+                  <a:txBody>
+                    <a:bodyPr/>
+                    <a:lstStyle/>
+                    <a:p>
+                      <a:r>
+                        <a:rPr lang="sv-SE" dirty="0" err="1" smtClean="0"/>
+                        <a:t>Normal.x</a:t>
+                      </a:r>
+                      <a:endParaRPr lang="sv-SE" dirty="0"/>
+                    </a:p>
+                  </a:txBody>
+                  <a:tcPr/>
+                </a:tc>
+                <a:tc>
+                  <a:txBody>
+                    <a:bodyPr/>
+                    <a:lstStyle/>
+                    <a:p>
+                      <a:r>
+                        <a:rPr lang="sv-SE" dirty="0" err="1" smtClean="0"/>
+                        <a:t>Normal.y</a:t>
+                      </a:r>
+                      <a:endParaRPr lang="sv-SE" dirty="0"/>
+                    </a:p>
+                  </a:txBody>
+                  <a:tcPr/>
+                </a:tc>
+                <a:tc>
+                  <a:txBody>
+                    <a:bodyPr/>
+                    <a:lstStyle/>
+                    <a:p>
+                      <a:r>
+                        <a:rPr lang="sv-SE" dirty="0" err="1" smtClean="0"/>
+                        <a:t>Normal.z</a:t>
+                      </a:r>
+                      <a:endParaRPr lang="sv-SE" dirty="0"/>
+                    </a:p>
+                  </a:txBody>
+                  <a:tcPr/>
+                </a:tc>
+                <a:tc>
+                  <a:txBody>
+                    <a:bodyPr/>
+                    <a:lstStyle/>
+                    <a:p>
+                      <a:r>
+                        <a:rPr lang="sv-SE" dirty="0" smtClean="0"/>
+                        <a:t>-</a:t>
+                      </a:r>
+                      <a:endParaRPr lang="sv-SE" dirty="0"/>
+                    </a:p>
+                  </a:txBody>
+                  <a:tcPr/>
+                </a:tc>
+              </a:tr>
+              <a:tr h="370840">
+                <a:tc>
+                  <a:txBody>
+                    <a:bodyPr/>
+                    <a:lstStyle/>
+                    <a:p>
+                      <a:r>
+                        <a:rPr lang="sv-SE" dirty="0" err="1" smtClean="0"/>
+                        <a:t>Depth</a:t>
+                      </a:r>
+                      <a:endParaRPr lang="sv-SE" dirty="0"/>
+                    </a:p>
+                  </a:txBody>
+                  <a:tcPr/>
+                </a:tc>
+                <a:tc>
+                  <a:txBody>
+                    <a:bodyPr/>
+                    <a:lstStyle/>
+                    <a:p>
+                      <a:r>
+                        <a:rPr lang="sv-SE" dirty="0" err="1" smtClean="0"/>
+                        <a:t>Specular</a:t>
+                      </a:r>
+                      <a:r>
+                        <a:rPr lang="sv-SE" dirty="0" smtClean="0"/>
+                        <a:t> </a:t>
+                      </a:r>
+                      <a:r>
+                        <a:rPr lang="sv-SE" dirty="0" err="1" smtClean="0"/>
+                        <a:t>intensity</a:t>
+                      </a:r>
+                      <a:endParaRPr lang="sv-SE" dirty="0"/>
+                    </a:p>
+                  </a:txBody>
+                  <a:tcPr/>
+                </a:tc>
+                <a:tc>
+                  <a:txBody>
+                    <a:bodyPr/>
+                    <a:lstStyle/>
+                    <a:p>
+                      <a:r>
+                        <a:rPr lang="sv-SE" dirty="0" err="1" smtClean="0"/>
+                        <a:t>Specular</a:t>
+                      </a:r>
+                      <a:r>
+                        <a:rPr lang="sv-SE" dirty="0" smtClean="0"/>
+                        <a:t> </a:t>
+                      </a:r>
+                      <a:r>
+                        <a:rPr lang="sv-SE" dirty="0" err="1" smtClean="0"/>
+                        <a:t>roughness</a:t>
+                      </a:r>
+                      <a:endParaRPr lang="sv-SE" dirty="0"/>
+                    </a:p>
+                  </a:txBody>
+                  <a:tcPr/>
+                </a:tc>
+                <a:tc>
+                  <a:txBody>
+                    <a:bodyPr/>
+                    <a:lstStyle/>
+                    <a:p>
+                      <a:r>
+                        <a:rPr lang="sv-SE" dirty="0" smtClean="0"/>
+                        <a:t>-</a:t>
+                      </a:r>
+                      <a:endParaRPr lang="sv-SE" dirty="0"/>
+                    </a:p>
+                  </a:txBody>
+                  <a:tcPr/>
+                </a:tc>
+              </a:tr>
+              <a:tr h="370840">
+                <a:tc>
+                  <a:txBody>
+                    <a:bodyPr/>
+                    <a:lstStyle/>
+                    <a:p>
+                      <a:r>
+                        <a:rPr lang="sv-SE" dirty="0" err="1" smtClean="0"/>
+                        <a:t>Albedo</a:t>
+                      </a:r>
+                      <a:r>
+                        <a:rPr lang="sv-SE" baseline="0" dirty="0" err="1" smtClean="0"/>
+                        <a:t>.x</a:t>
+                      </a:r>
+                      <a:endParaRPr lang="sv-SE" dirty="0"/>
+                    </a:p>
+                  </a:txBody>
+                  <a:tcPr/>
+                </a:tc>
+                <a:tc>
+                  <a:txBody>
+                    <a:bodyPr/>
+                    <a:lstStyle/>
+                    <a:p>
+                      <a:r>
+                        <a:rPr lang="sv-SE" dirty="0" err="1" smtClean="0"/>
+                        <a:t>Albedo.y</a:t>
+                      </a:r>
+                      <a:endParaRPr lang="sv-SE" dirty="0"/>
+                    </a:p>
+                  </a:txBody>
+                  <a:tcPr/>
+                </a:tc>
+                <a:tc>
+                  <a:txBody>
+                    <a:bodyPr/>
+                    <a:lstStyle/>
+                    <a:p>
+                      <a:r>
+                        <a:rPr lang="sv-SE" dirty="0" err="1" smtClean="0"/>
+                        <a:t>Albedo.z</a:t>
+                      </a:r>
+                      <a:endParaRPr lang="sv-SE" dirty="0"/>
+                    </a:p>
+                  </a:txBody>
+                  <a:tcPr/>
+                </a:tc>
+                <a:tc>
+                  <a:txBody>
+                    <a:bodyPr/>
+                    <a:lstStyle/>
+                    <a:p>
+                      <a:r>
+                        <a:rPr lang="sv-SE" dirty="0" smtClean="0"/>
+                        <a:t>-</a:t>
+                      </a:r>
+                      <a:endParaRPr lang="sv-SE" dirty="0"/>
+                    </a:p>
+                  </a:txBody>
+                  <a:tcPr/>
+                </a:tc>
+              </a:tr>
+            </a:tbl>
+          </a:graphicData>
+        </a:graphic>
+      </p:graphicFrame>
+    </p:spTree>
+    <p:extLst>
+      <p:ext uri="{BB962C8B-B14F-4D97-AF65-F5344CB8AC3E}">
+        <p14:creationId xmlns:p14="http://schemas.microsoft.com/office/powerpoint/2010/main" val="1192610747"/>
+      </p:ext>
+    </p:extLst>
+  </p:cSld>
+  <p:clrMapOvr>
+    <a:masterClrMapping/>
+  </p:clrMapOvr>
+  <p:timing>
+    <p:tnLst>
+      <p:par>
+        <p:cTn id="1" dur="indefinite" restart="never" nodeType="tmRoot"/>
+      </p:par>
+    </p:tnLst>
+  </p:timing>
+</p:sld>
+</file>
+
+<file path=ppt/slides/slide6.xml><?xml version="1.0" encoding="utf-8"?>
+<p:sld xmlns:a="http://schemas.openxmlformats.org/drawingml/2006/main" xmlns:r="http://schemas.openxmlformats.org/officeDocument/2006/relationships" xmlns:p="http://schemas.openxmlformats.org/presentationml/2006/main">
+  <p:cSld>
+    <p:spTree>
+      <p:nvGrpSpPr>
+        <p:cNvPr id="1" name=""/>
+        <p:cNvGrpSpPr/>
+        <p:nvPr/>
+      </p:nvGrpSpPr>
+      <p:grpSpPr>
+        <a:xfrm>
+          <a:off x="0" y="0"/>
+          <a:ext cx="0" cy="0"/>
+          <a:chOff x="0" y="0"/>
+          <a:chExt cx="0" cy="0"/>
+        </a:xfrm>
+      </p:grpSpPr>
+      <p:sp>
+        <p:nvSpPr>
+          <p:cNvPr id="2" name="Rubrik 1"/>
+          <p:cNvSpPr>
+            <a:spLocks noGrp="1"/>
+          </p:cNvSpPr>
+          <p:nvPr>
+            <p:ph type="title"/>
+          </p:nvPr>
+        </p:nvSpPr>
+        <p:spPr/>
+        <p:txBody>
+          <a:bodyPr/>
+          <a:lstStyle/>
+          <a:p>
+            <a:r>
+              <a:rPr lang="sv-SE" dirty="0" smtClean="0"/>
+              <a:t>G-</a:t>
+            </a:r>
+            <a:r>
+              <a:rPr lang="sv-SE" dirty="0" err="1" smtClean="0"/>
+              <a:t>buffers</a:t>
+            </a:r>
+            <a:endParaRPr lang="sv-SE" dirty="0"/>
+          </a:p>
+        </p:txBody>
+      </p:sp>
+      <p:sp>
+        <p:nvSpPr>
+          <p:cNvPr id="3" name="Platshållare för innehåll 2"/>
+          <p:cNvSpPr>
+            <a:spLocks noGrp="1"/>
+          </p:cNvSpPr>
+          <p:nvPr>
+            <p:ph idx="1"/>
+          </p:nvPr>
+        </p:nvSpPr>
+        <p:spPr/>
+        <p:txBody>
+          <a:bodyPr/>
+          <a:lstStyle/>
+          <a:p>
+            <a:r>
+              <a:rPr lang="sv-SE" dirty="0" smtClean="0"/>
+              <a:t>PICS</a:t>
+            </a:r>
+            <a:endParaRPr lang="sv-SE" dirty="0"/>
+          </a:p>
+        </p:txBody>
+      </p:sp>
+      <p:sp>
+        <p:nvSpPr>
+          <p:cNvPr id="4" name="Platshållare för datum 3"/>
+          <p:cNvSpPr>
+            <a:spLocks noGrp="1"/>
+          </p:cNvSpPr>
+          <p:nvPr>
+            <p:ph type="dt" sz="half" idx="10"/>
+          </p:nvPr>
+        </p:nvSpPr>
+        <p:spPr/>
+        <p:txBody>
+          <a:bodyPr/>
+          <a:lstStyle/>
+          <a:p>
+            <a:fld id="{637124F9-74EC-4A1F-82AA-07908676A841}" type="datetime1">
+              <a:rPr lang="sv-SE" smtClean="0"/>
+              <a:t>2011-05-26</a:t>
+            </a:fld>
+            <a:endParaRPr lang="sv-SE"/>
+          </a:p>
+        </p:txBody>
+      </p:sp>
+      <p:sp>
+        <p:nvSpPr>
+          <p:cNvPr id="5" name="Platshållare för bildnummer 4"/>
+          <p:cNvSpPr>
+            <a:spLocks noGrp="1"/>
+          </p:cNvSpPr>
+          <p:nvPr>
+            <p:ph type="sldNum" sz="quarter" idx="12"/>
+          </p:nvPr>
+        </p:nvSpPr>
+        <p:spPr/>
+        <p:txBody>
+          <a:bodyPr/>
+          <a:lstStyle/>
+          <a:p>
+            <a:fld id="{87B9E5C0-0A56-4BE6-BE7D-E6FF370B7540}" type="slidenum">
+              <a:rPr lang="sv-SE" smtClean="0"/>
+              <a:t>6</a:t>
+            </a:fld>
+            <a:endParaRPr lang="sv-SE"/>
+          </a:p>
+        </p:txBody>
+      </p:sp>
+    </p:spTree>
+    <p:extLst>
+      <p:ext uri="{BB962C8B-B14F-4D97-AF65-F5344CB8AC3E}">
+        <p14:creationId xmlns:p14="http://schemas.microsoft.com/office/powerpoint/2010/main" val="2611972127"/>
+      </p:ext>
+    </p:extLst>
+  </p:cSld>
+  <p:clrMapOvr>
+    <a:masterClrMapping/>
+  </p:clrMapOvr>
+  <p:timing>
+    <p:tnLst>
+      <p:par>
+        <p:cTn id="1" dur="indefinite" restart="never" nodeType="tmRoot"/>
+      </p:par>
+    </p:tnLst>
+  </p:timing>
+</p:sld>
+</file>
+
+<file path=ppt/slides/slide7.xml><?xml version="1.0" encoding="utf-8"?>
+<p:sld xmlns:a="http://schemas.openxmlformats.org/drawingml/2006/main" xmlns:r="http://schemas.openxmlformats.org/officeDocument/2006/relationships" xmlns:p="http://schemas.openxmlformats.org/presentationml/2006/main">
+  <p:cSld>
+    <p:spTree>
+      <p:nvGrpSpPr>
+        <p:cNvPr id="1" name=""/>
+        <p:cNvGrpSpPr/>
+        <p:nvPr/>
+      </p:nvGrpSpPr>
+      <p:grpSpPr>
+        <a:xfrm>
+          <a:off x="0" y="0"/>
+          <a:ext cx="0" cy="0"/>
+          <a:chOff x="0" y="0"/>
+          <a:chExt cx="0" cy="0"/>
+        </a:xfrm>
+      </p:grpSpPr>
+      <p:sp>
+        <p:nvSpPr>
+          <p:cNvPr id="2" name="Rubrik 1"/>
+          <p:cNvSpPr>
+            <a:spLocks noGrp="1"/>
+          </p:cNvSpPr>
+          <p:nvPr>
+            <p:ph type="title"/>
+          </p:nvPr>
+        </p:nvSpPr>
+        <p:spPr/>
+        <p:txBody>
+          <a:bodyPr/>
+          <a:lstStyle/>
+          <a:p>
+            <a:r>
+              <a:rPr lang="sv-SE" dirty="0" err="1" smtClean="0"/>
+              <a:t>Lighting</a:t>
+            </a:r>
+            <a:r>
+              <a:rPr lang="sv-SE" dirty="0" smtClean="0"/>
+              <a:t> </a:t>
+            </a:r>
+            <a:r>
+              <a:rPr lang="sv-SE" dirty="0" err="1" smtClean="0"/>
+              <a:t>stage</a:t>
+            </a:r>
+            <a:endParaRPr lang="sv-SE" dirty="0"/>
+          </a:p>
+        </p:txBody>
+      </p:sp>
+      <p:sp>
+        <p:nvSpPr>
+          <p:cNvPr id="3" name="Platshållare för innehåll 2"/>
+          <p:cNvSpPr>
+            <a:spLocks noGrp="1"/>
+          </p:cNvSpPr>
+          <p:nvPr>
+            <p:ph idx="1"/>
+          </p:nvPr>
+        </p:nvSpPr>
+        <p:spPr/>
+        <p:txBody>
+          <a:bodyPr/>
+          <a:lstStyle/>
+          <a:p>
+            <a:r>
+              <a:rPr lang="sv-SE" dirty="0" err="1" smtClean="0"/>
+              <a:t>Render</a:t>
+            </a:r>
+            <a:r>
+              <a:rPr lang="sv-SE" dirty="0" smtClean="0"/>
+              <a:t> </a:t>
+            </a:r>
+            <a:r>
+              <a:rPr lang="sv-SE" dirty="0" err="1" smtClean="0"/>
+              <a:t>to</a:t>
+            </a:r>
+            <a:r>
+              <a:rPr lang="sv-SE" dirty="0" smtClean="0"/>
+              <a:t> </a:t>
+            </a:r>
+            <a:r>
+              <a:rPr lang="sv-SE" dirty="0" err="1" smtClean="0"/>
+              <a:t>screen</a:t>
+            </a:r>
+            <a:r>
+              <a:rPr lang="sv-SE" dirty="0" smtClean="0"/>
+              <a:t> space </a:t>
+            </a:r>
+            <a:r>
+              <a:rPr lang="sv-SE" dirty="0" err="1" smtClean="0"/>
+              <a:t>quad</a:t>
+            </a:r>
+            <a:r>
+              <a:rPr lang="sv-SE" dirty="0" smtClean="0"/>
+              <a:t/>
+            </a:r>
+            <a:br>
+              <a:rPr lang="sv-SE" dirty="0" smtClean="0"/>
+            </a:br>
+            <a:endParaRPr lang="sv-SE" dirty="0" smtClean="0"/>
+          </a:p>
+          <a:p>
+            <a:r>
+              <a:rPr lang="sv-SE" dirty="0" smtClean="0"/>
+              <a:t>Simple </a:t>
+            </a:r>
+            <a:r>
+              <a:rPr lang="sv-SE" dirty="0"/>
+              <a:t>P</a:t>
+            </a:r>
+            <a:r>
+              <a:rPr lang="sv-SE" dirty="0" smtClean="0"/>
+              <a:t>hong </a:t>
+            </a:r>
+            <a:r>
+              <a:rPr lang="sv-SE" dirty="0" err="1" smtClean="0"/>
+              <a:t>shading</a:t>
+            </a:r>
+            <a:r>
+              <a:rPr lang="sv-SE" dirty="0" smtClean="0"/>
+              <a:t/>
+            </a:r>
+            <a:br>
+              <a:rPr lang="sv-SE" dirty="0" smtClean="0"/>
+            </a:br>
+            <a:endParaRPr lang="sv-SE" dirty="0" smtClean="0"/>
+          </a:p>
+          <a:p>
+            <a:r>
+              <a:rPr lang="sv-SE" dirty="0" smtClean="0"/>
+              <a:t>2 P-</a:t>
+            </a:r>
+            <a:r>
+              <a:rPr lang="sv-SE" dirty="0" err="1" smtClean="0"/>
+              <a:t>buffers</a:t>
+            </a:r>
+            <a:endParaRPr lang="sv-SE" dirty="0"/>
+          </a:p>
+        </p:txBody>
+      </p:sp>
+      <p:sp>
+        <p:nvSpPr>
+          <p:cNvPr id="4" name="Platshållare för datum 3"/>
+          <p:cNvSpPr>
+            <a:spLocks noGrp="1"/>
+          </p:cNvSpPr>
+          <p:nvPr>
+            <p:ph type="dt" sz="half" idx="10"/>
+          </p:nvPr>
+        </p:nvSpPr>
+        <p:spPr/>
+        <p:txBody>
+          <a:bodyPr/>
+          <a:lstStyle/>
+          <a:p>
+            <a:fld id="{637124F9-74EC-4A1F-82AA-07908676A841}" type="datetime1">
+              <a:rPr lang="sv-SE" smtClean="0"/>
+              <a:t>2011-05-26</a:t>
+            </a:fld>
+            <a:endParaRPr lang="sv-SE"/>
+          </a:p>
+        </p:txBody>
+      </p:sp>
+      <p:sp>
+        <p:nvSpPr>
+          <p:cNvPr id="5" name="Platshållare för bildnummer 4"/>
+          <p:cNvSpPr>
+            <a:spLocks noGrp="1"/>
+          </p:cNvSpPr>
+          <p:nvPr>
+            <p:ph type="sldNum" sz="quarter" idx="12"/>
+          </p:nvPr>
+        </p:nvSpPr>
+        <p:spPr/>
+        <p:txBody>
+          <a:bodyPr/>
+          <a:lstStyle/>
+          <a:p>
+            <a:fld id="{87B9E5C0-0A56-4BE6-BE7D-E6FF370B7540}" type="slidenum">
+              <a:rPr lang="sv-SE" smtClean="0"/>
+              <a:t>7</a:t>
+            </a:fld>
+            <a:endParaRPr lang="sv-SE"/>
+          </a:p>
+        </p:txBody>
+      </p:sp>
+    </p:spTree>
+    <p:extLst>
+      <p:ext uri="{BB962C8B-B14F-4D97-AF65-F5344CB8AC3E}">
+        <p14:creationId xmlns:p14="http://schemas.microsoft.com/office/powerpoint/2010/main" val="3839971401"/>
       </p:ext>
     </p:extLst>
   </p:cSld>
@@ -3573,4 +5445,289 @@
   <a:objectDefaults/>
   <a:extraClrSchemeLst/>
 </a:theme>
+</file>
+
+<file path=ppt/theme/theme2.xml><?xml version="1.0" encoding="utf-8"?>
+<a:theme xmlns:a="http://schemas.openxmlformats.org/drawingml/2006/main" name="Office-tema">
+  <a:themeElements>
+    <a:clrScheme name="Office">
+      <a:dk1>
+        <a:sysClr val="windowText" lastClr="000000"/>
+      </a:dk1>
+      <a:lt1>
+        <a:sysClr val="window" lastClr="FFFFFF"/>
+      </a:lt1>
+      <a:dk2>
+        <a:srgbClr val="1F497D"/>
+      </a:dk2>
+      <a:lt2>
+        <a:srgbClr val="EEECE1"/>
+      </a:lt2>
+      <a:accent1>
+        <a:srgbClr val="4F81BD"/>
+      </a:accent1>
+      <a:accent2>
+        <a:srgbClr val="C0504D"/>
+      </a:accent2>
+      <a:accent3>
+        <a:srgbClr val="9BBB59"/>
+      </a:accent3>
+      <a:accent4>
+        <a:srgbClr val="8064A2"/>
+      </a:accent4>
+      <a:accent5>
+        <a:srgbClr val="4BACC6"/>
+      </a:accent5>
+      <a:accent6>
+        <a:srgbClr val="F79646"/>
+      </a:accent6>
+      <a:hlink>
+        <a:srgbClr val="0000FF"/>
+      </a:hlink>
+      <a:folHlink>
+        <a:srgbClr val="800080"/>
+      </a:folHlink>
+    </a:clrScheme>
+    <a:fontScheme name="Office">
+      <a:majorFont>
+        <a:latin typeface="Calibri"/>
+        <a:ea typeface=""/>
+        <a:cs typeface=""/>
+        <a:font script="Jpan" typeface="ＭＳ Ｐゴシック"/>
+        <a:font script="Hang" typeface="맑은 고딕"/>
+        <a:font script="Hans" typeface="宋体"/>
+        <a:font script="Hant" typeface="新細明體"/>
+        <a:font script="Arab" typeface="Times New Roman"/>
+        <a:font script="Hebr" typeface="Times New Roman"/>
+        <a:font script="Thai" typeface="Angsana New"/>
+        <a:font script="Ethi" typeface="Nyala"/>
+        <a:font script="Beng" typeface="Vrinda"/>
+        <a:font script="Gujr" typeface="Shruti"/>
+        <a:font script="Khmr" typeface="MoolBoran"/>
+        <a:font script="Knda" typeface="Tunga"/>
+        <a:font script="Guru" typeface="Raavi"/>
+        <a:font script="Cans" typeface="Euphemia"/>
+        <a:font script="Cher" typeface="Plantagenet Cherokee"/>
+        <a:font script="Yiii" typeface="Microsoft Yi Baiti"/>
+        <a:font script="Tibt" typeface="Microsoft Himalaya"/>
+        <a:font script="Thaa" typeface="MV Boli"/>
+        <a:font script="Deva" typeface="Mangal"/>
+        <a:font script="Telu" typeface="Gautami"/>
+        <a:font script="Taml" typeface="Latha"/>
+        <a:font script="Syrc" typeface="Estrangelo Edessa"/>
+        <a:font script="Orya" typeface="Kalinga"/>
+        <a:font script="Mlym" typeface="Kartika"/>
+        <a:font script="Laoo" typeface="DokChampa"/>
+        <a:font script="Sinh" typeface="Iskoola Pota"/>
+        <a:font script="Mong" typeface="Mongolian Baiti"/>
+        <a:font script="Viet" typeface="Times New Roman"/>
+        <a:font script="Uigh" typeface="Microsoft Uighur"/>
+        <a:font script="Geor" typeface="Sylfaen"/>
+      </a:majorFont>
+      <a:minorFont>
+        <a:latin typeface="Calibri"/>
+        <a:ea typeface=""/>
+        <a:cs typeface=""/>
+        <a:font script="Jpan" typeface="ＭＳ Ｐゴシック"/>
+        <a:font script="Hang" typeface="맑은 고딕"/>
+        <a:font script="Hans" typeface="宋体"/>
+        <a:font script="Hant" typeface="新細明體"/>
+        <a:font script="Arab" typeface="Arial"/>
+        <a:font script="Hebr" typeface="Arial"/>
+        <a:font script="Thai" typeface="Cordia New"/>
+        <a:font script="Ethi" typeface="Nyala"/>
+        <a:font script="Beng" typeface="Vrinda"/>
+        <a:font script="Gujr" typeface="Shruti"/>
+        <a:font script="Khmr" typeface="DaunPenh"/>
+        <a:font script="Knda" typeface="Tunga"/>
+        <a:font script="Guru" typeface="Raavi"/>
+        <a:font script="Cans" typeface="Euphemia"/>
+        <a:font script="Cher" typeface="Plantagenet Cherokee"/>
+        <a:font script="Yiii" typeface="Microsoft Yi Baiti"/>
+        <a:font script="Tibt" typeface="Microsoft Himalaya"/>
+        <a:font script="Thaa" typeface="MV Boli"/>
+        <a:font script="Deva" typeface="Mangal"/>
+        <a:font script="Telu" typeface="Gautami"/>
+        <a:font script="Taml" typeface="Latha"/>
+        <a:font script="Syrc" typeface="Estrangelo Edessa"/>
+        <a:font script="Orya" typeface="Kalinga"/>
+        <a:font script="Mlym" typeface="Kartika"/>
+        <a:font script="Laoo" typeface="DokChampa"/>
+        <a:font script="Sinh" typeface="Iskoola Pota"/>
+        <a:font script="Mong" typeface="Mongolian Baiti"/>
+        <a:font script="Viet" typeface="Arial"/>
+        <a:font script="Uigh" typeface="Microsoft Uighur"/>
+        <a:font script="Geor" typeface="Sylfaen"/>
+      </a:minorFont>
+    </a:fontScheme>
+    <a:fmtScheme name="Office">
+      <a:fillStyleLst>
+        <a:solidFill>
+          <a:schemeClr val="phClr"/>
+        </a:solidFill>
+        <a:gradFill rotWithShape="1">
+          <a:gsLst>
+            <a:gs pos="0">
+              <a:schemeClr val="phClr">
+                <a:tint val="50000"/>
+                <a:satMod val="300000"/>
+              </a:schemeClr>
+            </a:gs>
+            <a:gs pos="35000">
+              <a:schemeClr val="phClr">
+                <a:tint val="37000"/>
+                <a:satMod val="300000"/>
+              </a:schemeClr>
+            </a:gs>
+            <a:gs pos="100000">
+              <a:schemeClr val="phClr">
+                <a:tint val="15000"/>
+                <a:satMod val="350000"/>
+              </a:schemeClr>
+            </a:gs>
+          </a:gsLst>
+          <a:lin ang="16200000" scaled="1"/>
+        </a:gradFill>
+        <a:gradFill rotWithShape="1">
+          <a:gsLst>
+            <a:gs pos="0">
+              <a:schemeClr val="phClr">
+                <a:shade val="51000"/>
+                <a:satMod val="130000"/>
+              </a:schemeClr>
+            </a:gs>
+            <a:gs pos="80000">
+              <a:schemeClr val="phClr">
+                <a:shade val="93000"/>
+                <a:satMod val="130000"/>
+              </a:schemeClr>
+            </a:gs>
+            <a:gs pos="100000">
+              <a:schemeClr val="phClr">
+                <a:shade val="94000"/>
+                <a:satMod val="135000"/>
+              </a:schemeClr>
+            </a:gs>
+          </a:gsLst>
+          <a:lin ang="16200000" scaled="0"/>
+        </a:gradFill>
+      </a:fillStyleLst>
+      <a:lnStyleLst>
+        <a:ln w="9525" cap="flat" cmpd="sng" algn="ctr">
+          <a:solidFill>
+            <a:schemeClr val="phClr">
+              <a:shade val="95000"/>
+              <a:satMod val="105000"/>
+            </a:schemeClr>
+          </a:solidFill>
+          <a:prstDash val="solid"/>
+        </a:ln>
+        <a:ln w="25400" cap="flat" cmpd="sng" algn="ctr">
+          <a:solidFill>
+            <a:schemeClr val="phClr"/>
+          </a:solidFill>
+          <a:prstDash val="solid"/>
+        </a:ln>
+        <a:ln w="38100" cap="flat" cmpd="sng" algn="ctr">
+          <a:solidFill>
+            <a:schemeClr val="phClr"/>
+          </a:solidFill>
+          <a:prstDash val="solid"/>
+        </a:ln>
+      </a:lnStyleLst>
+      <a:effectStyleLst>
+        <a:effectStyle>
+          <a:effectLst>
+            <a:outerShdw blurRad="40000" dist="20000" dir="5400000" rotWithShape="0">
+              <a:srgbClr val="000000">
+                <a:alpha val="38000"/>
+              </a:srgbClr>
+            </a:outerShdw>
+          </a:effectLst>
+        </a:effectStyle>
+        <a:effectStyle>
+          <a:effectLst>
+            <a:outerShdw blurRad="40000" dist="23000" dir="5400000" rotWithShape="0">
+              <a:srgbClr val="000000">
+                <a:alpha val="35000"/>
+              </a:srgbClr>
+            </a:outerShdw>
+          </a:effectLst>
+        </a:effectStyle>
+        <a:effectStyle>
+          <a:effectLst>
+            <a:outerShdw blurRad="40000" dist="23000" dir="5400000" rotWithShape="0">
+              <a:srgbClr val="000000">
+                <a:alpha val="35000"/>
+              </a:srgbClr>
+            </a:outerShdw>
+          </a:effectLst>
+          <a:scene3d>
+            <a:camera prst="orthographicFront">
+              <a:rot lat="0" lon="0" rev="0"/>
+            </a:camera>
+            <a:lightRig rig="threePt" dir="t">
+              <a:rot lat="0" lon="0" rev="1200000"/>
+            </a:lightRig>
+          </a:scene3d>
+          <a:sp3d>
+            <a:bevelT w="63500" h="25400"/>
+          </a:sp3d>
+        </a:effectStyle>
+      </a:effectStyleLst>
+      <a:bgFillStyleLst>
+        <a:solidFill>
+          <a:schemeClr val="phClr"/>
+        </a:solidFill>
+        <a:gradFill rotWithShape="1">
+          <a:gsLst>
+            <a:gs pos="0">
+              <a:schemeClr val="phClr">
+                <a:tint val="40000"/>
+                <a:satMod val="350000"/>
+              </a:schemeClr>
+            </a:gs>
+            <a:gs pos="40000">
+              <a:schemeClr val="phClr">
+                <a:tint val="45000"/>
+                <a:shade val="99000"/>
+                <a:satMod val="350000"/>
+              </a:schemeClr>
+            </a:gs>
+            <a:gs pos="100000">
+              <a:schemeClr val="phClr">
+                <a:shade val="20000"/>
+                <a:satMod val="255000"/>
+              </a:schemeClr>
+            </a:gs>
+          </a:gsLst>
+          <a:path path="circle">
+            <a:fillToRect l="50000" t="-80000" r="50000" b="180000"/>
+          </a:path>
+        </a:gradFill>
+        <a:gradFill rotWithShape="1">
+          <a:gsLst>
+            <a:gs pos="0">
+              <a:schemeClr val="phClr">
+                <a:tint val="80000"/>
+                <a:satMod val="300000"/>
+              </a:schemeClr>
+            </a:gs>
+            <a:gs pos="100000">
+              <a:schemeClr val="phClr">
+                <a:shade val="30000"/>
+                <a:satMod val="200000"/>
+              </a:schemeClr>
+            </a:gs>
+          </a:gsLst>
+          <a:path path="circle">
+            <a:fillToRect l="50000" t="50000" r="50000" b="50000"/>
+          </a:path>
+        </a:gradFill>
+      </a:bgFillStyleLst>
+    </a:fmtScheme>
+  </a:themeElements>
+  <a:objectDefaults/>
+  <a:extraClrSchemeLst/>
+</a:theme>
 </file>
</xml_diff>

<commit_message>
Added sponza and stuff.
</commit_message>
<xml_diff>
--- a/Presentation/presentation.pptx
+++ b/Presentation/presentation.pptx
@@ -5,16 +5,21 @@
     <p:sldMasterId id="2147483648" r:id="rId1"/>
   </p:sldMasterIdLst>
   <p:notesMasterIdLst>
-    <p:notesMasterId r:id="rId9"/>
+    <p:notesMasterId r:id="rId14"/>
   </p:notesMasterIdLst>
   <p:sldIdLst>
     <p:sldId id="256" r:id="rId2"/>
     <p:sldId id="257" r:id="rId3"/>
     <p:sldId id="258" r:id="rId4"/>
     <p:sldId id="259" r:id="rId5"/>
-    <p:sldId id="260" r:id="rId6"/>
-    <p:sldId id="261" r:id="rId7"/>
-    <p:sldId id="262" r:id="rId8"/>
+    <p:sldId id="264" r:id="rId6"/>
+    <p:sldId id="266" r:id="rId7"/>
+    <p:sldId id="260" r:id="rId8"/>
+    <p:sldId id="261" r:id="rId9"/>
+    <p:sldId id="262" r:id="rId10"/>
+    <p:sldId id="263" r:id="rId11"/>
+    <p:sldId id="265" r:id="rId12"/>
+    <p:sldId id="267" r:id="rId13"/>
   </p:sldIdLst>
   <p:sldSz cx="9144000" cy="6858000" type="screen4x3"/>
   <p:notesSz cx="6858000" cy="9144000"/>
@@ -198,7 +203,7 @@
           <a:p>
             <a:fld id="{8A992F5C-BB21-42D6-8B86-86F05A225F4F}" type="datetimeFigureOut">
               <a:rPr lang="sv-SE" smtClean="0"/>
-              <a:t>2011-05-26</a:t>
+              <a:t>2012-01-19</a:t>
             </a:fld>
             <a:endParaRPr lang="sv-SE"/>
           </a:p>
@@ -658,7 +663,7 @@
           <a:p>
             <a:fld id="{2162C4A1-1747-4530-83C4-0BFC00863F31}" type="datetime1">
               <a:rPr lang="sv-SE" smtClean="0"/>
-              <a:t>2011-05-26</a:t>
+              <a:t>2012-01-19</a:t>
             </a:fld>
             <a:endParaRPr lang="sv-SE"/>
           </a:p>
@@ -835,7 +840,7 @@
           <a:p>
             <a:fld id="{B92436E1-C3EC-4BD5-97C1-AE2A1D9166B3}" type="datetime1">
               <a:rPr lang="sv-SE" smtClean="0"/>
-              <a:t>2011-05-26</a:t>
+              <a:t>2012-01-19</a:t>
             </a:fld>
             <a:endParaRPr lang="sv-SE"/>
           </a:p>
@@ -1015,7 +1020,7 @@
           <a:p>
             <a:fld id="{C7F3DC18-85E6-4A5B-871E-D82719F09AA0}" type="datetime1">
               <a:rPr lang="sv-SE" smtClean="0"/>
-              <a:t>2011-05-26</a:t>
+              <a:t>2012-01-19</a:t>
             </a:fld>
             <a:endParaRPr lang="sv-SE"/>
           </a:p>
@@ -1185,7 +1190,7 @@
           <a:p>
             <a:fld id="{637124F9-74EC-4A1F-82AA-07908676A841}" type="datetime1">
               <a:rPr lang="sv-SE" smtClean="0"/>
-              <a:t>2011-05-26</a:t>
+              <a:t>2012-01-19</a:t>
             </a:fld>
             <a:endParaRPr lang="sv-SE"/>
           </a:p>
@@ -1438,7 +1443,7 @@
           <a:p>
             <a:fld id="{04CA2416-EF3D-4BC0-827C-197CD8F2E76A}" type="datetime1">
               <a:rPr lang="sv-SE" smtClean="0"/>
-              <a:t>2011-05-26</a:t>
+              <a:t>2012-01-19</a:t>
             </a:fld>
             <a:endParaRPr lang="sv-SE"/>
           </a:p>
@@ -1726,7 +1731,7 @@
           <a:p>
             <a:fld id="{E498B244-8DB5-4DE3-A747-C2083F13034F}" type="datetime1">
               <a:rPr lang="sv-SE" smtClean="0"/>
-              <a:t>2011-05-26</a:t>
+              <a:t>2012-01-19</a:t>
             </a:fld>
             <a:endParaRPr lang="sv-SE"/>
           </a:p>
@@ -2148,7 +2153,7 @@
           <a:p>
             <a:fld id="{04997D01-3C30-4CCC-8527-2E6C5FDD01B5}" type="datetime1">
               <a:rPr lang="sv-SE" smtClean="0"/>
-              <a:t>2011-05-26</a:t>
+              <a:t>2012-01-19</a:t>
             </a:fld>
             <a:endParaRPr lang="sv-SE"/>
           </a:p>
@@ -2266,7 +2271,7 @@
           <a:p>
             <a:fld id="{05721A07-45CB-4797-87DB-7EDECF2A03BB}" type="datetime1">
               <a:rPr lang="sv-SE" smtClean="0"/>
-              <a:t>2011-05-26</a:t>
+              <a:t>2012-01-19</a:t>
             </a:fld>
             <a:endParaRPr lang="sv-SE"/>
           </a:p>
@@ -2361,7 +2366,7 @@
           <a:p>
             <a:fld id="{570A9BCA-167E-4E3E-B12A-4C0BBFBB73F8}" type="datetime1">
               <a:rPr lang="sv-SE" smtClean="0"/>
-              <a:t>2011-05-26</a:t>
+              <a:t>2012-01-19</a:t>
             </a:fld>
             <a:endParaRPr lang="sv-SE"/>
           </a:p>
@@ -2638,7 +2643,7 @@
           <a:p>
             <a:fld id="{EA5505DC-82D5-4A0F-BDF4-DA41FC011CD3}" type="datetime1">
               <a:rPr lang="sv-SE" smtClean="0"/>
-              <a:t>2011-05-26</a:t>
+              <a:t>2012-01-19</a:t>
             </a:fld>
             <a:endParaRPr lang="sv-SE"/>
           </a:p>
@@ -2891,7 +2896,7 @@
           <a:p>
             <a:fld id="{D8DCC73F-2D5E-451E-A2FB-60D52AC6CEBA}" type="datetime1">
               <a:rPr lang="sv-SE" smtClean="0"/>
-              <a:t>2011-05-26</a:t>
+              <a:t>2012-01-19</a:t>
             </a:fld>
             <a:endParaRPr lang="sv-SE"/>
           </a:p>
@@ -3140,7 +3145,7 @@
           <a:p>
             <a:fld id="{553EBD10-67D3-4C33-A8C1-A7F8876305D2}" type="datetime1">
               <a:rPr lang="sv-SE" smtClean="0"/>
-              <a:t>2011-05-26</a:t>
+              <a:t>2012-01-19</a:t>
             </a:fld>
             <a:endParaRPr lang="sv-SE"/>
           </a:p>
@@ -3650,12 +3655,621 @@
   </p:clrMapOvr>
   <mc:AlternateContent xmlns:mc="http://schemas.openxmlformats.org/markup-compatibility/2006">
     <mc:Choice xmlns:p14="http://schemas.microsoft.com/office/powerpoint/2010/main" Requires="p14">
-      <p:transition spd="slow" p14:dur="2000"/>
+      <p:transition spd="med" p14:dur="700">
+        <p:fade/>
+      </p:transition>
     </mc:Choice>
     <mc:Fallback>
-      <p:transition spd="slow"/>
+      <p:transition spd="med">
+        <p:fade/>
+      </p:transition>
     </mc:Fallback>
   </mc:AlternateContent>
+  <p:timing>
+    <p:tnLst>
+      <p:par>
+        <p:cTn id="1" dur="indefinite" restart="never" nodeType="tmRoot"/>
+      </p:par>
+    </p:tnLst>
+  </p:timing>
+</p:sld>
+</file>
+
+<file path=ppt/slides/slide10.xml><?xml version="1.0" encoding="utf-8"?>
+<p:sld xmlns:a="http://schemas.openxmlformats.org/drawingml/2006/main" xmlns:r="http://schemas.openxmlformats.org/officeDocument/2006/relationships" xmlns:p="http://schemas.openxmlformats.org/presentationml/2006/main">
+  <p:cSld>
+    <p:spTree>
+      <p:nvGrpSpPr>
+        <p:cNvPr id="1" name=""/>
+        <p:cNvGrpSpPr/>
+        <p:nvPr/>
+      </p:nvGrpSpPr>
+      <p:grpSpPr>
+        <a:xfrm>
+          <a:off x="0" y="0"/>
+          <a:ext cx="0" cy="0"/>
+          <a:chOff x="0" y="0"/>
+          <a:chExt cx="0" cy="0"/>
+        </a:xfrm>
+      </p:grpSpPr>
+      <p:sp>
+        <p:nvSpPr>
+          <p:cNvPr id="2" name="Rubrik 1"/>
+          <p:cNvSpPr>
+            <a:spLocks noGrp="1"/>
+          </p:cNvSpPr>
+          <p:nvPr>
+            <p:ph type="title"/>
+          </p:nvPr>
+        </p:nvSpPr>
+        <p:spPr/>
+        <p:txBody>
+          <a:bodyPr/>
+          <a:lstStyle/>
+          <a:p>
+            <a:r>
+              <a:rPr lang="sv-SE" dirty="0" smtClean="0"/>
+              <a:t>The Bad</a:t>
+            </a:r>
+            <a:endParaRPr lang="sv-SE" dirty="0"/>
+          </a:p>
+        </p:txBody>
+      </p:sp>
+      <p:sp>
+        <p:nvSpPr>
+          <p:cNvPr id="3" name="Platshållare för innehåll 2"/>
+          <p:cNvSpPr>
+            <a:spLocks noGrp="1"/>
+          </p:cNvSpPr>
+          <p:nvPr>
+            <p:ph idx="1"/>
+          </p:nvPr>
+        </p:nvSpPr>
+        <p:spPr>
+          <a:xfrm>
+            <a:off x="457200" y="1598067"/>
+            <a:ext cx="8229600" cy="3661867"/>
+          </a:xfrm>
+        </p:spPr>
+        <p:txBody>
+          <a:bodyPr anchor="ctr"/>
+          <a:lstStyle/>
+          <a:p>
+            <a:r>
+              <a:rPr lang="sv-SE" dirty="0" err="1" smtClean="0"/>
+              <a:t>Antialiasing</a:t>
+            </a:r>
+            <a:r>
+              <a:rPr lang="sv-SE" dirty="0" smtClean="0"/>
+              <a:t/>
+            </a:r>
+            <a:br>
+              <a:rPr lang="sv-SE" dirty="0" smtClean="0"/>
+            </a:br>
+            <a:endParaRPr lang="sv-SE" dirty="0" smtClean="0"/>
+          </a:p>
+          <a:p>
+            <a:r>
+              <a:rPr lang="sv-SE" dirty="0" err="1" smtClean="0"/>
+              <a:t>Transparency</a:t>
+            </a:r>
+            <a:r>
+              <a:rPr lang="sv-SE" dirty="0" smtClean="0"/>
+              <a:t/>
+            </a:r>
+            <a:br>
+              <a:rPr lang="sv-SE" dirty="0" smtClean="0"/>
+            </a:br>
+            <a:endParaRPr lang="sv-SE" dirty="0" smtClean="0"/>
+          </a:p>
+          <a:p>
+            <a:r>
+              <a:rPr lang="sv-SE" dirty="0" err="1" smtClean="0"/>
+              <a:t>Bandwitdth</a:t>
+            </a:r>
+            <a:r>
+              <a:rPr lang="sv-SE" dirty="0" smtClean="0"/>
+              <a:t> </a:t>
+            </a:r>
+            <a:r>
+              <a:rPr lang="sv-SE" dirty="0" err="1" smtClean="0"/>
+              <a:t>requirements</a:t>
+            </a:r>
+            <a:endParaRPr lang="sv-SE" dirty="0"/>
+          </a:p>
+        </p:txBody>
+      </p:sp>
+      <p:sp>
+        <p:nvSpPr>
+          <p:cNvPr id="4" name="Platshållare för datum 3"/>
+          <p:cNvSpPr>
+            <a:spLocks noGrp="1"/>
+          </p:cNvSpPr>
+          <p:nvPr>
+            <p:ph type="dt" sz="half" idx="10"/>
+          </p:nvPr>
+        </p:nvSpPr>
+        <p:spPr/>
+        <p:txBody>
+          <a:bodyPr/>
+          <a:lstStyle/>
+          <a:p>
+            <a:fld id="{637124F9-74EC-4A1F-82AA-07908676A841}" type="datetime1">
+              <a:rPr lang="sv-SE" smtClean="0"/>
+              <a:t>2012-01-19</a:t>
+            </a:fld>
+            <a:endParaRPr lang="sv-SE"/>
+          </a:p>
+        </p:txBody>
+      </p:sp>
+      <p:sp>
+        <p:nvSpPr>
+          <p:cNvPr id="5" name="Platshållare för bildnummer 4"/>
+          <p:cNvSpPr>
+            <a:spLocks noGrp="1"/>
+          </p:cNvSpPr>
+          <p:nvPr>
+            <p:ph type="sldNum" sz="quarter" idx="12"/>
+          </p:nvPr>
+        </p:nvSpPr>
+        <p:spPr/>
+        <p:txBody>
+          <a:bodyPr/>
+          <a:lstStyle/>
+          <a:p>
+            <a:fld id="{87B9E5C0-0A56-4BE6-BE7D-E6FF370B7540}" type="slidenum">
+              <a:rPr lang="sv-SE" smtClean="0"/>
+              <a:t>10</a:t>
+            </a:fld>
+            <a:endParaRPr lang="sv-SE"/>
+          </a:p>
+        </p:txBody>
+      </p:sp>
+    </p:spTree>
+    <p:extLst>
+      <p:ext uri="{BB962C8B-B14F-4D97-AF65-F5344CB8AC3E}">
+        <p14:creationId xmlns:p14="http://schemas.microsoft.com/office/powerpoint/2010/main" val="1889178178"/>
+      </p:ext>
+    </p:extLst>
+  </p:cSld>
+  <p:clrMapOvr>
+    <a:masterClrMapping/>
+  </p:clrMapOvr>
+  <p:timing>
+    <p:tnLst>
+      <p:par>
+        <p:cTn id="1" dur="indefinite" restart="never" nodeType="tmRoot"/>
+      </p:par>
+    </p:tnLst>
+  </p:timing>
+</p:sld>
+</file>
+
+<file path=ppt/slides/slide11.xml><?xml version="1.0" encoding="utf-8"?>
+<p:sld xmlns:a="http://schemas.openxmlformats.org/drawingml/2006/main" xmlns:r="http://schemas.openxmlformats.org/officeDocument/2006/relationships" xmlns:p="http://schemas.openxmlformats.org/presentationml/2006/main">
+  <p:cSld>
+    <p:spTree>
+      <p:nvGrpSpPr>
+        <p:cNvPr id="1" name=""/>
+        <p:cNvGrpSpPr/>
+        <p:nvPr/>
+      </p:nvGrpSpPr>
+      <p:grpSpPr>
+        <a:xfrm>
+          <a:off x="0" y="0"/>
+          <a:ext cx="0" cy="0"/>
+          <a:chOff x="0" y="0"/>
+          <a:chExt cx="0" cy="0"/>
+        </a:xfrm>
+      </p:grpSpPr>
+      <p:sp>
+        <p:nvSpPr>
+          <p:cNvPr id="2" name="Rubrik 1"/>
+          <p:cNvSpPr>
+            <a:spLocks noGrp="1"/>
+          </p:cNvSpPr>
+          <p:nvPr>
+            <p:ph type="title"/>
+          </p:nvPr>
+        </p:nvSpPr>
+        <p:spPr/>
+        <p:txBody>
+          <a:bodyPr/>
+          <a:lstStyle/>
+          <a:p>
+            <a:r>
+              <a:rPr lang="sv-SE" dirty="0" err="1" smtClean="0"/>
+              <a:t>Results</a:t>
+            </a:r>
+            <a:endParaRPr lang="sv-SE" dirty="0"/>
+          </a:p>
+        </p:txBody>
+      </p:sp>
+      <p:sp>
+        <p:nvSpPr>
+          <p:cNvPr id="4" name="Platshållare för datum 3"/>
+          <p:cNvSpPr>
+            <a:spLocks noGrp="1"/>
+          </p:cNvSpPr>
+          <p:nvPr>
+            <p:ph type="dt" sz="half" idx="10"/>
+          </p:nvPr>
+        </p:nvSpPr>
+        <p:spPr/>
+        <p:txBody>
+          <a:bodyPr/>
+          <a:lstStyle/>
+          <a:p>
+            <a:fld id="{637124F9-74EC-4A1F-82AA-07908676A841}" type="datetime1">
+              <a:rPr lang="sv-SE" smtClean="0"/>
+              <a:t>2012-01-19</a:t>
+            </a:fld>
+            <a:endParaRPr lang="sv-SE"/>
+          </a:p>
+        </p:txBody>
+      </p:sp>
+      <p:sp>
+        <p:nvSpPr>
+          <p:cNvPr id="5" name="Platshållare för bildnummer 4"/>
+          <p:cNvSpPr>
+            <a:spLocks noGrp="1"/>
+          </p:cNvSpPr>
+          <p:nvPr>
+            <p:ph type="sldNum" sz="quarter" idx="12"/>
+          </p:nvPr>
+        </p:nvSpPr>
+        <p:spPr/>
+        <p:txBody>
+          <a:bodyPr/>
+          <a:lstStyle/>
+          <a:p>
+            <a:fld id="{87B9E5C0-0A56-4BE6-BE7D-E6FF370B7540}" type="slidenum">
+              <a:rPr lang="sv-SE" smtClean="0"/>
+              <a:t>11</a:t>
+            </a:fld>
+            <a:endParaRPr lang="sv-SE"/>
+          </a:p>
+        </p:txBody>
+      </p:sp>
+      <p:pic>
+        <p:nvPicPr>
+          <p:cNvPr id="9" name="Bildobjekt 8"/>
+          <p:cNvPicPr>
+            <a:picLocks noChangeAspect="1"/>
+          </p:cNvPicPr>
+          <p:nvPr/>
+        </p:nvPicPr>
+        <p:blipFill rotWithShape="1">
+          <a:blip r:embed="rId2" cstate="print">
+            <a:extLst>
+              <a:ext uri="{28A0092B-C50C-407E-A947-70E740481C1C}">
+                <a14:useLocalDpi xmlns:a14="http://schemas.microsoft.com/office/drawing/2010/main" val="0"/>
+              </a:ext>
+            </a:extLst>
+          </a:blip>
+          <a:srcRect r="2239" b="3824"/>
+          <a:stretch/>
+        </p:blipFill>
+        <p:spPr>
+          <a:xfrm>
+            <a:off x="251520" y="1403592"/>
+            <a:ext cx="5679759" cy="4050815"/>
+          </a:xfrm>
+          <a:prstGeom prst="rect">
+            <a:avLst/>
+          </a:prstGeom>
+          <a:ln>
+            <a:noFill/>
+          </a:ln>
+          <a:effectLst>
+            <a:outerShdw blurRad="190500" algn="tl" rotWithShape="0">
+              <a:srgbClr val="000000">
+                <a:alpha val="70000"/>
+              </a:srgbClr>
+            </a:outerShdw>
+          </a:effectLst>
+        </p:spPr>
+      </p:pic>
+      <p:pic>
+        <p:nvPicPr>
+          <p:cNvPr id="1027" name="Picture 3" descr="F:\Programming\Deferred\Presentation\Pics\viking_composite.PNG"/>
+          <p:cNvPicPr>
+            <a:picLocks noChangeAspect="1" noChangeArrowheads="1"/>
+          </p:cNvPicPr>
+          <p:nvPr/>
+        </p:nvPicPr>
+        <p:blipFill>
+          <a:blip r:embed="rId3">
+            <a:extLst>
+              <a:ext uri="{28A0092B-C50C-407E-A947-70E740481C1C}">
+                <a14:useLocalDpi xmlns:a14="http://schemas.microsoft.com/office/drawing/2010/main" val="0"/>
+              </a:ext>
+            </a:extLst>
+          </a:blip>
+          <a:srcRect/>
+          <a:stretch>
+            <a:fillRect/>
+          </a:stretch>
+        </p:blipFill>
+        <p:spPr bwMode="auto">
+          <a:xfrm>
+            <a:off x="3851920" y="2348880"/>
+            <a:ext cx="5108062" cy="3630183"/>
+          </a:xfrm>
+          <a:prstGeom prst="rect">
+            <a:avLst/>
+          </a:prstGeom>
+          <a:ln>
+            <a:noFill/>
+          </a:ln>
+          <a:effectLst>
+            <a:outerShdw blurRad="190500" algn="tl" rotWithShape="0">
+              <a:srgbClr val="000000">
+                <a:alpha val="70000"/>
+              </a:srgbClr>
+            </a:outerShdw>
+          </a:effectLst>
+          <a:extLst>
+            <a:ext uri="{909E8E84-426E-40DD-AFC4-6F175D3DCCD1}">
+              <a14:hiddenFill xmlns:a14="http://schemas.microsoft.com/office/drawing/2010/main">
+                <a:solidFill>
+                  <a:srgbClr val="FFFFFF"/>
+                </a:solidFill>
+              </a14:hiddenFill>
+            </a:ext>
+          </a:extLst>
+        </p:spPr>
+      </p:pic>
+    </p:spTree>
+    <p:extLst>
+      <p:ext uri="{BB962C8B-B14F-4D97-AF65-F5344CB8AC3E}">
+        <p14:creationId xmlns:p14="http://schemas.microsoft.com/office/powerpoint/2010/main" val="3168344023"/>
+      </p:ext>
+    </p:extLst>
+  </p:cSld>
+  <p:clrMapOvr>
+    <a:masterClrMapping/>
+  </p:clrMapOvr>
+  <p:timing>
+    <p:tnLst>
+      <p:par>
+        <p:cTn id="1" dur="indefinite" restart="never" nodeType="tmRoot">
+          <p:childTnLst>
+            <p:seq concurrent="1" nextAc="seek">
+              <p:cTn id="2" dur="indefinite" nodeType="mainSeq">
+                <p:childTnLst>
+                  <p:par>
+                    <p:cTn id="3" fill="hold">
+                      <p:stCondLst>
+                        <p:cond delay="indefinite"/>
+                      </p:stCondLst>
+                      <p:childTnLst>
+                        <p:par>
+                          <p:cTn id="4" fill="hold">
+                            <p:stCondLst>
+                              <p:cond delay="0"/>
+                            </p:stCondLst>
+                            <p:childTnLst>
+                              <p:par>
+                                <p:cTn id="5" presetID="10" presetClass="entr" presetSubtype="0" fill="hold" nodeType="clickEffect">
+                                  <p:stCondLst>
+                                    <p:cond delay="0"/>
+                                  </p:stCondLst>
+                                  <p:childTnLst>
+                                    <p:set>
+                                      <p:cBhvr>
+                                        <p:cTn id="6" dur="1" fill="hold">
+                                          <p:stCondLst>
+                                            <p:cond delay="0"/>
+                                          </p:stCondLst>
+                                        </p:cTn>
+                                        <p:tgtEl>
+                                          <p:spTgt spid="9"/>
+                                        </p:tgtEl>
+                                        <p:attrNameLst>
+                                          <p:attrName>style.visibility</p:attrName>
+                                        </p:attrNameLst>
+                                      </p:cBhvr>
+                                      <p:to>
+                                        <p:strVal val="visible"/>
+                                      </p:to>
+                                    </p:set>
+                                    <p:animEffect transition="in" filter="fade">
+                                      <p:cBhvr>
+                                        <p:cTn id="7" dur="500"/>
+                                        <p:tgtEl>
+                                          <p:spTgt spid="9"/>
+                                        </p:tgtEl>
+                                      </p:cBhvr>
+                                    </p:animEffect>
+                                  </p:childTnLst>
+                                </p:cTn>
+                              </p:par>
+                            </p:childTnLst>
+                          </p:cTn>
+                        </p:par>
+                      </p:childTnLst>
+                    </p:cTn>
+                  </p:par>
+                  <p:par>
+                    <p:cTn id="8" fill="hold">
+                      <p:stCondLst>
+                        <p:cond delay="indefinite"/>
+                      </p:stCondLst>
+                      <p:childTnLst>
+                        <p:par>
+                          <p:cTn id="9" fill="hold">
+                            <p:stCondLst>
+                              <p:cond delay="0"/>
+                            </p:stCondLst>
+                            <p:childTnLst>
+                              <p:par>
+                                <p:cTn id="10" presetID="10" presetClass="entr" presetSubtype="0" fill="hold" nodeType="clickEffect">
+                                  <p:stCondLst>
+                                    <p:cond delay="0"/>
+                                  </p:stCondLst>
+                                  <p:childTnLst>
+                                    <p:set>
+                                      <p:cBhvr>
+                                        <p:cTn id="11" dur="1" fill="hold">
+                                          <p:stCondLst>
+                                            <p:cond delay="0"/>
+                                          </p:stCondLst>
+                                        </p:cTn>
+                                        <p:tgtEl>
+                                          <p:spTgt spid="1027"/>
+                                        </p:tgtEl>
+                                        <p:attrNameLst>
+                                          <p:attrName>style.visibility</p:attrName>
+                                        </p:attrNameLst>
+                                      </p:cBhvr>
+                                      <p:to>
+                                        <p:strVal val="visible"/>
+                                      </p:to>
+                                    </p:set>
+                                    <p:animEffect transition="in" filter="fade">
+                                      <p:cBhvr>
+                                        <p:cTn id="12" dur="500"/>
+                                        <p:tgtEl>
+                                          <p:spTgt spid="1027"/>
+                                        </p:tgtEl>
+                                      </p:cBhvr>
+                                    </p:animEffect>
+                                  </p:childTnLst>
+                                </p:cTn>
+                              </p:par>
+                            </p:childTnLst>
+                          </p:cTn>
+                        </p:par>
+                      </p:childTnLst>
+                    </p:cTn>
+                  </p:par>
+                </p:childTnLst>
+              </p:cTn>
+              <p:prevCondLst>
+                <p:cond evt="onPrev" delay="0">
+                  <p:tgtEl>
+                    <p:sldTgt/>
+                  </p:tgtEl>
+                </p:cond>
+              </p:prevCondLst>
+              <p:nextCondLst>
+                <p:cond evt="onNext" delay="0">
+                  <p:tgtEl>
+                    <p:sldTgt/>
+                  </p:tgtEl>
+                </p:cond>
+              </p:nextCondLst>
+            </p:seq>
+          </p:childTnLst>
+        </p:cTn>
+      </p:par>
+    </p:tnLst>
+  </p:timing>
+</p:sld>
+</file>
+
+<file path=ppt/slides/slide12.xml><?xml version="1.0" encoding="utf-8"?>
+<p:sld xmlns:a="http://schemas.openxmlformats.org/drawingml/2006/main" xmlns:r="http://schemas.openxmlformats.org/officeDocument/2006/relationships" xmlns:p="http://schemas.openxmlformats.org/presentationml/2006/main">
+  <p:cSld>
+    <p:spTree>
+      <p:nvGrpSpPr>
+        <p:cNvPr id="1" name=""/>
+        <p:cNvGrpSpPr/>
+        <p:nvPr/>
+      </p:nvGrpSpPr>
+      <p:grpSpPr>
+        <a:xfrm>
+          <a:off x="0" y="0"/>
+          <a:ext cx="0" cy="0"/>
+          <a:chOff x="0" y="0"/>
+          <a:chExt cx="0" cy="0"/>
+        </a:xfrm>
+      </p:grpSpPr>
+      <p:sp>
+        <p:nvSpPr>
+          <p:cNvPr id="2" name="Rubrik 1"/>
+          <p:cNvSpPr>
+            <a:spLocks noGrp="1"/>
+          </p:cNvSpPr>
+          <p:nvPr>
+            <p:ph type="title"/>
+          </p:nvPr>
+        </p:nvSpPr>
+        <p:spPr>
+          <a:xfrm>
+            <a:off x="457200" y="2857500"/>
+            <a:ext cx="8229600" cy="1143000"/>
+          </a:xfrm>
+        </p:spPr>
+        <p:txBody>
+          <a:bodyPr/>
+          <a:lstStyle/>
+          <a:p>
+            <a:r>
+              <a:rPr lang="sv-SE" dirty="0" smtClean="0"/>
+              <a:t>Demo</a:t>
+            </a:r>
+            <a:endParaRPr lang="sv-SE" dirty="0"/>
+          </a:p>
+        </p:txBody>
+      </p:sp>
+      <p:sp>
+        <p:nvSpPr>
+          <p:cNvPr id="4" name="Platshållare för datum 3"/>
+          <p:cNvSpPr>
+            <a:spLocks noGrp="1"/>
+          </p:cNvSpPr>
+          <p:nvPr>
+            <p:ph type="dt" sz="half" idx="10"/>
+          </p:nvPr>
+        </p:nvSpPr>
+        <p:spPr/>
+        <p:txBody>
+          <a:bodyPr/>
+          <a:lstStyle/>
+          <a:p>
+            <a:fld id="{637124F9-74EC-4A1F-82AA-07908676A841}" type="datetime1">
+              <a:rPr lang="sv-SE" smtClean="0"/>
+              <a:t>2012-01-19</a:t>
+            </a:fld>
+            <a:endParaRPr lang="sv-SE"/>
+          </a:p>
+        </p:txBody>
+      </p:sp>
+      <p:sp>
+        <p:nvSpPr>
+          <p:cNvPr id="5" name="Platshållare för bildnummer 4"/>
+          <p:cNvSpPr>
+            <a:spLocks noGrp="1"/>
+          </p:cNvSpPr>
+          <p:nvPr>
+            <p:ph type="sldNum" sz="quarter" idx="12"/>
+          </p:nvPr>
+        </p:nvSpPr>
+        <p:spPr/>
+        <p:txBody>
+          <a:bodyPr/>
+          <a:lstStyle/>
+          <a:p>
+            <a:fld id="{87B9E5C0-0A56-4BE6-BE7D-E6FF370B7540}" type="slidenum">
+              <a:rPr lang="sv-SE" smtClean="0"/>
+              <a:t>12</a:t>
+            </a:fld>
+            <a:endParaRPr lang="sv-SE"/>
+          </a:p>
+        </p:txBody>
+      </p:sp>
+    </p:spTree>
+    <p:extLst>
+      <p:ext uri="{BB962C8B-B14F-4D97-AF65-F5344CB8AC3E}">
+        <p14:creationId xmlns:p14="http://schemas.microsoft.com/office/powerpoint/2010/main" val="3073427888"/>
+      </p:ext>
+    </p:extLst>
+  </p:cSld>
+  <p:clrMapOvr>
+    <a:masterClrMapping/>
+  </p:clrMapOvr>
   <p:timing>
     <p:tnLst>
       <p:par>
@@ -3683,6 +4297,46 @@
           <a:chExt cx="0" cy="0"/>
         </a:xfrm>
       </p:grpSpPr>
+      <p:pic>
+        <p:nvPicPr>
+          <p:cNvPr id="6" name="Bildobjekt 5"/>
+          <p:cNvPicPr>
+            <a:picLocks noChangeAspect="1"/>
+          </p:cNvPicPr>
+          <p:nvPr/>
+        </p:nvPicPr>
+        <p:blipFill>
+          <a:blip r:embed="rId2" cstate="print">
+            <a:extLst>
+              <a:ext uri="{28A0092B-C50C-407E-A947-70E740481C1C}">
+                <a14:useLocalDpi xmlns:a14="http://schemas.microsoft.com/office/drawing/2010/main" val="0"/>
+              </a:ext>
+            </a:extLst>
+          </a:blip>
+          <a:stretch>
+            <a:fillRect/>
+          </a:stretch>
+        </p:blipFill>
+        <p:spPr>
+          <a:xfrm>
+            <a:off x="4344178" y="3356992"/>
+            <a:ext cx="4692318" cy="2653459"/>
+          </a:xfrm>
+          <a:prstGeom prst="rect">
+            <a:avLst/>
+          </a:prstGeom>
+          <a:ln>
+            <a:noFill/>
+          </a:ln>
+          <a:effectLst>
+            <a:outerShdw blurRad="190500" algn="tl" rotWithShape="0">
+              <a:srgbClr val="000000">
+                <a:alpha val="70000"/>
+              </a:srgbClr>
+            </a:outerShdw>
+          </a:effectLst>
+        </p:spPr>
+      </p:pic>
       <p:sp>
         <p:nvSpPr>
           <p:cNvPr id="2" name="Rubrik 1"/>
@@ -3728,9 +4382,14 @@
             <p:ph idx="1"/>
           </p:nvPr>
         </p:nvSpPr>
-        <p:spPr/>
-        <p:txBody>
-          <a:bodyPr/>
+        <p:spPr>
+          <a:xfrm>
+            <a:off x="457200" y="1166019"/>
+            <a:ext cx="8229600" cy="4525963"/>
+          </a:xfrm>
+        </p:spPr>
+        <p:txBody>
+          <a:bodyPr anchor="ctr"/>
           <a:lstStyle/>
           <a:p>
             <a:r>
@@ -3827,6 +4486,18 @@
             <a:endParaRPr lang="sv-SE" dirty="0" smtClean="0"/>
           </a:p>
           <a:p>
+            <a:r>
+              <a:rPr lang="sv-SE" dirty="0" err="1" smtClean="0"/>
+              <a:t>Really</a:t>
+            </a:r>
+            <a:r>
+              <a:rPr lang="sv-SE" dirty="0" smtClean="0"/>
+              <a:t> old </a:t>
+            </a:r>
+            <a:r>
+              <a:rPr lang="sv-SE" dirty="0" err="1" smtClean="0"/>
+              <a:t>idea</a:t>
+            </a:r>
             <a:endParaRPr lang="sv-SE" dirty="0"/>
           </a:p>
         </p:txBody>
@@ -3848,7 +4519,7 @@
           <a:p>
             <a:fld id="{637124F9-74EC-4A1F-82AA-07908676A841}" type="datetime1">
               <a:rPr lang="sv-SE" smtClean="0"/>
-              <a:t>2011-05-26</a:t>
+              <a:t>2012-01-19</a:t>
             </a:fld>
             <a:endParaRPr lang="sv-SE"/>
           </a:p>
@@ -3890,9 +4561,332 @@
   <p:timing>
     <p:tnLst>
       <p:par>
-        <p:cTn id="1" dur="indefinite" restart="never" nodeType="tmRoot"/>
+        <p:cTn id="1" dur="indefinite" restart="never" nodeType="tmRoot">
+          <p:childTnLst>
+            <p:seq concurrent="1" nextAc="seek">
+              <p:cTn id="2" dur="indefinite" nodeType="mainSeq">
+                <p:childTnLst>
+                  <p:par>
+                    <p:cTn id="3" fill="hold">
+                      <p:stCondLst>
+                        <p:cond delay="indefinite"/>
+                      </p:stCondLst>
+                      <p:childTnLst>
+                        <p:par>
+                          <p:cTn id="4" fill="hold">
+                            <p:stCondLst>
+                              <p:cond delay="0"/>
+                            </p:stCondLst>
+                            <p:childTnLst>
+                              <p:par>
+                                <p:cTn id="5" presetID="10" presetClass="entr" presetSubtype="0" fill="hold" grpId="0" nodeType="clickEffect">
+                                  <p:stCondLst>
+                                    <p:cond delay="0"/>
+                                  </p:stCondLst>
+                                  <p:childTnLst>
+                                    <p:set>
+                                      <p:cBhvr>
+                                        <p:cTn id="6" dur="1" fill="hold">
+                                          <p:stCondLst>
+                                            <p:cond delay="0"/>
+                                          </p:stCondLst>
+                                        </p:cTn>
+                                        <p:tgtEl>
+                                          <p:spTgt spid="3">
+                                            <p:txEl>
+                                              <p:pRg st="0" end="0"/>
+                                            </p:txEl>
+                                          </p:spTgt>
+                                        </p:tgtEl>
+                                        <p:attrNameLst>
+                                          <p:attrName>style.visibility</p:attrName>
+                                        </p:attrNameLst>
+                                      </p:cBhvr>
+                                      <p:to>
+                                        <p:strVal val="visible"/>
+                                      </p:to>
+                                    </p:set>
+                                    <p:animEffect transition="in" filter="fade">
+                                      <p:cBhvr>
+                                        <p:cTn id="7" dur="500"/>
+                                        <p:tgtEl>
+                                          <p:spTgt spid="3">
+                                            <p:txEl>
+                                              <p:pRg st="0" end="0"/>
+                                            </p:txEl>
+                                          </p:spTgt>
+                                        </p:tgtEl>
+                                      </p:cBhvr>
+                                    </p:animEffect>
+                                  </p:childTnLst>
+                                </p:cTn>
+                              </p:par>
+                            </p:childTnLst>
+                          </p:cTn>
+                        </p:par>
+                      </p:childTnLst>
+                    </p:cTn>
+                  </p:par>
+                  <p:par>
+                    <p:cTn id="8" fill="hold">
+                      <p:stCondLst>
+                        <p:cond delay="indefinite"/>
+                      </p:stCondLst>
+                      <p:childTnLst>
+                        <p:par>
+                          <p:cTn id="9" fill="hold">
+                            <p:stCondLst>
+                              <p:cond delay="0"/>
+                            </p:stCondLst>
+                            <p:childTnLst>
+                              <p:par>
+                                <p:cTn id="10" presetID="10" presetClass="entr" presetSubtype="0" fill="hold" grpId="0" nodeType="clickEffect">
+                                  <p:stCondLst>
+                                    <p:cond delay="0"/>
+                                  </p:stCondLst>
+                                  <p:childTnLst>
+                                    <p:set>
+                                      <p:cBhvr>
+                                        <p:cTn id="11" dur="1" fill="hold">
+                                          <p:stCondLst>
+                                            <p:cond delay="0"/>
+                                          </p:stCondLst>
+                                        </p:cTn>
+                                        <p:tgtEl>
+                                          <p:spTgt spid="3">
+                                            <p:txEl>
+                                              <p:pRg st="1" end="1"/>
+                                            </p:txEl>
+                                          </p:spTgt>
+                                        </p:tgtEl>
+                                        <p:attrNameLst>
+                                          <p:attrName>style.visibility</p:attrName>
+                                        </p:attrNameLst>
+                                      </p:cBhvr>
+                                      <p:to>
+                                        <p:strVal val="visible"/>
+                                      </p:to>
+                                    </p:set>
+                                    <p:animEffect transition="in" filter="fade">
+                                      <p:cBhvr>
+                                        <p:cTn id="12" dur="500"/>
+                                        <p:tgtEl>
+                                          <p:spTgt spid="3">
+                                            <p:txEl>
+                                              <p:pRg st="1" end="1"/>
+                                            </p:txEl>
+                                          </p:spTgt>
+                                        </p:tgtEl>
+                                      </p:cBhvr>
+                                    </p:animEffect>
+                                  </p:childTnLst>
+                                </p:cTn>
+                              </p:par>
+                            </p:childTnLst>
+                          </p:cTn>
+                        </p:par>
+                      </p:childTnLst>
+                    </p:cTn>
+                  </p:par>
+                  <p:par>
+                    <p:cTn id="13" fill="hold">
+                      <p:stCondLst>
+                        <p:cond delay="indefinite"/>
+                      </p:stCondLst>
+                      <p:childTnLst>
+                        <p:par>
+                          <p:cTn id="14" fill="hold">
+                            <p:stCondLst>
+                              <p:cond delay="0"/>
+                            </p:stCondLst>
+                            <p:childTnLst>
+                              <p:par>
+                                <p:cTn id="15" presetID="10" presetClass="entr" presetSubtype="0" fill="hold" grpId="0" nodeType="clickEffect">
+                                  <p:stCondLst>
+                                    <p:cond delay="0"/>
+                                  </p:stCondLst>
+                                  <p:childTnLst>
+                                    <p:set>
+                                      <p:cBhvr>
+                                        <p:cTn id="16" dur="1" fill="hold">
+                                          <p:stCondLst>
+                                            <p:cond delay="0"/>
+                                          </p:stCondLst>
+                                        </p:cTn>
+                                        <p:tgtEl>
+                                          <p:spTgt spid="3">
+                                            <p:txEl>
+                                              <p:pRg st="2" end="2"/>
+                                            </p:txEl>
+                                          </p:spTgt>
+                                        </p:tgtEl>
+                                        <p:attrNameLst>
+                                          <p:attrName>style.visibility</p:attrName>
+                                        </p:attrNameLst>
+                                      </p:cBhvr>
+                                      <p:to>
+                                        <p:strVal val="visible"/>
+                                      </p:to>
+                                    </p:set>
+                                    <p:animEffect transition="in" filter="fade">
+                                      <p:cBhvr>
+                                        <p:cTn id="17" dur="500"/>
+                                        <p:tgtEl>
+                                          <p:spTgt spid="3">
+                                            <p:txEl>
+                                              <p:pRg st="2" end="2"/>
+                                            </p:txEl>
+                                          </p:spTgt>
+                                        </p:tgtEl>
+                                      </p:cBhvr>
+                                    </p:animEffect>
+                                  </p:childTnLst>
+                                </p:cTn>
+                              </p:par>
+                            </p:childTnLst>
+                          </p:cTn>
+                        </p:par>
+                      </p:childTnLst>
+                    </p:cTn>
+                  </p:par>
+                  <p:par>
+                    <p:cTn id="18" fill="hold">
+                      <p:stCondLst>
+                        <p:cond delay="indefinite"/>
+                      </p:stCondLst>
+                      <p:childTnLst>
+                        <p:par>
+                          <p:cTn id="19" fill="hold">
+                            <p:stCondLst>
+                              <p:cond delay="0"/>
+                            </p:stCondLst>
+                            <p:childTnLst>
+                              <p:par>
+                                <p:cTn id="20" presetID="10" presetClass="entr" presetSubtype="0" fill="hold" grpId="0" nodeType="clickEffect">
+                                  <p:stCondLst>
+                                    <p:cond delay="0"/>
+                                  </p:stCondLst>
+                                  <p:childTnLst>
+                                    <p:set>
+                                      <p:cBhvr>
+                                        <p:cTn id="21" dur="1" fill="hold">
+                                          <p:stCondLst>
+                                            <p:cond delay="0"/>
+                                          </p:stCondLst>
+                                        </p:cTn>
+                                        <p:tgtEl>
+                                          <p:spTgt spid="3">
+                                            <p:txEl>
+                                              <p:pRg st="3" end="3"/>
+                                            </p:txEl>
+                                          </p:spTgt>
+                                        </p:tgtEl>
+                                        <p:attrNameLst>
+                                          <p:attrName>style.visibility</p:attrName>
+                                        </p:attrNameLst>
+                                      </p:cBhvr>
+                                      <p:to>
+                                        <p:strVal val="visible"/>
+                                      </p:to>
+                                    </p:set>
+                                    <p:animEffect transition="in" filter="fade">
+                                      <p:cBhvr>
+                                        <p:cTn id="22" dur="500"/>
+                                        <p:tgtEl>
+                                          <p:spTgt spid="3">
+                                            <p:txEl>
+                                              <p:pRg st="3" end="3"/>
+                                            </p:txEl>
+                                          </p:spTgt>
+                                        </p:tgtEl>
+                                      </p:cBhvr>
+                                    </p:animEffect>
+                                  </p:childTnLst>
+                                </p:cTn>
+                              </p:par>
+                            </p:childTnLst>
+                          </p:cTn>
+                        </p:par>
+                      </p:childTnLst>
+                    </p:cTn>
+                  </p:par>
+                  <p:par>
+                    <p:cTn id="23" fill="hold">
+                      <p:stCondLst>
+                        <p:cond delay="indefinite"/>
+                      </p:stCondLst>
+                      <p:childTnLst>
+                        <p:par>
+                          <p:cTn id="24" fill="hold">
+                            <p:stCondLst>
+                              <p:cond delay="0"/>
+                            </p:stCondLst>
+                            <p:childTnLst>
+                              <p:par>
+                                <p:cTn id="25" presetID="10" presetClass="entr" presetSubtype="0" fill="hold" nodeType="clickEffect">
+                                  <p:stCondLst>
+                                    <p:cond delay="0"/>
+                                  </p:stCondLst>
+                                  <p:childTnLst>
+                                    <p:set>
+                                      <p:cBhvr>
+                                        <p:cTn id="26" dur="1" fill="hold">
+                                          <p:stCondLst>
+                                            <p:cond delay="0"/>
+                                          </p:stCondLst>
+                                        </p:cTn>
+                                        <p:tgtEl>
+                                          <p:spTgt spid="6"/>
+                                        </p:tgtEl>
+                                        <p:attrNameLst>
+                                          <p:attrName>style.visibility</p:attrName>
+                                        </p:attrNameLst>
+                                      </p:cBhvr>
+                                      <p:to>
+                                        <p:strVal val="visible"/>
+                                      </p:to>
+                                    </p:set>
+                                    <p:animEffect transition="in" filter="fade">
+                                      <p:cBhvr>
+                                        <p:cTn id="27" dur="500"/>
+                                        <p:tgtEl>
+                                          <p:spTgt spid="6"/>
+                                        </p:tgtEl>
+                                      </p:cBhvr>
+                                    </p:animEffect>
+                                  </p:childTnLst>
+                                </p:cTn>
+                              </p:par>
+                            </p:childTnLst>
+                          </p:cTn>
+                        </p:par>
+                      </p:childTnLst>
+                    </p:cTn>
+                  </p:par>
+                </p:childTnLst>
+              </p:cTn>
+              <p:prevCondLst>
+                <p:cond evt="onPrev" delay="0">
+                  <p:tgtEl>
+                    <p:sldTgt/>
+                  </p:tgtEl>
+                </p:cond>
+              </p:prevCondLst>
+              <p:nextCondLst>
+                <p:cond evt="onNext" delay="0">
+                  <p:tgtEl>
+                    <p:sldTgt/>
+                  </p:tgtEl>
+                </p:cond>
+              </p:nextCondLst>
+            </p:seq>
+          </p:childTnLst>
+        </p:cTn>
       </p:par>
     </p:tnLst>
+    <p:bldLst>
+      <p:bldP spid="3" grpId="0" build="p"/>
+    </p:bldLst>
   </p:timing>
 </p:sld>
 </file>
@@ -3961,12 +4955,12 @@
         </p:nvSpPr>
         <p:spPr>
           <a:xfrm>
-            <a:off x="457200" y="1600200"/>
+            <a:off x="457200" y="1326469"/>
             <a:ext cx="8229600" cy="4205063"/>
           </a:xfrm>
         </p:spPr>
         <p:txBody>
-          <a:bodyPr>
+          <a:bodyPr anchor="ctr">
             <a:normAutofit/>
           </a:bodyPr>
           <a:lstStyle/>
@@ -4132,7 +5126,7 @@
           <a:p>
             <a:fld id="{637124F9-74EC-4A1F-82AA-07908676A841}" type="datetime1">
               <a:rPr lang="sv-SE" smtClean="0"/>
-              <a:t>2011-05-26</a:t>
+              <a:t>2012-01-19</a:t>
             </a:fld>
             <a:endParaRPr lang="sv-SE"/>
           </a:p>
@@ -4174,9 +5168,218 @@
   <p:timing>
     <p:tnLst>
       <p:par>
-        <p:cTn id="1" dur="indefinite" restart="never" nodeType="tmRoot"/>
+        <p:cTn id="1" dur="indefinite" restart="never" nodeType="tmRoot">
+          <p:childTnLst>
+            <p:seq concurrent="1" nextAc="seek">
+              <p:cTn id="2" dur="indefinite" nodeType="mainSeq">
+                <p:childTnLst>
+                  <p:par>
+                    <p:cTn id="3" fill="hold">
+                      <p:stCondLst>
+                        <p:cond delay="indefinite"/>
+                      </p:stCondLst>
+                      <p:childTnLst>
+                        <p:par>
+                          <p:cTn id="4" fill="hold">
+                            <p:stCondLst>
+                              <p:cond delay="0"/>
+                            </p:stCondLst>
+                            <p:childTnLst>
+                              <p:par>
+                                <p:cTn id="5" presetID="10" presetClass="entr" presetSubtype="0" fill="hold" grpId="0" nodeType="clickEffect">
+                                  <p:stCondLst>
+                                    <p:cond delay="0"/>
+                                  </p:stCondLst>
+                                  <p:childTnLst>
+                                    <p:set>
+                                      <p:cBhvr>
+                                        <p:cTn id="6" dur="1" fill="hold">
+                                          <p:stCondLst>
+                                            <p:cond delay="0"/>
+                                          </p:stCondLst>
+                                        </p:cTn>
+                                        <p:tgtEl>
+                                          <p:spTgt spid="3">
+                                            <p:txEl>
+                                              <p:pRg st="0" end="0"/>
+                                            </p:txEl>
+                                          </p:spTgt>
+                                        </p:tgtEl>
+                                        <p:attrNameLst>
+                                          <p:attrName>style.visibility</p:attrName>
+                                        </p:attrNameLst>
+                                      </p:cBhvr>
+                                      <p:to>
+                                        <p:strVal val="visible"/>
+                                      </p:to>
+                                    </p:set>
+                                    <p:animEffect transition="in" filter="fade">
+                                      <p:cBhvr>
+                                        <p:cTn id="7" dur="500"/>
+                                        <p:tgtEl>
+                                          <p:spTgt spid="3">
+                                            <p:txEl>
+                                              <p:pRg st="0" end="0"/>
+                                            </p:txEl>
+                                          </p:spTgt>
+                                        </p:tgtEl>
+                                      </p:cBhvr>
+                                    </p:animEffect>
+                                  </p:childTnLst>
+                                </p:cTn>
+                              </p:par>
+                            </p:childTnLst>
+                          </p:cTn>
+                        </p:par>
+                      </p:childTnLst>
+                    </p:cTn>
+                  </p:par>
+                  <p:par>
+                    <p:cTn id="8" fill="hold">
+                      <p:stCondLst>
+                        <p:cond delay="indefinite"/>
+                      </p:stCondLst>
+                      <p:childTnLst>
+                        <p:par>
+                          <p:cTn id="9" fill="hold">
+                            <p:stCondLst>
+                              <p:cond delay="0"/>
+                            </p:stCondLst>
+                            <p:childTnLst>
+                              <p:par>
+                                <p:cTn id="10" presetID="10" presetClass="entr" presetSubtype="0" fill="hold" grpId="0" nodeType="clickEffect">
+                                  <p:stCondLst>
+                                    <p:cond delay="0"/>
+                                  </p:stCondLst>
+                                  <p:childTnLst>
+                                    <p:set>
+                                      <p:cBhvr>
+                                        <p:cTn id="11" dur="1" fill="hold">
+                                          <p:stCondLst>
+                                            <p:cond delay="0"/>
+                                          </p:stCondLst>
+                                        </p:cTn>
+                                        <p:tgtEl>
+                                          <p:spTgt spid="3">
+                                            <p:txEl>
+                                              <p:pRg st="1" end="1"/>
+                                            </p:txEl>
+                                          </p:spTgt>
+                                        </p:tgtEl>
+                                        <p:attrNameLst>
+                                          <p:attrName>style.visibility</p:attrName>
+                                        </p:attrNameLst>
+                                      </p:cBhvr>
+                                      <p:to>
+                                        <p:strVal val="visible"/>
+                                      </p:to>
+                                    </p:set>
+                                    <p:animEffect transition="in" filter="fade">
+                                      <p:cBhvr>
+                                        <p:cTn id="12" dur="500"/>
+                                        <p:tgtEl>
+                                          <p:spTgt spid="3">
+                                            <p:txEl>
+                                              <p:pRg st="1" end="1"/>
+                                            </p:txEl>
+                                          </p:spTgt>
+                                        </p:tgtEl>
+                                      </p:cBhvr>
+                                    </p:animEffect>
+                                  </p:childTnLst>
+                                </p:cTn>
+                              </p:par>
+                            </p:childTnLst>
+                          </p:cTn>
+                        </p:par>
+                      </p:childTnLst>
+                    </p:cTn>
+                  </p:par>
+                  <p:par>
+                    <p:cTn id="13" fill="hold">
+                      <p:stCondLst>
+                        <p:cond delay="indefinite"/>
+                      </p:stCondLst>
+                      <p:childTnLst>
+                        <p:par>
+                          <p:cTn id="14" fill="hold">
+                            <p:stCondLst>
+                              <p:cond delay="0"/>
+                            </p:stCondLst>
+                            <p:childTnLst>
+                              <p:par>
+                                <p:cTn id="15" presetID="10" presetClass="entr" presetSubtype="0" fill="hold" grpId="0" nodeType="clickEffect">
+                                  <p:stCondLst>
+                                    <p:cond delay="0"/>
+                                  </p:stCondLst>
+                                  <p:childTnLst>
+                                    <p:set>
+                                      <p:cBhvr>
+                                        <p:cTn id="16" dur="1" fill="hold">
+                                          <p:stCondLst>
+                                            <p:cond delay="0"/>
+                                          </p:stCondLst>
+                                        </p:cTn>
+                                        <p:tgtEl>
+                                          <p:spTgt spid="3">
+                                            <p:txEl>
+                                              <p:pRg st="2" end="2"/>
+                                            </p:txEl>
+                                          </p:spTgt>
+                                        </p:tgtEl>
+                                        <p:attrNameLst>
+                                          <p:attrName>style.visibility</p:attrName>
+                                        </p:attrNameLst>
+                                      </p:cBhvr>
+                                      <p:to>
+                                        <p:strVal val="visible"/>
+                                      </p:to>
+                                    </p:set>
+                                    <p:animEffect transition="in" filter="fade">
+                                      <p:cBhvr>
+                                        <p:cTn id="17" dur="500"/>
+                                        <p:tgtEl>
+                                          <p:spTgt spid="3">
+                                            <p:txEl>
+                                              <p:pRg st="2" end="2"/>
+                                            </p:txEl>
+                                          </p:spTgt>
+                                        </p:tgtEl>
+                                      </p:cBhvr>
+                                    </p:animEffect>
+                                  </p:childTnLst>
+                                </p:cTn>
+                              </p:par>
+                            </p:childTnLst>
+                          </p:cTn>
+                        </p:par>
+                      </p:childTnLst>
+                    </p:cTn>
+                  </p:par>
+                </p:childTnLst>
+              </p:cTn>
+              <p:prevCondLst>
+                <p:cond evt="onPrev" delay="0">
+                  <p:tgtEl>
+                    <p:sldTgt/>
+                  </p:tgtEl>
+                </p:cond>
+              </p:prevCondLst>
+              <p:nextCondLst>
+                <p:cond evt="onNext" delay="0">
+                  <p:tgtEl>
+                    <p:sldTgt/>
+                  </p:tgtEl>
+                </p:cond>
+              </p:nextCondLst>
+            </p:seq>
+          </p:childTnLst>
+        </p:cTn>
       </p:par>
     </p:tnLst>
+    <p:bldLst>
+      <p:bldP spid="3" grpId="0" build="p"/>
+    </p:bldLst>
   </p:timing>
 </p:sld>
 </file>
@@ -4231,9 +5434,14 @@
             <p:ph idx="1"/>
           </p:nvPr>
         </p:nvSpPr>
-        <p:spPr/>
-        <p:txBody>
-          <a:bodyPr/>
+        <p:spPr>
+          <a:xfrm>
+            <a:off x="457200" y="1656587"/>
+            <a:ext cx="8229600" cy="3544826"/>
+          </a:xfrm>
+        </p:spPr>
+        <p:txBody>
+          <a:bodyPr anchor="ctr"/>
           <a:lstStyle/>
           <a:p>
             <a:r>
@@ -4333,7 +5541,7 @@
           <a:p>
             <a:fld id="{637124F9-74EC-4A1F-82AA-07908676A841}" type="datetime1">
               <a:rPr lang="sv-SE" smtClean="0"/>
-              <a:t>2011-05-26</a:t>
+              <a:t>2012-01-19</a:t>
             </a:fld>
             <a:endParaRPr lang="sv-SE"/>
           </a:p>
@@ -4375,9 +5583,218 @@
   <p:timing>
     <p:tnLst>
       <p:par>
-        <p:cTn id="1" dur="indefinite" restart="never" nodeType="tmRoot"/>
+        <p:cTn id="1" dur="indefinite" restart="never" nodeType="tmRoot">
+          <p:childTnLst>
+            <p:seq concurrent="1" nextAc="seek">
+              <p:cTn id="2" dur="indefinite" nodeType="mainSeq">
+                <p:childTnLst>
+                  <p:par>
+                    <p:cTn id="3" fill="hold">
+                      <p:stCondLst>
+                        <p:cond delay="indefinite"/>
+                      </p:stCondLst>
+                      <p:childTnLst>
+                        <p:par>
+                          <p:cTn id="4" fill="hold">
+                            <p:stCondLst>
+                              <p:cond delay="0"/>
+                            </p:stCondLst>
+                            <p:childTnLst>
+                              <p:par>
+                                <p:cTn id="5" presetID="10" presetClass="entr" presetSubtype="0" fill="hold" grpId="0" nodeType="clickEffect">
+                                  <p:stCondLst>
+                                    <p:cond delay="0"/>
+                                  </p:stCondLst>
+                                  <p:childTnLst>
+                                    <p:set>
+                                      <p:cBhvr>
+                                        <p:cTn id="6" dur="1" fill="hold">
+                                          <p:stCondLst>
+                                            <p:cond delay="0"/>
+                                          </p:stCondLst>
+                                        </p:cTn>
+                                        <p:tgtEl>
+                                          <p:spTgt spid="3">
+                                            <p:txEl>
+                                              <p:pRg st="0" end="0"/>
+                                            </p:txEl>
+                                          </p:spTgt>
+                                        </p:tgtEl>
+                                        <p:attrNameLst>
+                                          <p:attrName>style.visibility</p:attrName>
+                                        </p:attrNameLst>
+                                      </p:cBhvr>
+                                      <p:to>
+                                        <p:strVal val="visible"/>
+                                      </p:to>
+                                    </p:set>
+                                    <p:animEffect transition="in" filter="fade">
+                                      <p:cBhvr>
+                                        <p:cTn id="7" dur="500"/>
+                                        <p:tgtEl>
+                                          <p:spTgt spid="3">
+                                            <p:txEl>
+                                              <p:pRg st="0" end="0"/>
+                                            </p:txEl>
+                                          </p:spTgt>
+                                        </p:tgtEl>
+                                      </p:cBhvr>
+                                    </p:animEffect>
+                                  </p:childTnLst>
+                                </p:cTn>
+                              </p:par>
+                            </p:childTnLst>
+                          </p:cTn>
+                        </p:par>
+                      </p:childTnLst>
+                    </p:cTn>
+                  </p:par>
+                  <p:par>
+                    <p:cTn id="8" fill="hold">
+                      <p:stCondLst>
+                        <p:cond delay="indefinite"/>
+                      </p:stCondLst>
+                      <p:childTnLst>
+                        <p:par>
+                          <p:cTn id="9" fill="hold">
+                            <p:stCondLst>
+                              <p:cond delay="0"/>
+                            </p:stCondLst>
+                            <p:childTnLst>
+                              <p:par>
+                                <p:cTn id="10" presetID="10" presetClass="entr" presetSubtype="0" fill="hold" grpId="0" nodeType="clickEffect">
+                                  <p:stCondLst>
+                                    <p:cond delay="0"/>
+                                  </p:stCondLst>
+                                  <p:childTnLst>
+                                    <p:set>
+                                      <p:cBhvr>
+                                        <p:cTn id="11" dur="1" fill="hold">
+                                          <p:stCondLst>
+                                            <p:cond delay="0"/>
+                                          </p:stCondLst>
+                                        </p:cTn>
+                                        <p:tgtEl>
+                                          <p:spTgt spid="3">
+                                            <p:txEl>
+                                              <p:pRg st="1" end="1"/>
+                                            </p:txEl>
+                                          </p:spTgt>
+                                        </p:tgtEl>
+                                        <p:attrNameLst>
+                                          <p:attrName>style.visibility</p:attrName>
+                                        </p:attrNameLst>
+                                      </p:cBhvr>
+                                      <p:to>
+                                        <p:strVal val="visible"/>
+                                      </p:to>
+                                    </p:set>
+                                    <p:animEffect transition="in" filter="fade">
+                                      <p:cBhvr>
+                                        <p:cTn id="12" dur="500"/>
+                                        <p:tgtEl>
+                                          <p:spTgt spid="3">
+                                            <p:txEl>
+                                              <p:pRg st="1" end="1"/>
+                                            </p:txEl>
+                                          </p:spTgt>
+                                        </p:tgtEl>
+                                      </p:cBhvr>
+                                    </p:animEffect>
+                                  </p:childTnLst>
+                                </p:cTn>
+                              </p:par>
+                            </p:childTnLst>
+                          </p:cTn>
+                        </p:par>
+                      </p:childTnLst>
+                    </p:cTn>
+                  </p:par>
+                  <p:par>
+                    <p:cTn id="13" fill="hold">
+                      <p:stCondLst>
+                        <p:cond delay="indefinite"/>
+                      </p:stCondLst>
+                      <p:childTnLst>
+                        <p:par>
+                          <p:cTn id="14" fill="hold">
+                            <p:stCondLst>
+                              <p:cond delay="0"/>
+                            </p:stCondLst>
+                            <p:childTnLst>
+                              <p:par>
+                                <p:cTn id="15" presetID="10" presetClass="entr" presetSubtype="0" fill="hold" grpId="0" nodeType="clickEffect">
+                                  <p:stCondLst>
+                                    <p:cond delay="0"/>
+                                  </p:stCondLst>
+                                  <p:childTnLst>
+                                    <p:set>
+                                      <p:cBhvr>
+                                        <p:cTn id="16" dur="1" fill="hold">
+                                          <p:stCondLst>
+                                            <p:cond delay="0"/>
+                                          </p:stCondLst>
+                                        </p:cTn>
+                                        <p:tgtEl>
+                                          <p:spTgt spid="3">
+                                            <p:txEl>
+                                              <p:pRg st="2" end="2"/>
+                                            </p:txEl>
+                                          </p:spTgt>
+                                        </p:tgtEl>
+                                        <p:attrNameLst>
+                                          <p:attrName>style.visibility</p:attrName>
+                                        </p:attrNameLst>
+                                      </p:cBhvr>
+                                      <p:to>
+                                        <p:strVal val="visible"/>
+                                      </p:to>
+                                    </p:set>
+                                    <p:animEffect transition="in" filter="fade">
+                                      <p:cBhvr>
+                                        <p:cTn id="17" dur="500"/>
+                                        <p:tgtEl>
+                                          <p:spTgt spid="3">
+                                            <p:txEl>
+                                              <p:pRg st="2" end="2"/>
+                                            </p:txEl>
+                                          </p:spTgt>
+                                        </p:tgtEl>
+                                      </p:cBhvr>
+                                    </p:animEffect>
+                                  </p:childTnLst>
+                                </p:cTn>
+                              </p:par>
+                            </p:childTnLst>
+                          </p:cTn>
+                        </p:par>
+                      </p:childTnLst>
+                    </p:cTn>
+                  </p:par>
+                </p:childTnLst>
+              </p:cTn>
+              <p:prevCondLst>
+                <p:cond evt="onPrev" delay="0">
+                  <p:tgtEl>
+                    <p:sldTgt/>
+                  </p:tgtEl>
+                </p:cond>
+              </p:prevCondLst>
+              <p:nextCondLst>
+                <p:cond evt="onNext" delay="0">
+                  <p:tgtEl>
+                    <p:sldTgt/>
+                  </p:tgtEl>
+                </p:cond>
+              </p:nextCondLst>
+            </p:seq>
+          </p:childTnLst>
+        </p:cTn>
       </p:par>
     </p:tnLst>
+    <p:bldLst>
+      <p:bldP spid="3" grpId="0" build="p"/>
+    </p:bldLst>
   </p:timing>
 </p:sld>
 </file>
@@ -4415,6 +5832,870 @@
           <a:lstStyle/>
           <a:p>
             <a:r>
+              <a:rPr lang="sv-SE" dirty="0" err="1" smtClean="0"/>
+              <a:t>Depth</a:t>
+            </a:r>
+            <a:r>
+              <a:rPr lang="sv-SE" dirty="0" smtClean="0"/>
+              <a:t> </a:t>
+            </a:r>
+            <a:r>
+              <a:rPr lang="sv-SE" dirty="0" err="1" smtClean="0"/>
+              <a:t>encoding</a:t>
+            </a:r>
+            <a:endParaRPr lang="sv-SE" dirty="0"/>
+          </a:p>
+        </p:txBody>
+      </p:sp>
+      <p:sp>
+        <p:nvSpPr>
+          <p:cNvPr id="3" name="Platshållare för innehåll 2"/>
+          <p:cNvSpPr>
+            <a:spLocks noGrp="1"/>
+          </p:cNvSpPr>
+          <p:nvPr>
+            <p:ph idx="1"/>
+          </p:nvPr>
+        </p:nvSpPr>
+        <p:spPr>
+          <a:xfrm>
+            <a:off x="457200" y="1468351"/>
+            <a:ext cx="8229600" cy="3921299"/>
+          </a:xfrm>
+        </p:spPr>
+        <p:txBody>
+          <a:bodyPr anchor="ctr"/>
+          <a:lstStyle/>
+          <a:p>
+            <a:r>
+              <a:rPr lang="sv-SE" dirty="0" err="1" smtClean="0"/>
+              <a:t>Depth</a:t>
+            </a:r>
+            <a:r>
+              <a:rPr lang="sv-SE" dirty="0" smtClean="0"/>
+              <a:t> Resolution is not </a:t>
+            </a:r>
+            <a:r>
+              <a:rPr lang="sv-SE" dirty="0" err="1" smtClean="0"/>
+              <a:t>linear</a:t>
+            </a:r>
+            <a:r>
+              <a:rPr lang="sv-SE" dirty="0" smtClean="0"/>
+              <a:t/>
+            </a:r>
+            <a:br>
+              <a:rPr lang="sv-SE" dirty="0" smtClean="0"/>
+            </a:br>
+            <a:endParaRPr lang="sv-SE" dirty="0" smtClean="0"/>
+          </a:p>
+          <a:p>
+            <a:r>
+              <a:rPr lang="sv-SE" dirty="0" err="1" smtClean="0"/>
+              <a:t>Unproject</a:t>
+            </a:r>
+            <a:r>
+              <a:rPr lang="sv-SE" dirty="0" smtClean="0"/>
+              <a:t> and store </a:t>
+            </a:r>
+            <a:r>
+              <a:rPr lang="sv-SE" dirty="0" err="1" smtClean="0"/>
+              <a:t>linear</a:t>
+            </a:r>
+            <a:r>
+              <a:rPr lang="sv-SE" dirty="0" smtClean="0"/>
+              <a:t> </a:t>
+            </a:r>
+            <a:r>
+              <a:rPr lang="sv-SE" dirty="0" err="1" smtClean="0"/>
+              <a:t>depth</a:t>
+            </a:r>
+            <a:r>
+              <a:rPr lang="sv-SE" dirty="0" smtClean="0"/>
+              <a:t/>
+            </a:r>
+            <a:br>
+              <a:rPr lang="sv-SE" dirty="0" smtClean="0"/>
+            </a:br>
+            <a:endParaRPr lang="sv-SE" dirty="0" smtClean="0"/>
+          </a:p>
+          <a:p>
+            <a:r>
+              <a:rPr lang="sv-SE" dirty="0" err="1" smtClean="0"/>
+              <a:t>Use</a:t>
+            </a:r>
+            <a:r>
+              <a:rPr lang="sv-SE" dirty="0" smtClean="0"/>
+              <a:t> </a:t>
+            </a:r>
+            <a:r>
+              <a:rPr lang="sv-SE" dirty="0" err="1" smtClean="0"/>
+              <a:t>frustum</a:t>
+            </a:r>
+            <a:r>
+              <a:rPr lang="sv-SE" dirty="0" smtClean="0"/>
+              <a:t> </a:t>
+            </a:r>
+            <a:r>
+              <a:rPr lang="sv-SE" dirty="0" err="1" smtClean="0"/>
+              <a:t>to</a:t>
+            </a:r>
+            <a:r>
+              <a:rPr lang="sv-SE" dirty="0" smtClean="0"/>
+              <a:t> </a:t>
+            </a:r>
+            <a:r>
+              <a:rPr lang="sv-SE" dirty="0" err="1" smtClean="0"/>
+              <a:t>recover</a:t>
+            </a:r>
+            <a:r>
+              <a:rPr lang="sv-SE" dirty="0" smtClean="0"/>
+              <a:t> </a:t>
+            </a:r>
+            <a:r>
+              <a:rPr lang="sv-SE" dirty="0" err="1" smtClean="0"/>
+              <a:t>view</a:t>
+            </a:r>
+            <a:r>
+              <a:rPr lang="sv-SE" dirty="0" smtClean="0"/>
+              <a:t> space position from </a:t>
+            </a:r>
+            <a:r>
+              <a:rPr lang="sv-SE" dirty="0" err="1" smtClean="0"/>
+              <a:t>depth</a:t>
+            </a:r>
+            <a:endParaRPr lang="sv-SE" dirty="0"/>
+          </a:p>
+        </p:txBody>
+      </p:sp>
+      <p:sp>
+        <p:nvSpPr>
+          <p:cNvPr id="4" name="Platshållare för datum 3"/>
+          <p:cNvSpPr>
+            <a:spLocks noGrp="1"/>
+          </p:cNvSpPr>
+          <p:nvPr>
+            <p:ph type="dt" sz="half" idx="10"/>
+          </p:nvPr>
+        </p:nvSpPr>
+        <p:spPr/>
+        <p:txBody>
+          <a:bodyPr/>
+          <a:lstStyle/>
+          <a:p>
+            <a:fld id="{637124F9-74EC-4A1F-82AA-07908676A841}" type="datetime1">
+              <a:rPr lang="sv-SE" smtClean="0"/>
+              <a:t>2012-01-19</a:t>
+            </a:fld>
+            <a:endParaRPr lang="sv-SE"/>
+          </a:p>
+        </p:txBody>
+      </p:sp>
+      <p:sp>
+        <p:nvSpPr>
+          <p:cNvPr id="5" name="Platshållare för bildnummer 4"/>
+          <p:cNvSpPr>
+            <a:spLocks noGrp="1"/>
+          </p:cNvSpPr>
+          <p:nvPr>
+            <p:ph type="sldNum" sz="quarter" idx="12"/>
+          </p:nvPr>
+        </p:nvSpPr>
+        <p:spPr/>
+        <p:txBody>
+          <a:bodyPr/>
+          <a:lstStyle/>
+          <a:p>
+            <a:fld id="{87B9E5C0-0A56-4BE6-BE7D-E6FF370B7540}" type="slidenum">
+              <a:rPr lang="sv-SE" smtClean="0"/>
+              <a:t>5</a:t>
+            </a:fld>
+            <a:endParaRPr lang="sv-SE"/>
+          </a:p>
+        </p:txBody>
+      </p:sp>
+    </p:spTree>
+    <p:extLst>
+      <p:ext uri="{BB962C8B-B14F-4D97-AF65-F5344CB8AC3E}">
+        <p14:creationId xmlns:p14="http://schemas.microsoft.com/office/powerpoint/2010/main" val="2812468809"/>
+      </p:ext>
+    </p:extLst>
+  </p:cSld>
+  <p:clrMapOvr>
+    <a:masterClrMapping/>
+  </p:clrMapOvr>
+  <p:timing>
+    <p:tnLst>
+      <p:par>
+        <p:cTn id="1" dur="indefinite" restart="never" nodeType="tmRoot">
+          <p:childTnLst>
+            <p:seq concurrent="1" nextAc="seek">
+              <p:cTn id="2" dur="indefinite" nodeType="mainSeq">
+                <p:childTnLst>
+                  <p:par>
+                    <p:cTn id="3" fill="hold">
+                      <p:stCondLst>
+                        <p:cond delay="indefinite"/>
+                      </p:stCondLst>
+                      <p:childTnLst>
+                        <p:par>
+                          <p:cTn id="4" fill="hold">
+                            <p:stCondLst>
+                              <p:cond delay="0"/>
+                            </p:stCondLst>
+                            <p:childTnLst>
+                              <p:par>
+                                <p:cTn id="5" presetID="10" presetClass="entr" presetSubtype="0" fill="hold" grpId="0" nodeType="clickEffect">
+                                  <p:stCondLst>
+                                    <p:cond delay="0"/>
+                                  </p:stCondLst>
+                                  <p:childTnLst>
+                                    <p:set>
+                                      <p:cBhvr>
+                                        <p:cTn id="6" dur="1" fill="hold">
+                                          <p:stCondLst>
+                                            <p:cond delay="0"/>
+                                          </p:stCondLst>
+                                        </p:cTn>
+                                        <p:tgtEl>
+                                          <p:spTgt spid="3">
+                                            <p:txEl>
+                                              <p:pRg st="0" end="0"/>
+                                            </p:txEl>
+                                          </p:spTgt>
+                                        </p:tgtEl>
+                                        <p:attrNameLst>
+                                          <p:attrName>style.visibility</p:attrName>
+                                        </p:attrNameLst>
+                                      </p:cBhvr>
+                                      <p:to>
+                                        <p:strVal val="visible"/>
+                                      </p:to>
+                                    </p:set>
+                                    <p:animEffect transition="in" filter="fade">
+                                      <p:cBhvr>
+                                        <p:cTn id="7" dur="500"/>
+                                        <p:tgtEl>
+                                          <p:spTgt spid="3">
+                                            <p:txEl>
+                                              <p:pRg st="0" end="0"/>
+                                            </p:txEl>
+                                          </p:spTgt>
+                                        </p:tgtEl>
+                                      </p:cBhvr>
+                                    </p:animEffect>
+                                  </p:childTnLst>
+                                </p:cTn>
+                              </p:par>
+                            </p:childTnLst>
+                          </p:cTn>
+                        </p:par>
+                      </p:childTnLst>
+                    </p:cTn>
+                  </p:par>
+                  <p:par>
+                    <p:cTn id="8" fill="hold">
+                      <p:stCondLst>
+                        <p:cond delay="indefinite"/>
+                      </p:stCondLst>
+                      <p:childTnLst>
+                        <p:par>
+                          <p:cTn id="9" fill="hold">
+                            <p:stCondLst>
+                              <p:cond delay="0"/>
+                            </p:stCondLst>
+                            <p:childTnLst>
+                              <p:par>
+                                <p:cTn id="10" presetID="10" presetClass="entr" presetSubtype="0" fill="hold" grpId="0" nodeType="clickEffect">
+                                  <p:stCondLst>
+                                    <p:cond delay="0"/>
+                                  </p:stCondLst>
+                                  <p:childTnLst>
+                                    <p:set>
+                                      <p:cBhvr>
+                                        <p:cTn id="11" dur="1" fill="hold">
+                                          <p:stCondLst>
+                                            <p:cond delay="0"/>
+                                          </p:stCondLst>
+                                        </p:cTn>
+                                        <p:tgtEl>
+                                          <p:spTgt spid="3">
+                                            <p:txEl>
+                                              <p:pRg st="1" end="1"/>
+                                            </p:txEl>
+                                          </p:spTgt>
+                                        </p:tgtEl>
+                                        <p:attrNameLst>
+                                          <p:attrName>style.visibility</p:attrName>
+                                        </p:attrNameLst>
+                                      </p:cBhvr>
+                                      <p:to>
+                                        <p:strVal val="visible"/>
+                                      </p:to>
+                                    </p:set>
+                                    <p:animEffect transition="in" filter="fade">
+                                      <p:cBhvr>
+                                        <p:cTn id="12" dur="500"/>
+                                        <p:tgtEl>
+                                          <p:spTgt spid="3">
+                                            <p:txEl>
+                                              <p:pRg st="1" end="1"/>
+                                            </p:txEl>
+                                          </p:spTgt>
+                                        </p:tgtEl>
+                                      </p:cBhvr>
+                                    </p:animEffect>
+                                  </p:childTnLst>
+                                </p:cTn>
+                              </p:par>
+                            </p:childTnLst>
+                          </p:cTn>
+                        </p:par>
+                      </p:childTnLst>
+                    </p:cTn>
+                  </p:par>
+                  <p:par>
+                    <p:cTn id="13" fill="hold">
+                      <p:stCondLst>
+                        <p:cond delay="indefinite"/>
+                      </p:stCondLst>
+                      <p:childTnLst>
+                        <p:par>
+                          <p:cTn id="14" fill="hold">
+                            <p:stCondLst>
+                              <p:cond delay="0"/>
+                            </p:stCondLst>
+                            <p:childTnLst>
+                              <p:par>
+                                <p:cTn id="15" presetID="10" presetClass="entr" presetSubtype="0" fill="hold" grpId="0" nodeType="clickEffect">
+                                  <p:stCondLst>
+                                    <p:cond delay="0"/>
+                                  </p:stCondLst>
+                                  <p:childTnLst>
+                                    <p:set>
+                                      <p:cBhvr>
+                                        <p:cTn id="16" dur="1" fill="hold">
+                                          <p:stCondLst>
+                                            <p:cond delay="0"/>
+                                          </p:stCondLst>
+                                        </p:cTn>
+                                        <p:tgtEl>
+                                          <p:spTgt spid="3">
+                                            <p:txEl>
+                                              <p:pRg st="2" end="2"/>
+                                            </p:txEl>
+                                          </p:spTgt>
+                                        </p:tgtEl>
+                                        <p:attrNameLst>
+                                          <p:attrName>style.visibility</p:attrName>
+                                        </p:attrNameLst>
+                                      </p:cBhvr>
+                                      <p:to>
+                                        <p:strVal val="visible"/>
+                                      </p:to>
+                                    </p:set>
+                                    <p:animEffect transition="in" filter="fade">
+                                      <p:cBhvr>
+                                        <p:cTn id="17" dur="500"/>
+                                        <p:tgtEl>
+                                          <p:spTgt spid="3">
+                                            <p:txEl>
+                                              <p:pRg st="2" end="2"/>
+                                            </p:txEl>
+                                          </p:spTgt>
+                                        </p:tgtEl>
+                                      </p:cBhvr>
+                                    </p:animEffect>
+                                  </p:childTnLst>
+                                </p:cTn>
+                              </p:par>
+                            </p:childTnLst>
+                          </p:cTn>
+                        </p:par>
+                      </p:childTnLst>
+                    </p:cTn>
+                  </p:par>
+                </p:childTnLst>
+              </p:cTn>
+              <p:prevCondLst>
+                <p:cond evt="onPrev" delay="0">
+                  <p:tgtEl>
+                    <p:sldTgt/>
+                  </p:tgtEl>
+                </p:cond>
+              </p:prevCondLst>
+              <p:nextCondLst>
+                <p:cond evt="onNext" delay="0">
+                  <p:tgtEl>
+                    <p:sldTgt/>
+                  </p:tgtEl>
+                </p:cond>
+              </p:nextCondLst>
+            </p:seq>
+          </p:childTnLst>
+        </p:cTn>
+      </p:par>
+    </p:tnLst>
+    <p:bldLst>
+      <p:bldP spid="3" grpId="0" build="p"/>
+    </p:bldLst>
+  </p:timing>
+</p:sld>
+</file>
+
+<file path=ppt/slides/slide6.xml><?xml version="1.0" encoding="utf-8"?>
+<p:sld xmlns:a="http://schemas.openxmlformats.org/drawingml/2006/main" xmlns:r="http://schemas.openxmlformats.org/officeDocument/2006/relationships" xmlns:p="http://schemas.openxmlformats.org/presentationml/2006/main">
+  <p:cSld>
+    <p:spTree>
+      <p:nvGrpSpPr>
+        <p:cNvPr id="1" name=""/>
+        <p:cNvGrpSpPr/>
+        <p:nvPr/>
+      </p:nvGrpSpPr>
+      <p:grpSpPr>
+        <a:xfrm>
+          <a:off x="0" y="0"/>
+          <a:ext cx="0" cy="0"/>
+          <a:chOff x="0" y="0"/>
+          <a:chExt cx="0" cy="0"/>
+        </a:xfrm>
+      </p:grpSpPr>
+      <p:sp>
+        <p:nvSpPr>
+          <p:cNvPr id="2" name="Rubrik 1"/>
+          <p:cNvSpPr>
+            <a:spLocks noGrp="1"/>
+          </p:cNvSpPr>
+          <p:nvPr>
+            <p:ph type="title"/>
+          </p:nvPr>
+        </p:nvSpPr>
+        <p:spPr/>
+        <p:txBody>
+          <a:bodyPr/>
+          <a:lstStyle/>
+          <a:p>
+            <a:r>
+              <a:rPr lang="sv-SE" dirty="0" err="1" smtClean="0"/>
+              <a:t>Specular</a:t>
+            </a:r>
+            <a:r>
+              <a:rPr lang="sv-SE" dirty="0" smtClean="0"/>
+              <a:t> </a:t>
+            </a:r>
+            <a:r>
+              <a:rPr lang="sv-SE" dirty="0" err="1" smtClean="0"/>
+              <a:t>encoding</a:t>
+            </a:r>
+            <a:endParaRPr lang="sv-SE" dirty="0"/>
+          </a:p>
+        </p:txBody>
+      </p:sp>
+      <p:sp>
+        <p:nvSpPr>
+          <p:cNvPr id="3" name="Platshållare för innehåll 2"/>
+          <p:cNvSpPr>
+            <a:spLocks noGrp="1"/>
+          </p:cNvSpPr>
+          <p:nvPr>
+            <p:ph idx="1"/>
+          </p:nvPr>
+        </p:nvSpPr>
+        <p:spPr>
+          <a:xfrm>
+            <a:off x="457200" y="1600201"/>
+            <a:ext cx="8229600" cy="676672"/>
+          </a:xfrm>
+        </p:spPr>
+        <p:txBody>
+          <a:bodyPr/>
+          <a:lstStyle/>
+          <a:p>
+            <a:r>
+              <a:rPr lang="sv-SE" dirty="0" err="1" smtClean="0"/>
+              <a:t>Encode</a:t>
+            </a:r>
+            <a:r>
+              <a:rPr lang="sv-SE" dirty="0" smtClean="0"/>
+              <a:t> </a:t>
+            </a:r>
+            <a:r>
+              <a:rPr lang="sv-SE" dirty="0" err="1" smtClean="0"/>
+              <a:t>specular</a:t>
+            </a:r>
+            <a:r>
+              <a:rPr lang="sv-SE" dirty="0" smtClean="0"/>
+              <a:t> info in </a:t>
+            </a:r>
+            <a:r>
+              <a:rPr lang="sv-SE" dirty="0" err="1" smtClean="0"/>
+              <a:t>free</a:t>
+            </a:r>
+            <a:r>
+              <a:rPr lang="sv-SE" dirty="0" smtClean="0"/>
+              <a:t> </a:t>
+            </a:r>
+            <a:r>
+              <a:rPr lang="sv-SE" dirty="0" err="1" smtClean="0"/>
+              <a:t>channels</a:t>
+            </a:r>
+            <a:endParaRPr lang="sv-SE" dirty="0"/>
+          </a:p>
+        </p:txBody>
+      </p:sp>
+      <p:sp>
+        <p:nvSpPr>
+          <p:cNvPr id="4" name="Platshållare för datum 3"/>
+          <p:cNvSpPr>
+            <a:spLocks noGrp="1"/>
+          </p:cNvSpPr>
+          <p:nvPr>
+            <p:ph type="dt" sz="half" idx="10"/>
+          </p:nvPr>
+        </p:nvSpPr>
+        <p:spPr/>
+        <p:txBody>
+          <a:bodyPr/>
+          <a:lstStyle/>
+          <a:p>
+            <a:fld id="{637124F9-74EC-4A1F-82AA-07908676A841}" type="datetime1">
+              <a:rPr lang="sv-SE" smtClean="0"/>
+              <a:t>2012-01-19</a:t>
+            </a:fld>
+            <a:endParaRPr lang="sv-SE"/>
+          </a:p>
+        </p:txBody>
+      </p:sp>
+      <p:sp>
+        <p:nvSpPr>
+          <p:cNvPr id="5" name="Platshållare för bildnummer 4"/>
+          <p:cNvSpPr>
+            <a:spLocks noGrp="1"/>
+          </p:cNvSpPr>
+          <p:nvPr>
+            <p:ph type="sldNum" sz="quarter" idx="12"/>
+          </p:nvPr>
+        </p:nvSpPr>
+        <p:spPr/>
+        <p:txBody>
+          <a:bodyPr/>
+          <a:lstStyle/>
+          <a:p>
+            <a:fld id="{87B9E5C0-0A56-4BE6-BE7D-E6FF370B7540}" type="slidenum">
+              <a:rPr lang="sv-SE" smtClean="0"/>
+              <a:t>6</a:t>
+            </a:fld>
+            <a:endParaRPr lang="sv-SE"/>
+          </a:p>
+        </p:txBody>
+      </p:sp>
+      <p:pic>
+        <p:nvPicPr>
+          <p:cNvPr id="6" name="Bildobjekt 5"/>
+          <p:cNvPicPr>
+            <a:picLocks noChangeAspect="1"/>
+          </p:cNvPicPr>
+          <p:nvPr/>
+        </p:nvPicPr>
+        <p:blipFill>
+          <a:blip r:embed="rId2">
+            <a:extLst>
+              <a:ext uri="{28A0092B-C50C-407E-A947-70E740481C1C}">
+                <a14:useLocalDpi xmlns:a14="http://schemas.microsoft.com/office/drawing/2010/main" val="0"/>
+              </a:ext>
+            </a:extLst>
+          </a:blip>
+          <a:stretch>
+            <a:fillRect/>
+          </a:stretch>
+        </p:blipFill>
+        <p:spPr>
+          <a:xfrm>
+            <a:off x="229748" y="2621513"/>
+            <a:ext cx="4630284" cy="3255759"/>
+          </a:xfrm>
+          <a:prstGeom prst="rect">
+            <a:avLst/>
+          </a:prstGeom>
+          <a:ln>
+            <a:noFill/>
+          </a:ln>
+          <a:effectLst>
+            <a:outerShdw blurRad="190500" algn="tl" rotWithShape="0">
+              <a:srgbClr val="000000">
+                <a:alpha val="70000"/>
+              </a:srgbClr>
+            </a:outerShdw>
+          </a:effectLst>
+        </p:spPr>
+      </p:pic>
+      <p:pic>
+        <p:nvPicPr>
+          <p:cNvPr id="7" name="Bildobjekt 6"/>
+          <p:cNvPicPr>
+            <a:picLocks noChangeAspect="1"/>
+          </p:cNvPicPr>
+          <p:nvPr/>
+        </p:nvPicPr>
+        <p:blipFill>
+          <a:blip r:embed="rId3">
+            <a:extLst>
+              <a:ext uri="{28A0092B-C50C-407E-A947-70E740481C1C}">
+                <a14:useLocalDpi xmlns:a14="http://schemas.microsoft.com/office/drawing/2010/main" val="0"/>
+              </a:ext>
+            </a:extLst>
+          </a:blip>
+          <a:stretch>
+            <a:fillRect/>
+          </a:stretch>
+        </p:blipFill>
+        <p:spPr>
+          <a:xfrm>
+            <a:off x="4320439" y="2608857"/>
+            <a:ext cx="4572041" cy="3249935"/>
+          </a:xfrm>
+          <a:prstGeom prst="rect">
+            <a:avLst/>
+          </a:prstGeom>
+          <a:ln>
+            <a:noFill/>
+          </a:ln>
+          <a:effectLst>
+            <a:outerShdw blurRad="190500" algn="tl" rotWithShape="0">
+              <a:srgbClr val="000000">
+                <a:alpha val="70000"/>
+              </a:srgbClr>
+            </a:outerShdw>
+          </a:effectLst>
+        </p:spPr>
+      </p:pic>
+    </p:spTree>
+    <p:extLst>
+      <p:ext uri="{BB962C8B-B14F-4D97-AF65-F5344CB8AC3E}">
+        <p14:creationId xmlns:p14="http://schemas.microsoft.com/office/powerpoint/2010/main" val="1972848251"/>
+      </p:ext>
+    </p:extLst>
+  </p:cSld>
+  <p:clrMapOvr>
+    <a:masterClrMapping/>
+  </p:clrMapOvr>
+  <p:timing>
+    <p:tnLst>
+      <p:par>
+        <p:cTn id="1" dur="indefinite" restart="never" nodeType="tmRoot">
+          <p:childTnLst>
+            <p:seq concurrent="1" nextAc="seek">
+              <p:cTn id="2" dur="indefinite" nodeType="mainSeq">
+                <p:childTnLst>
+                  <p:par>
+                    <p:cTn id="3" fill="hold">
+                      <p:stCondLst>
+                        <p:cond delay="indefinite"/>
+                      </p:stCondLst>
+                      <p:childTnLst>
+                        <p:par>
+                          <p:cTn id="4" fill="hold">
+                            <p:stCondLst>
+                              <p:cond delay="0"/>
+                            </p:stCondLst>
+                            <p:childTnLst>
+                              <p:par>
+                                <p:cTn id="5" presetID="10" presetClass="entr" presetSubtype="0" fill="hold" grpId="0" nodeType="clickEffect">
+                                  <p:stCondLst>
+                                    <p:cond delay="0"/>
+                                  </p:stCondLst>
+                                  <p:childTnLst>
+                                    <p:set>
+                                      <p:cBhvr>
+                                        <p:cTn id="6" dur="1" fill="hold">
+                                          <p:stCondLst>
+                                            <p:cond delay="0"/>
+                                          </p:stCondLst>
+                                        </p:cTn>
+                                        <p:tgtEl>
+                                          <p:spTgt spid="3">
+                                            <p:txEl>
+                                              <p:pRg st="0" end="0"/>
+                                            </p:txEl>
+                                          </p:spTgt>
+                                        </p:tgtEl>
+                                        <p:attrNameLst>
+                                          <p:attrName>style.visibility</p:attrName>
+                                        </p:attrNameLst>
+                                      </p:cBhvr>
+                                      <p:to>
+                                        <p:strVal val="visible"/>
+                                      </p:to>
+                                    </p:set>
+                                    <p:animEffect transition="in" filter="fade">
+                                      <p:cBhvr>
+                                        <p:cTn id="7" dur="500"/>
+                                        <p:tgtEl>
+                                          <p:spTgt spid="3">
+                                            <p:txEl>
+                                              <p:pRg st="0" end="0"/>
+                                            </p:txEl>
+                                          </p:spTgt>
+                                        </p:tgtEl>
+                                      </p:cBhvr>
+                                    </p:animEffect>
+                                  </p:childTnLst>
+                                </p:cTn>
+                              </p:par>
+                            </p:childTnLst>
+                          </p:cTn>
+                        </p:par>
+                      </p:childTnLst>
+                    </p:cTn>
+                  </p:par>
+                  <p:par>
+                    <p:cTn id="8" fill="hold">
+                      <p:stCondLst>
+                        <p:cond delay="indefinite"/>
+                      </p:stCondLst>
+                      <p:childTnLst>
+                        <p:par>
+                          <p:cTn id="9" fill="hold">
+                            <p:stCondLst>
+                              <p:cond delay="0"/>
+                            </p:stCondLst>
+                            <p:childTnLst>
+                              <p:par>
+                                <p:cTn id="10" presetID="10" presetClass="entr" presetSubtype="0" fill="hold" nodeType="clickEffect">
+                                  <p:stCondLst>
+                                    <p:cond delay="0"/>
+                                  </p:stCondLst>
+                                  <p:childTnLst>
+                                    <p:set>
+                                      <p:cBhvr>
+                                        <p:cTn id="11" dur="1" fill="hold">
+                                          <p:stCondLst>
+                                            <p:cond delay="0"/>
+                                          </p:stCondLst>
+                                        </p:cTn>
+                                        <p:tgtEl>
+                                          <p:spTgt spid="6"/>
+                                        </p:tgtEl>
+                                        <p:attrNameLst>
+                                          <p:attrName>style.visibility</p:attrName>
+                                        </p:attrNameLst>
+                                      </p:cBhvr>
+                                      <p:to>
+                                        <p:strVal val="visible"/>
+                                      </p:to>
+                                    </p:set>
+                                    <p:animEffect transition="in" filter="fade">
+                                      <p:cBhvr>
+                                        <p:cTn id="12" dur="500"/>
+                                        <p:tgtEl>
+                                          <p:spTgt spid="6"/>
+                                        </p:tgtEl>
+                                      </p:cBhvr>
+                                    </p:animEffect>
+                                  </p:childTnLst>
+                                </p:cTn>
+                              </p:par>
+                              <p:par>
+                                <p:cTn id="13" presetID="10" presetClass="entr" presetSubtype="0" fill="hold" nodeType="withEffect">
+                                  <p:stCondLst>
+                                    <p:cond delay="0"/>
+                                  </p:stCondLst>
+                                  <p:childTnLst>
+                                    <p:set>
+                                      <p:cBhvr>
+                                        <p:cTn id="14" dur="1" fill="hold">
+                                          <p:stCondLst>
+                                            <p:cond delay="0"/>
+                                          </p:stCondLst>
+                                        </p:cTn>
+                                        <p:tgtEl>
+                                          <p:spTgt spid="7"/>
+                                        </p:tgtEl>
+                                        <p:attrNameLst>
+                                          <p:attrName>style.visibility</p:attrName>
+                                        </p:attrNameLst>
+                                      </p:cBhvr>
+                                      <p:to>
+                                        <p:strVal val="visible"/>
+                                      </p:to>
+                                    </p:set>
+                                    <p:animEffect transition="in" filter="fade">
+                                      <p:cBhvr>
+                                        <p:cTn id="15" dur="500"/>
+                                        <p:tgtEl>
+                                          <p:spTgt spid="7"/>
+                                        </p:tgtEl>
+                                      </p:cBhvr>
+                                    </p:animEffect>
+                                  </p:childTnLst>
+                                </p:cTn>
+                              </p:par>
+                            </p:childTnLst>
+                          </p:cTn>
+                        </p:par>
+                      </p:childTnLst>
+                    </p:cTn>
+                  </p:par>
+                </p:childTnLst>
+              </p:cTn>
+              <p:prevCondLst>
+                <p:cond evt="onPrev" delay="0">
+                  <p:tgtEl>
+                    <p:sldTgt/>
+                  </p:tgtEl>
+                </p:cond>
+              </p:prevCondLst>
+              <p:nextCondLst>
+                <p:cond evt="onNext" delay="0">
+                  <p:tgtEl>
+                    <p:sldTgt/>
+                  </p:tgtEl>
+                </p:cond>
+              </p:nextCondLst>
+            </p:seq>
+          </p:childTnLst>
+        </p:cTn>
+      </p:par>
+    </p:tnLst>
+    <p:bldLst>
+      <p:bldP spid="3" grpId="0" build="p"/>
+    </p:bldLst>
+  </p:timing>
+</p:sld>
+</file>
+
+<file path=ppt/slides/slide7.xml><?xml version="1.0" encoding="utf-8"?>
+<p:sld xmlns:a="http://schemas.openxmlformats.org/drawingml/2006/main" xmlns:r="http://schemas.openxmlformats.org/officeDocument/2006/relationships" xmlns:p="http://schemas.openxmlformats.org/presentationml/2006/main">
+  <p:cSld>
+    <p:spTree>
+      <p:nvGrpSpPr>
+        <p:cNvPr id="1" name=""/>
+        <p:cNvGrpSpPr/>
+        <p:nvPr/>
+      </p:nvGrpSpPr>
+      <p:grpSpPr>
+        <a:xfrm>
+          <a:off x="0" y="0"/>
+          <a:ext cx="0" cy="0"/>
+          <a:chOff x="0" y="0"/>
+          <a:chExt cx="0" cy="0"/>
+        </a:xfrm>
+      </p:grpSpPr>
+      <p:sp>
+        <p:nvSpPr>
+          <p:cNvPr id="2" name="Rubrik 1"/>
+          <p:cNvSpPr>
+            <a:spLocks noGrp="1"/>
+          </p:cNvSpPr>
+          <p:nvPr>
+            <p:ph type="title"/>
+          </p:nvPr>
+        </p:nvSpPr>
+        <p:spPr/>
+        <p:txBody>
+          <a:bodyPr/>
+          <a:lstStyle/>
+          <a:p>
+            <a:r>
               <a:rPr lang="sv-SE" dirty="0" smtClean="0"/>
               <a:t>The G-</a:t>
             </a:r>
@@ -4489,7 +6770,7 @@
           <a:p>
             <a:fld id="{637124F9-74EC-4A1F-82AA-07908676A841}" type="datetime1">
               <a:rPr lang="sv-SE" smtClean="0"/>
-              <a:t>2011-05-26</a:t>
+              <a:t>2012-01-19</a:t>
             </a:fld>
             <a:endParaRPr lang="sv-SE"/>
           </a:p>
@@ -4512,7 +6793,7 @@
           <a:p>
             <a:fld id="{87B9E5C0-0A56-4BE6-BE7D-E6FF370B7540}" type="slidenum">
               <a:rPr lang="sv-SE" smtClean="0"/>
-              <a:t>5</a:t>
+              <a:t>7</a:t>
             </a:fld>
             <a:endParaRPr lang="sv-SE"/>
           </a:p>
@@ -4817,14 +7098,215 @@
   <p:timing>
     <p:tnLst>
       <p:par>
-        <p:cTn id="1" dur="indefinite" restart="never" nodeType="tmRoot"/>
+        <p:cTn id="1" dur="indefinite" restart="never" nodeType="tmRoot">
+          <p:childTnLst>
+            <p:seq concurrent="1" nextAc="seek">
+              <p:cTn id="2" dur="indefinite" nodeType="mainSeq">
+                <p:childTnLst>
+                  <p:par>
+                    <p:cTn id="3" fill="hold">
+                      <p:stCondLst>
+                        <p:cond delay="indefinite"/>
+                      </p:stCondLst>
+                      <p:childTnLst>
+                        <p:par>
+                          <p:cTn id="4" fill="hold">
+                            <p:stCondLst>
+                              <p:cond delay="0"/>
+                            </p:stCondLst>
+                            <p:childTnLst>
+                              <p:par>
+                                <p:cTn id="5" presetID="10" presetClass="entr" presetSubtype="0" fill="hold" grpId="0" nodeType="clickEffect">
+                                  <p:stCondLst>
+                                    <p:cond delay="0"/>
+                                  </p:stCondLst>
+                                  <p:childTnLst>
+                                    <p:set>
+                                      <p:cBhvr>
+                                        <p:cTn id="6" dur="1" fill="hold">
+                                          <p:stCondLst>
+                                            <p:cond delay="0"/>
+                                          </p:stCondLst>
+                                        </p:cTn>
+                                        <p:tgtEl>
+                                          <p:spTgt spid="3">
+                                            <p:txEl>
+                                              <p:pRg st="0" end="0"/>
+                                            </p:txEl>
+                                          </p:spTgt>
+                                        </p:tgtEl>
+                                        <p:attrNameLst>
+                                          <p:attrName>style.visibility</p:attrName>
+                                        </p:attrNameLst>
+                                      </p:cBhvr>
+                                      <p:to>
+                                        <p:strVal val="visible"/>
+                                      </p:to>
+                                    </p:set>
+                                    <p:animEffect transition="in" filter="fade">
+                                      <p:cBhvr>
+                                        <p:cTn id="7" dur="500"/>
+                                        <p:tgtEl>
+                                          <p:spTgt spid="3">
+                                            <p:txEl>
+                                              <p:pRg st="0" end="0"/>
+                                            </p:txEl>
+                                          </p:spTgt>
+                                        </p:tgtEl>
+                                      </p:cBhvr>
+                                    </p:animEffect>
+                                  </p:childTnLst>
+                                </p:cTn>
+                              </p:par>
+                            </p:childTnLst>
+                          </p:cTn>
+                        </p:par>
+                      </p:childTnLst>
+                    </p:cTn>
+                  </p:par>
+                  <p:par>
+                    <p:cTn id="8" fill="hold">
+                      <p:stCondLst>
+                        <p:cond delay="indefinite"/>
+                      </p:stCondLst>
+                      <p:childTnLst>
+                        <p:par>
+                          <p:cTn id="9" fill="hold">
+                            <p:stCondLst>
+                              <p:cond delay="0"/>
+                            </p:stCondLst>
+                            <p:childTnLst>
+                              <p:par>
+                                <p:cTn id="10" presetID="10" presetClass="entr" presetSubtype="0" fill="hold" grpId="0" nodeType="clickEffect">
+                                  <p:stCondLst>
+                                    <p:cond delay="0"/>
+                                  </p:stCondLst>
+                                  <p:childTnLst>
+                                    <p:set>
+                                      <p:cBhvr>
+                                        <p:cTn id="11" dur="1" fill="hold">
+                                          <p:stCondLst>
+                                            <p:cond delay="0"/>
+                                          </p:stCondLst>
+                                        </p:cTn>
+                                        <p:tgtEl>
+                                          <p:spTgt spid="3">
+                                            <p:txEl>
+                                              <p:pRg st="1" end="1"/>
+                                            </p:txEl>
+                                          </p:spTgt>
+                                        </p:tgtEl>
+                                        <p:attrNameLst>
+                                          <p:attrName>style.visibility</p:attrName>
+                                        </p:attrNameLst>
+                                      </p:cBhvr>
+                                      <p:to>
+                                        <p:strVal val="visible"/>
+                                      </p:to>
+                                    </p:set>
+                                    <p:animEffect transition="in" filter="fade">
+                                      <p:cBhvr>
+                                        <p:cTn id="12" dur="500"/>
+                                        <p:tgtEl>
+                                          <p:spTgt spid="3">
+                                            <p:txEl>
+                                              <p:pRg st="1" end="1"/>
+                                            </p:txEl>
+                                          </p:spTgt>
+                                        </p:tgtEl>
+                                      </p:cBhvr>
+                                    </p:animEffect>
+                                  </p:childTnLst>
+                                </p:cTn>
+                              </p:par>
+                            </p:childTnLst>
+                          </p:cTn>
+                        </p:par>
+                      </p:childTnLst>
+                    </p:cTn>
+                  </p:par>
+                  <p:par>
+                    <p:cTn id="13" fill="hold">
+                      <p:stCondLst>
+                        <p:cond delay="indefinite"/>
+                      </p:stCondLst>
+                      <p:childTnLst>
+                        <p:par>
+                          <p:cTn id="14" fill="hold">
+                            <p:stCondLst>
+                              <p:cond delay="0"/>
+                            </p:stCondLst>
+                            <p:childTnLst>
+                              <p:par>
+                                <p:cTn id="15" presetID="10" presetClass="entr" presetSubtype="0" fill="hold" nodeType="clickEffect">
+                                  <p:stCondLst>
+                                    <p:cond delay="0"/>
+                                  </p:stCondLst>
+                                  <p:childTnLst>
+                                    <p:set>
+                                      <p:cBhvr>
+                                        <p:cTn id="16" dur="1" fill="hold">
+                                          <p:stCondLst>
+                                            <p:cond delay="0"/>
+                                          </p:stCondLst>
+                                        </p:cTn>
+                                        <p:tgtEl>
+                                          <p:spTgt spid="6"/>
+                                        </p:tgtEl>
+                                        <p:attrNameLst>
+                                          <p:attrName>style.visibility</p:attrName>
+                                        </p:attrNameLst>
+                                      </p:cBhvr>
+                                      <p:to>
+                                        <p:strVal val="visible"/>
+                                      </p:to>
+                                    </p:set>
+                                    <p:animEffect transition="in" filter="fade">
+                                      <p:cBhvr>
+                                        <p:cTn id="17" dur="500"/>
+                                        <p:tgtEl>
+                                          <p:spTgt spid="6"/>
+                                        </p:tgtEl>
+                                      </p:cBhvr>
+                                    </p:animEffect>
+                                  </p:childTnLst>
+                                </p:cTn>
+                              </p:par>
+                            </p:childTnLst>
+                          </p:cTn>
+                        </p:par>
+                      </p:childTnLst>
+                    </p:cTn>
+                  </p:par>
+                </p:childTnLst>
+              </p:cTn>
+              <p:prevCondLst>
+                <p:cond evt="onPrev" delay="0">
+                  <p:tgtEl>
+                    <p:sldTgt/>
+                  </p:tgtEl>
+                </p:cond>
+              </p:prevCondLst>
+              <p:nextCondLst>
+                <p:cond evt="onNext" delay="0">
+                  <p:tgtEl>
+                    <p:sldTgt/>
+                  </p:tgtEl>
+                </p:cond>
+              </p:nextCondLst>
+            </p:seq>
+          </p:childTnLst>
+        </p:cTn>
       </p:par>
     </p:tnLst>
+    <p:bldLst>
+      <p:bldP spid="3" grpId="0" build="p"/>
+    </p:bldLst>
   </p:timing>
 </p:sld>
 </file>
 
-<file path=ppt/slides/slide6.xml><?xml version="1.0" encoding="utf-8"?>
+<file path=ppt/slides/slide8.xml><?xml version="1.0" encoding="utf-8"?>
 <p:sld xmlns:a="http://schemas.openxmlformats.org/drawingml/2006/main" xmlns:r="http://schemas.openxmlformats.org/officeDocument/2006/relationships" xmlns:p="http://schemas.openxmlformats.org/presentationml/2006/main">
   <p:cSld>
     <p:spTree>
@@ -4870,12 +7352,12 @@
       </p:sp>
       <p:sp>
         <p:nvSpPr>
-          <p:cNvPr id="3" name="Platshållare för innehåll 2"/>
-          <p:cNvSpPr>
-            <a:spLocks noGrp="1"/>
-          </p:cNvSpPr>
-          <p:nvPr>
-            <p:ph idx="1"/>
+          <p:cNvPr id="4" name="Platshållare för datum 3"/>
+          <p:cNvSpPr>
+            <a:spLocks noGrp="1"/>
+          </p:cNvSpPr>
+          <p:nvPr>
+            <p:ph type="dt" sz="half" idx="10"/>
           </p:nvPr>
         </p:nvSpPr>
         <p:spPr/>
@@ -4883,32 +7365,9 @@
           <a:bodyPr/>
           <a:lstStyle/>
           <a:p>
-            <a:r>
-              <a:rPr lang="sv-SE" dirty="0" smtClean="0"/>
-              <a:t>PICS</a:t>
-            </a:r>
-            <a:endParaRPr lang="sv-SE" dirty="0"/>
-          </a:p>
-        </p:txBody>
-      </p:sp>
-      <p:sp>
-        <p:nvSpPr>
-          <p:cNvPr id="4" name="Platshållare för datum 3"/>
-          <p:cNvSpPr>
-            <a:spLocks noGrp="1"/>
-          </p:cNvSpPr>
-          <p:nvPr>
-            <p:ph type="dt" sz="half" idx="10"/>
-          </p:nvPr>
-        </p:nvSpPr>
-        <p:spPr/>
-        <p:txBody>
-          <a:bodyPr/>
-          <a:lstStyle/>
-          <a:p>
             <a:fld id="{637124F9-74EC-4A1F-82AA-07908676A841}" type="datetime1">
               <a:rPr lang="sv-SE" smtClean="0"/>
-              <a:t>2011-05-26</a:t>
+              <a:t>2012-01-19</a:t>
             </a:fld>
             <a:endParaRPr lang="sv-SE"/>
           </a:p>
@@ -4931,12 +7390,366 @@
           <a:p>
             <a:fld id="{87B9E5C0-0A56-4BE6-BE7D-E6FF370B7540}" type="slidenum">
               <a:rPr lang="sv-SE" smtClean="0"/>
-              <a:t>6</a:t>
+              <a:t>8</a:t>
             </a:fld>
             <a:endParaRPr lang="sv-SE"/>
           </a:p>
         </p:txBody>
       </p:sp>
+      <p:grpSp>
+        <p:nvGrpSpPr>
+          <p:cNvPr id="19" name="Grupp 18"/>
+          <p:cNvGrpSpPr/>
+          <p:nvPr/>
+        </p:nvGrpSpPr>
+        <p:grpSpPr>
+          <a:xfrm>
+            <a:off x="464973" y="1313305"/>
+            <a:ext cx="3351033" cy="2286000"/>
+            <a:chOff x="464973" y="1313305"/>
+            <a:chExt cx="3351033" cy="2286000"/>
+          </a:xfrm>
+        </p:grpSpPr>
+        <p:pic>
+          <p:nvPicPr>
+            <p:cNvPr id="10" name="Bildobjekt 9"/>
+            <p:cNvPicPr>
+              <a:picLocks noChangeAspect="1"/>
+            </p:cNvPicPr>
+            <p:nvPr/>
+          </p:nvPicPr>
+          <p:blipFill rotWithShape="1">
+            <a:blip r:embed="rId2" cstate="print">
+              <a:extLst>
+                <a:ext uri="{28A0092B-C50C-407E-A947-70E740481C1C}">
+                  <a14:useLocalDpi xmlns:a14="http://schemas.microsoft.com/office/drawing/2010/main" val="0"/>
+                </a:ext>
+              </a:extLst>
+            </a:blip>
+            <a:srcRect r="2625" b="5179"/>
+            <a:stretch/>
+          </p:blipFill>
+          <p:spPr>
+            <a:xfrm>
+              <a:off x="464973" y="1313305"/>
+              <a:ext cx="3351033" cy="2286000"/>
+            </a:xfrm>
+            <a:prstGeom prst="rect">
+              <a:avLst/>
+            </a:prstGeom>
+            <a:ln>
+              <a:noFill/>
+            </a:ln>
+            <a:effectLst>
+              <a:outerShdw blurRad="190500" algn="tl" rotWithShape="0">
+                <a:srgbClr val="000000">
+                  <a:alpha val="70000"/>
+                </a:srgbClr>
+              </a:outerShdw>
+            </a:effectLst>
+          </p:spPr>
+        </p:pic>
+        <p:sp>
+          <p:nvSpPr>
+            <p:cNvPr id="11" name="textruta 10"/>
+            <p:cNvSpPr txBox="1"/>
+            <p:nvPr/>
+          </p:nvSpPr>
+          <p:spPr>
+            <a:xfrm>
+              <a:off x="1612880" y="3229973"/>
+              <a:ext cx="1008112" cy="369332"/>
+            </a:xfrm>
+            <a:prstGeom prst="rect">
+              <a:avLst/>
+            </a:prstGeom>
+            <a:noFill/>
+          </p:spPr>
+          <p:txBody>
+            <a:bodyPr wrap="square" rtlCol="0">
+              <a:spAutoFit/>
+            </a:bodyPr>
+            <a:lstStyle/>
+            <a:p>
+              <a:pPr algn="ctr"/>
+              <a:r>
+                <a:rPr lang="sv-SE" dirty="0" smtClean="0"/>
+                <a:t>Normals</a:t>
+              </a:r>
+              <a:endParaRPr lang="sv-SE" dirty="0"/>
+            </a:p>
+          </p:txBody>
+        </p:sp>
+      </p:grpSp>
+      <p:grpSp>
+        <p:nvGrpSpPr>
+          <p:cNvPr id="20" name="Grupp 19"/>
+          <p:cNvGrpSpPr/>
+          <p:nvPr/>
+        </p:nvGrpSpPr>
+        <p:grpSpPr>
+          <a:xfrm>
+            <a:off x="5268951" y="1313305"/>
+            <a:ext cx="3206075" cy="2286000"/>
+            <a:chOff x="5268951" y="1313305"/>
+            <a:chExt cx="3206075" cy="2286000"/>
+          </a:xfrm>
+        </p:grpSpPr>
+        <p:pic>
+          <p:nvPicPr>
+            <p:cNvPr id="7" name="Bildobjekt 6"/>
+            <p:cNvPicPr>
+              <a:picLocks noChangeAspect="1"/>
+            </p:cNvPicPr>
+            <p:nvPr/>
+          </p:nvPicPr>
+          <p:blipFill>
+            <a:blip r:embed="rId3" cstate="print">
+              <a:extLst>
+                <a:ext uri="{28A0092B-C50C-407E-A947-70E740481C1C}">
+                  <a14:useLocalDpi xmlns:a14="http://schemas.microsoft.com/office/drawing/2010/main" val="0"/>
+                </a:ext>
+              </a:extLst>
+            </a:blip>
+            <a:stretch>
+              <a:fillRect/>
+            </a:stretch>
+          </p:blipFill>
+          <p:spPr>
+            <a:xfrm>
+              <a:off x="5268951" y="1313305"/>
+              <a:ext cx="3206075" cy="2286000"/>
+            </a:xfrm>
+            <a:prstGeom prst="rect">
+              <a:avLst/>
+            </a:prstGeom>
+            <a:ln>
+              <a:noFill/>
+            </a:ln>
+            <a:effectLst>
+              <a:outerShdw blurRad="190500" algn="tl" rotWithShape="0">
+                <a:srgbClr val="000000">
+                  <a:alpha val="70000"/>
+                </a:srgbClr>
+              </a:outerShdw>
+            </a:effectLst>
+          </p:spPr>
+        </p:pic>
+        <p:sp>
+          <p:nvSpPr>
+            <p:cNvPr id="12" name="textruta 11"/>
+            <p:cNvSpPr txBox="1"/>
+            <p:nvPr/>
+          </p:nvSpPr>
+          <p:spPr>
+            <a:xfrm>
+              <a:off x="6363506" y="3229973"/>
+              <a:ext cx="1448853" cy="369332"/>
+            </a:xfrm>
+            <a:prstGeom prst="rect">
+              <a:avLst/>
+            </a:prstGeom>
+            <a:noFill/>
+          </p:spPr>
+          <p:txBody>
+            <a:bodyPr wrap="square" rtlCol="0">
+              <a:spAutoFit/>
+            </a:bodyPr>
+            <a:lstStyle/>
+            <a:p>
+              <a:pPr algn="ctr"/>
+              <a:r>
+                <a:rPr lang="sv-SE" dirty="0" err="1" smtClean="0"/>
+                <a:t>Albedo</a:t>
+              </a:r>
+              <a:r>
+                <a:rPr lang="sv-SE" dirty="0" smtClean="0"/>
+                <a:t> color</a:t>
+              </a:r>
+              <a:endParaRPr lang="sv-SE" dirty="0"/>
+            </a:p>
+          </p:txBody>
+        </p:sp>
+      </p:grpSp>
+      <p:grpSp>
+        <p:nvGrpSpPr>
+          <p:cNvPr id="21" name="Grupp 20"/>
+          <p:cNvGrpSpPr/>
+          <p:nvPr/>
+        </p:nvGrpSpPr>
+        <p:grpSpPr>
+          <a:xfrm>
+            <a:off x="464973" y="3801459"/>
+            <a:ext cx="3351033" cy="2286000"/>
+            <a:chOff x="464973" y="3801459"/>
+            <a:chExt cx="3351033" cy="2286000"/>
+          </a:xfrm>
+        </p:grpSpPr>
+        <p:pic>
+          <p:nvPicPr>
+            <p:cNvPr id="9" name="Bildobjekt 8"/>
+            <p:cNvPicPr>
+              <a:picLocks noChangeAspect="1"/>
+            </p:cNvPicPr>
+            <p:nvPr/>
+          </p:nvPicPr>
+          <p:blipFill>
+            <a:blip r:embed="rId4" cstate="print">
+              <a:extLst>
+                <a:ext uri="{28A0092B-C50C-407E-A947-70E740481C1C}">
+                  <a14:useLocalDpi xmlns:a14="http://schemas.microsoft.com/office/drawing/2010/main" val="0"/>
+                </a:ext>
+              </a:extLst>
+            </a:blip>
+            <a:stretch>
+              <a:fillRect/>
+            </a:stretch>
+          </p:blipFill>
+          <p:spPr>
+            <a:xfrm>
+              <a:off x="464973" y="3801459"/>
+              <a:ext cx="3351033" cy="2286000"/>
+            </a:xfrm>
+            <a:prstGeom prst="rect">
+              <a:avLst/>
+            </a:prstGeom>
+            <a:ln>
+              <a:noFill/>
+            </a:ln>
+            <a:effectLst>
+              <a:outerShdw blurRad="190500" algn="tl" rotWithShape="0">
+                <a:srgbClr val="000000">
+                  <a:alpha val="70000"/>
+                </a:srgbClr>
+              </a:outerShdw>
+            </a:effectLst>
+          </p:spPr>
+        </p:pic>
+        <p:sp>
+          <p:nvSpPr>
+            <p:cNvPr id="13" name="textruta 12"/>
+            <p:cNvSpPr txBox="1"/>
+            <p:nvPr/>
+          </p:nvSpPr>
+          <p:spPr>
+            <a:xfrm>
+              <a:off x="1612880" y="5718127"/>
+              <a:ext cx="1008112" cy="369332"/>
+            </a:xfrm>
+            <a:prstGeom prst="rect">
+              <a:avLst/>
+            </a:prstGeom>
+            <a:noFill/>
+          </p:spPr>
+          <p:txBody>
+            <a:bodyPr wrap="square" rtlCol="0">
+              <a:spAutoFit/>
+            </a:bodyPr>
+            <a:lstStyle/>
+            <a:p>
+              <a:pPr algn="ctr"/>
+              <a:r>
+                <a:rPr lang="sv-SE" dirty="0" err="1" smtClean="0"/>
+                <a:t>Depth</a:t>
+              </a:r>
+              <a:endParaRPr lang="sv-SE" dirty="0"/>
+            </a:p>
+          </p:txBody>
+        </p:sp>
+      </p:grpSp>
+      <p:grpSp>
+        <p:nvGrpSpPr>
+          <p:cNvPr id="22" name="Grupp 21"/>
+          <p:cNvGrpSpPr/>
+          <p:nvPr/>
+        </p:nvGrpSpPr>
+        <p:grpSpPr>
+          <a:xfrm>
+            <a:off x="5268951" y="3801459"/>
+            <a:ext cx="3206075" cy="2286579"/>
+            <a:chOff x="5268951" y="3801459"/>
+            <a:chExt cx="3206075" cy="2286579"/>
+          </a:xfrm>
+        </p:grpSpPr>
+        <p:pic>
+          <p:nvPicPr>
+            <p:cNvPr id="8" name="Bildobjekt 7"/>
+            <p:cNvPicPr>
+              <a:picLocks noChangeAspect="1"/>
+            </p:cNvPicPr>
+            <p:nvPr/>
+          </p:nvPicPr>
+          <p:blipFill rotWithShape="1">
+            <a:blip r:embed="rId5" cstate="print">
+              <a:extLst>
+                <a:ext uri="{28A0092B-C50C-407E-A947-70E740481C1C}">
+                  <a14:useLocalDpi xmlns:a14="http://schemas.microsoft.com/office/drawing/2010/main" val="0"/>
+                </a:ext>
+              </a:extLst>
+            </a:blip>
+            <a:srcRect r="2239" b="3824"/>
+            <a:stretch/>
+          </p:blipFill>
+          <p:spPr>
+            <a:xfrm>
+              <a:off x="5268951" y="3801459"/>
+              <a:ext cx="3206075" cy="2286579"/>
+            </a:xfrm>
+            <a:prstGeom prst="rect">
+              <a:avLst/>
+            </a:prstGeom>
+            <a:ln>
+              <a:noFill/>
+            </a:ln>
+            <a:effectLst>
+              <a:outerShdw blurRad="190500" algn="tl" rotWithShape="0">
+                <a:srgbClr val="000000">
+                  <a:alpha val="70000"/>
+                </a:srgbClr>
+              </a:outerShdw>
+            </a:effectLst>
+          </p:spPr>
+        </p:pic>
+        <p:sp>
+          <p:nvSpPr>
+            <p:cNvPr id="14" name="textruta 13"/>
+            <p:cNvSpPr txBox="1"/>
+            <p:nvPr/>
+          </p:nvSpPr>
+          <p:spPr>
+            <a:xfrm>
+              <a:off x="6401682" y="5718127"/>
+              <a:ext cx="1372500" cy="369332"/>
+            </a:xfrm>
+            <a:prstGeom prst="rect">
+              <a:avLst/>
+            </a:prstGeom>
+            <a:noFill/>
+          </p:spPr>
+          <p:txBody>
+            <a:bodyPr wrap="square" rtlCol="0">
+              <a:spAutoFit/>
+            </a:bodyPr>
+            <a:lstStyle/>
+            <a:p>
+              <a:pPr algn="ctr"/>
+              <a:r>
+                <a:rPr lang="sv-SE" dirty="0" smtClean="0"/>
+                <a:t>Final </a:t>
+              </a:r>
+              <a:r>
+                <a:rPr lang="sv-SE" dirty="0" err="1" smtClean="0"/>
+                <a:t>Comp</a:t>
+              </a:r>
+              <a:r>
+                <a:rPr lang="sv-SE" dirty="0" smtClean="0"/>
+                <a:t>.</a:t>
+              </a:r>
+              <a:endParaRPr lang="sv-SE" dirty="0"/>
+            </a:p>
+          </p:txBody>
+        </p:sp>
+      </p:grpSp>
     </p:spTree>
     <p:extLst>
       <p:ext uri="{BB962C8B-B14F-4D97-AF65-F5344CB8AC3E}">
@@ -4950,14 +7763,249 @@
   <p:timing>
     <p:tnLst>
       <p:par>
-        <p:cTn id="1" dur="indefinite" restart="never" nodeType="tmRoot"/>
+        <p:cTn id="1" dur="indefinite" restart="never" nodeType="tmRoot">
+          <p:childTnLst>
+            <p:seq concurrent="1" nextAc="seek">
+              <p:cTn id="2" dur="indefinite" nodeType="mainSeq">
+                <p:childTnLst>
+                  <p:par>
+                    <p:cTn id="3" fill="hold">
+                      <p:stCondLst>
+                        <p:cond delay="indefinite"/>
+                      </p:stCondLst>
+                      <p:childTnLst>
+                        <p:par>
+                          <p:cTn id="4" fill="hold">
+                            <p:stCondLst>
+                              <p:cond delay="0"/>
+                            </p:stCondLst>
+                            <p:childTnLst>
+                              <p:par>
+                                <p:cTn id="5" presetID="10" presetClass="entr" presetSubtype="0" fill="hold" nodeType="clickEffect">
+                                  <p:stCondLst>
+                                    <p:cond delay="0"/>
+                                  </p:stCondLst>
+                                  <p:childTnLst>
+                                    <p:set>
+                                      <p:cBhvr>
+                                        <p:cTn id="6" dur="1" fill="hold">
+                                          <p:stCondLst>
+                                            <p:cond delay="0"/>
+                                          </p:stCondLst>
+                                        </p:cTn>
+                                        <p:tgtEl>
+                                          <p:spTgt spid="19"/>
+                                        </p:tgtEl>
+                                        <p:attrNameLst>
+                                          <p:attrName>style.visibility</p:attrName>
+                                        </p:attrNameLst>
+                                      </p:cBhvr>
+                                      <p:to>
+                                        <p:strVal val="visible"/>
+                                      </p:to>
+                                    </p:set>
+                                    <p:animEffect transition="in" filter="fade">
+                                      <p:cBhvr>
+                                        <p:cTn id="7" dur="500"/>
+                                        <p:tgtEl>
+                                          <p:spTgt spid="19"/>
+                                        </p:tgtEl>
+                                      </p:cBhvr>
+                                    </p:animEffect>
+                                  </p:childTnLst>
+                                </p:cTn>
+                              </p:par>
+                            </p:childTnLst>
+                          </p:cTn>
+                        </p:par>
+                      </p:childTnLst>
+                    </p:cTn>
+                  </p:par>
+                  <p:par>
+                    <p:cTn id="8" fill="hold">
+                      <p:stCondLst>
+                        <p:cond delay="indefinite"/>
+                      </p:stCondLst>
+                      <p:childTnLst>
+                        <p:par>
+                          <p:cTn id="9" fill="hold">
+                            <p:stCondLst>
+                              <p:cond delay="0"/>
+                            </p:stCondLst>
+                            <p:childTnLst>
+                              <p:par>
+                                <p:cTn id="10" presetID="10" presetClass="entr" presetSubtype="0" fill="hold" nodeType="clickEffect">
+                                  <p:stCondLst>
+                                    <p:cond delay="0"/>
+                                  </p:stCondLst>
+                                  <p:childTnLst>
+                                    <p:set>
+                                      <p:cBhvr>
+                                        <p:cTn id="11" dur="1" fill="hold">
+                                          <p:stCondLst>
+                                            <p:cond delay="0"/>
+                                          </p:stCondLst>
+                                        </p:cTn>
+                                        <p:tgtEl>
+                                          <p:spTgt spid="20"/>
+                                        </p:tgtEl>
+                                        <p:attrNameLst>
+                                          <p:attrName>style.visibility</p:attrName>
+                                        </p:attrNameLst>
+                                      </p:cBhvr>
+                                      <p:to>
+                                        <p:strVal val="visible"/>
+                                      </p:to>
+                                    </p:set>
+                                    <p:animEffect transition="in" filter="fade">
+                                      <p:cBhvr>
+                                        <p:cTn id="12" dur="500"/>
+                                        <p:tgtEl>
+                                          <p:spTgt spid="20"/>
+                                        </p:tgtEl>
+                                      </p:cBhvr>
+                                    </p:animEffect>
+                                  </p:childTnLst>
+                                </p:cTn>
+                              </p:par>
+                            </p:childTnLst>
+                          </p:cTn>
+                        </p:par>
+                      </p:childTnLst>
+                    </p:cTn>
+                  </p:par>
+                  <p:par>
+                    <p:cTn id="13" fill="hold">
+                      <p:stCondLst>
+                        <p:cond delay="indefinite"/>
+                      </p:stCondLst>
+                      <p:childTnLst>
+                        <p:par>
+                          <p:cTn id="14" fill="hold">
+                            <p:stCondLst>
+                              <p:cond delay="0"/>
+                            </p:stCondLst>
+                            <p:childTnLst>
+                              <p:par>
+                                <p:cTn id="15" presetID="10" presetClass="entr" presetSubtype="0" fill="hold" nodeType="clickEffect">
+                                  <p:stCondLst>
+                                    <p:cond delay="0"/>
+                                  </p:stCondLst>
+                                  <p:childTnLst>
+                                    <p:set>
+                                      <p:cBhvr>
+                                        <p:cTn id="16" dur="1" fill="hold">
+                                          <p:stCondLst>
+                                            <p:cond delay="0"/>
+                                          </p:stCondLst>
+                                        </p:cTn>
+                                        <p:tgtEl>
+                                          <p:spTgt spid="21"/>
+                                        </p:tgtEl>
+                                        <p:attrNameLst>
+                                          <p:attrName>style.visibility</p:attrName>
+                                        </p:attrNameLst>
+                                      </p:cBhvr>
+                                      <p:to>
+                                        <p:strVal val="visible"/>
+                                      </p:to>
+                                    </p:set>
+                                    <p:animEffect transition="in" filter="fade">
+                                      <p:cBhvr>
+                                        <p:cTn id="17" dur="500"/>
+                                        <p:tgtEl>
+                                          <p:spTgt spid="21"/>
+                                        </p:tgtEl>
+                                      </p:cBhvr>
+                                    </p:animEffect>
+                                  </p:childTnLst>
+                                </p:cTn>
+                              </p:par>
+                            </p:childTnLst>
+                          </p:cTn>
+                        </p:par>
+                      </p:childTnLst>
+                    </p:cTn>
+                  </p:par>
+                  <p:par>
+                    <p:cTn id="18" fill="hold">
+                      <p:stCondLst>
+                        <p:cond delay="indefinite"/>
+                      </p:stCondLst>
+                      <p:childTnLst>
+                        <p:par>
+                          <p:cTn id="19" fill="hold">
+                            <p:stCondLst>
+                              <p:cond delay="0"/>
+                            </p:stCondLst>
+                            <p:childTnLst>
+                              <p:par>
+                                <p:cTn id="20" presetID="10" presetClass="entr" presetSubtype="0" fill="hold" nodeType="clickEffect">
+                                  <p:stCondLst>
+                                    <p:cond delay="0"/>
+                                  </p:stCondLst>
+                                  <p:childTnLst>
+                                    <p:set>
+                                      <p:cBhvr>
+                                        <p:cTn id="21" dur="1" fill="hold">
+                                          <p:stCondLst>
+                                            <p:cond delay="0"/>
+                                          </p:stCondLst>
+                                        </p:cTn>
+                                        <p:tgtEl>
+                                          <p:spTgt spid="22"/>
+                                        </p:tgtEl>
+                                        <p:attrNameLst>
+                                          <p:attrName>style.visibility</p:attrName>
+                                        </p:attrNameLst>
+                                      </p:cBhvr>
+                                      <p:to>
+                                        <p:strVal val="visible"/>
+                                      </p:to>
+                                    </p:set>
+                                    <p:animEffect transition="in" filter="fade">
+                                      <p:cBhvr>
+                                        <p:cTn id="22" dur="500"/>
+                                        <p:tgtEl>
+                                          <p:spTgt spid="22"/>
+                                        </p:tgtEl>
+                                      </p:cBhvr>
+                                    </p:animEffect>
+                                  </p:childTnLst>
+                                </p:cTn>
+                              </p:par>
+                            </p:childTnLst>
+                          </p:cTn>
+                        </p:par>
+                      </p:childTnLst>
+                    </p:cTn>
+                  </p:par>
+                </p:childTnLst>
+              </p:cTn>
+              <p:prevCondLst>
+                <p:cond evt="onPrev" delay="0">
+                  <p:tgtEl>
+                    <p:sldTgt/>
+                  </p:tgtEl>
+                </p:cond>
+              </p:prevCondLst>
+              <p:nextCondLst>
+                <p:cond evt="onNext" delay="0">
+                  <p:tgtEl>
+                    <p:sldTgt/>
+                  </p:tgtEl>
+                </p:cond>
+              </p:nextCondLst>
+            </p:seq>
+          </p:childTnLst>
+        </p:cTn>
       </p:par>
     </p:tnLst>
   </p:timing>
 </p:sld>
 </file>
 
-<file path=ppt/slides/slide7.xml><?xml version="1.0" encoding="utf-8"?>
+<file path=ppt/slides/slide9.xml><?xml version="1.0" encoding="utf-8"?>
 <p:sld xmlns:a="http://schemas.openxmlformats.org/drawingml/2006/main" xmlns:r="http://schemas.openxmlformats.org/officeDocument/2006/relationships" xmlns:p="http://schemas.openxmlformats.org/presentationml/2006/main">
   <p:cSld>
     <p:spTree>
@@ -5015,9 +8063,14 @@
             <p:ph idx="1"/>
           </p:nvPr>
         </p:nvSpPr>
-        <p:spPr/>
-        <p:txBody>
-          <a:bodyPr/>
+        <p:spPr>
+          <a:xfrm>
+            <a:off x="457200" y="2096852"/>
+            <a:ext cx="8229600" cy="2664297"/>
+          </a:xfrm>
+        </p:spPr>
+        <p:txBody>
+          <a:bodyPr anchor="ctr"/>
           <a:lstStyle/>
           <a:p>
             <a:r>
@@ -5074,26 +8127,8 @@
               <a:rPr lang="sv-SE" dirty="0" err="1" smtClean="0"/>
               <a:t>shading</a:t>
             </a:r>
-            <a:r>
-              <a:rPr lang="sv-SE" dirty="0" smtClean="0"/>
-              <a:t/>
-            </a:r>
-            <a:br>
-              <a:rPr lang="sv-SE" dirty="0" smtClean="0"/>
-            </a:br>
             <a:endParaRPr lang="sv-SE" dirty="0" smtClean="0"/>
           </a:p>
-          <a:p>
-            <a:r>
-              <a:rPr lang="sv-SE" dirty="0" smtClean="0"/>
-              <a:t>2 P-</a:t>
-            </a:r>
-            <a:r>
-              <a:rPr lang="sv-SE" dirty="0" err="1" smtClean="0"/>
-              <a:t>buffers</a:t>
-            </a:r>
-            <a:endParaRPr lang="sv-SE" dirty="0"/>
-          </a:p>
         </p:txBody>
       </p:sp>
       <p:sp>
@@ -5113,7 +8148,7 @@
           <a:p>
             <a:fld id="{637124F9-74EC-4A1F-82AA-07908676A841}" type="datetime1">
               <a:rPr lang="sv-SE" smtClean="0"/>
-              <a:t>2011-05-26</a:t>
+              <a:t>2012-01-19</a:t>
             </a:fld>
             <a:endParaRPr lang="sv-SE"/>
           </a:p>
@@ -5136,7 +8171,7 @@
           <a:p>
             <a:fld id="{87B9E5C0-0A56-4BE6-BE7D-E6FF370B7540}" type="slidenum">
               <a:rPr lang="sv-SE" smtClean="0"/>
-              <a:t>7</a:t>
+              <a:t>9</a:t>
             </a:fld>
             <a:endParaRPr lang="sv-SE"/>
           </a:p>

</xml_diff>